<commit_message>
draft of paper figures
</commit_message>
<xml_diff>
--- a/paper/figs/schematic/schematic.pptx
+++ b/paper/figs/schematic/schematic.pptx
@@ -2,12 +2,12 @@
 <file path=ppt/presentation.xml><?xml version="1.0" encoding="utf-8"?>
 <p:presentation xmlns:a="http://schemas.openxmlformats.org/drawingml/2006/main" xmlns:r="http://schemas.openxmlformats.org/officeDocument/2006/relationships" xmlns:p="http://schemas.openxmlformats.org/presentationml/2006/main" saveSubsetFonts="1" autoCompressPictures="0">
   <p:sldMasterIdLst>
-    <p:sldMasterId id="2147483708" r:id="rId1"/>
+    <p:sldMasterId id="2147483732" r:id="rId1"/>
   </p:sldMasterIdLst>
   <p:sldIdLst>
     <p:sldId id="256" r:id="rId2"/>
   </p:sldIdLst>
-  <p:sldSz cx="17191038" cy="8229600"/>
+  <p:sldSz cx="14995525" cy="8229600"/>
   <p:notesSz cx="9144000" cy="6858000"/>
   <p:defaultTextStyle>
     <a:defPPr>
@@ -112,6 +112,1207 @@
 </p:presentation>
 </file>
 
+<file path=ppt/revisionInfo.xml><?xml version="1.0" encoding="utf-8"?>
+<p1510:revInfo xmlns:a="http://schemas.openxmlformats.org/drawingml/2006/main" xmlns:r="http://schemas.openxmlformats.org/officeDocument/2006/relationships" xmlns:p1510="http://schemas.microsoft.com/office/powerpoint/2015/10/main">
+  <p1510:revLst>
+    <p1510:client id="{CE44BA01-297F-E041-9FF7-9BC574E0188B}" v="8" dt="2023-01-12T16:06:23.556"/>
+  </p1510:revLst>
+</p1510:revInfo>
+</file>
+
+<file path=ppt/changesInfos/changesInfo1.xml><?xml version="1.0" encoding="utf-8"?>
+<pc:chgInfo xmlns:a="http://schemas.openxmlformats.org/drawingml/2006/main" xmlns:r="http://schemas.openxmlformats.org/officeDocument/2006/relationships" xmlns:ac="http://schemas.microsoft.com/office/drawing/2013/main/command" xmlns:pc="http://schemas.microsoft.com/office/powerpoint/2013/main/command">
+  <pc:docChgLst>
+    <pc:chgData name="Bloom PhD, Jesse D" userId="e17e4af4-92ba-4f4f-89d8-f6d4f5501821" providerId="ADAL" clId="{CE44BA01-297F-E041-9FF7-9BC574E0188B}"/>
+    <pc:docChg chg="custSel modSld modMainMaster">
+      <pc:chgData name="Bloom PhD, Jesse D" userId="e17e4af4-92ba-4f4f-89d8-f6d4f5501821" providerId="ADAL" clId="{CE44BA01-297F-E041-9FF7-9BC574E0188B}" dt="2023-01-12T16:06:23.556" v="256"/>
+      <pc:docMkLst>
+        <pc:docMk/>
+      </pc:docMkLst>
+      <pc:sldChg chg="addSp delSp modSp mod">
+        <pc:chgData name="Bloom PhD, Jesse D" userId="e17e4af4-92ba-4f4f-89d8-f6d4f5501821" providerId="ADAL" clId="{CE44BA01-297F-E041-9FF7-9BC574E0188B}" dt="2023-01-12T16:06:23.556" v="256"/>
+        <pc:sldMkLst>
+          <pc:docMk/>
+          <pc:sldMk cId="1618769077" sldId="256"/>
+        </pc:sldMkLst>
+        <pc:spChg chg="add mod">
+          <ac:chgData name="Bloom PhD, Jesse D" userId="e17e4af4-92ba-4f4f-89d8-f6d4f5501821" providerId="ADAL" clId="{CE44BA01-297F-E041-9FF7-9BC574E0188B}" dt="2023-01-12T16:05:29.194" v="249" actId="164"/>
+          <ac:spMkLst>
+            <pc:docMk/>
+            <pc:sldMk cId="1618769077" sldId="256"/>
+            <ac:spMk id="2" creationId="{8126B5E9-86C2-D3CF-E1CD-C0A6A568A467}"/>
+          </ac:spMkLst>
+        </pc:spChg>
+        <pc:spChg chg="mod">
+          <ac:chgData name="Bloom PhD, Jesse D" userId="e17e4af4-92ba-4f4f-89d8-f6d4f5501821" providerId="ADAL" clId="{CE44BA01-297F-E041-9FF7-9BC574E0188B}" dt="2023-01-12T16:05:46.468" v="252"/>
+          <ac:spMkLst>
+            <pc:docMk/>
+            <pc:sldMk cId="1618769077" sldId="256"/>
+            <ac:spMk id="7" creationId="{B0E55044-6EE7-3B1C-1B72-C75B67E93160}"/>
+          </ac:spMkLst>
+        </pc:spChg>
+        <pc:spChg chg="mod">
+          <ac:chgData name="Bloom PhD, Jesse D" userId="e17e4af4-92ba-4f4f-89d8-f6d4f5501821" providerId="ADAL" clId="{CE44BA01-297F-E041-9FF7-9BC574E0188B}" dt="2023-01-12T16:05:46.468" v="252"/>
+          <ac:spMkLst>
+            <pc:docMk/>
+            <pc:sldMk cId="1618769077" sldId="256"/>
+            <ac:spMk id="8" creationId="{4B2F54C8-F2C4-7007-2D1B-216098D6F4A1}"/>
+          </ac:spMkLst>
+        </pc:spChg>
+        <pc:spChg chg="mod">
+          <ac:chgData name="Bloom PhD, Jesse D" userId="e17e4af4-92ba-4f4f-89d8-f6d4f5501821" providerId="ADAL" clId="{CE44BA01-297F-E041-9FF7-9BC574E0188B}" dt="2023-01-12T16:05:46.468" v="252"/>
+          <ac:spMkLst>
+            <pc:docMk/>
+            <pc:sldMk cId="1618769077" sldId="256"/>
+            <ac:spMk id="9" creationId="{49C46641-4A01-37E1-78B4-149B8284E620}"/>
+          </ac:spMkLst>
+        </pc:spChg>
+        <pc:spChg chg="mod">
+          <ac:chgData name="Bloom PhD, Jesse D" userId="e17e4af4-92ba-4f4f-89d8-f6d4f5501821" providerId="ADAL" clId="{CE44BA01-297F-E041-9FF7-9BC574E0188B}" dt="2023-01-12T16:05:46.468" v="252"/>
+          <ac:spMkLst>
+            <pc:docMk/>
+            <pc:sldMk cId="1618769077" sldId="256"/>
+            <ac:spMk id="11" creationId="{5DE62040-2151-26A6-80C2-3C240002018C}"/>
+          </ac:spMkLst>
+        </pc:spChg>
+        <pc:spChg chg="mod">
+          <ac:chgData name="Bloom PhD, Jesse D" userId="e17e4af4-92ba-4f4f-89d8-f6d4f5501821" providerId="ADAL" clId="{CE44BA01-297F-E041-9FF7-9BC574E0188B}" dt="2023-01-12T16:05:46.468" v="252"/>
+          <ac:spMkLst>
+            <pc:docMk/>
+            <pc:sldMk cId="1618769077" sldId="256"/>
+            <ac:spMk id="13" creationId="{5F6378F2-D0BE-1A8C-FC88-D8A431342762}"/>
+          </ac:spMkLst>
+        </pc:spChg>
+        <pc:spChg chg="mod">
+          <ac:chgData name="Bloom PhD, Jesse D" userId="e17e4af4-92ba-4f4f-89d8-f6d4f5501821" providerId="ADAL" clId="{CE44BA01-297F-E041-9FF7-9BC574E0188B}" dt="2023-01-12T16:05:46.468" v="252"/>
+          <ac:spMkLst>
+            <pc:docMk/>
+            <pc:sldMk cId="1618769077" sldId="256"/>
+            <ac:spMk id="14" creationId="{D61F4944-BBF8-8904-3506-C512E08B4862}"/>
+          </ac:spMkLst>
+        </pc:spChg>
+        <pc:spChg chg="mod">
+          <ac:chgData name="Bloom PhD, Jesse D" userId="e17e4af4-92ba-4f4f-89d8-f6d4f5501821" providerId="ADAL" clId="{CE44BA01-297F-E041-9FF7-9BC574E0188B}" dt="2023-01-12T16:05:46.468" v="252"/>
+          <ac:spMkLst>
+            <pc:docMk/>
+            <pc:sldMk cId="1618769077" sldId="256"/>
+            <ac:spMk id="15" creationId="{F9DF896A-0674-2109-D688-9C71ADD15CB2}"/>
+          </ac:spMkLst>
+        </pc:spChg>
+        <pc:spChg chg="mod">
+          <ac:chgData name="Bloom PhD, Jesse D" userId="e17e4af4-92ba-4f4f-89d8-f6d4f5501821" providerId="ADAL" clId="{CE44BA01-297F-E041-9FF7-9BC574E0188B}" dt="2023-01-12T16:05:46.468" v="252"/>
+          <ac:spMkLst>
+            <pc:docMk/>
+            <pc:sldMk cId="1618769077" sldId="256"/>
+            <ac:spMk id="16" creationId="{18D887BC-9F06-888F-DA7D-B35843A21569}"/>
+          </ac:spMkLst>
+        </pc:spChg>
+        <pc:spChg chg="mod">
+          <ac:chgData name="Bloom PhD, Jesse D" userId="e17e4af4-92ba-4f4f-89d8-f6d4f5501821" providerId="ADAL" clId="{CE44BA01-297F-E041-9FF7-9BC574E0188B}" dt="2023-01-12T16:05:46.468" v="252"/>
+          <ac:spMkLst>
+            <pc:docMk/>
+            <pc:sldMk cId="1618769077" sldId="256"/>
+            <ac:spMk id="17" creationId="{203A5AE6-A8E5-F2A8-879E-3EACCD878568}"/>
+          </ac:spMkLst>
+        </pc:spChg>
+        <pc:spChg chg="mod">
+          <ac:chgData name="Bloom PhD, Jesse D" userId="e17e4af4-92ba-4f4f-89d8-f6d4f5501821" providerId="ADAL" clId="{CE44BA01-297F-E041-9FF7-9BC574E0188B}" dt="2023-01-12T16:05:46.468" v="252"/>
+          <ac:spMkLst>
+            <pc:docMk/>
+            <pc:sldMk cId="1618769077" sldId="256"/>
+            <ac:spMk id="18" creationId="{03046D74-C238-CEC8-98C6-F05901E2FB84}"/>
+          </ac:spMkLst>
+        </pc:spChg>
+        <pc:spChg chg="mod">
+          <ac:chgData name="Bloom PhD, Jesse D" userId="e17e4af4-92ba-4f4f-89d8-f6d4f5501821" providerId="ADAL" clId="{CE44BA01-297F-E041-9FF7-9BC574E0188B}" dt="2023-01-12T16:05:46.468" v="252"/>
+          <ac:spMkLst>
+            <pc:docMk/>
+            <pc:sldMk cId="1618769077" sldId="256"/>
+            <ac:spMk id="19" creationId="{C8476ECF-D66B-5188-FBBA-CC726C5711AB}"/>
+          </ac:spMkLst>
+        </pc:spChg>
+        <pc:spChg chg="mod">
+          <ac:chgData name="Bloom PhD, Jesse D" userId="e17e4af4-92ba-4f4f-89d8-f6d4f5501821" providerId="ADAL" clId="{CE44BA01-297F-E041-9FF7-9BC574E0188B}" dt="2023-01-12T16:05:46.468" v="252"/>
+          <ac:spMkLst>
+            <pc:docMk/>
+            <pc:sldMk cId="1618769077" sldId="256"/>
+            <ac:spMk id="20" creationId="{919F860E-948F-21AC-97F0-E1805439669B}"/>
+          </ac:spMkLst>
+        </pc:spChg>
+        <pc:spChg chg="mod">
+          <ac:chgData name="Bloom PhD, Jesse D" userId="e17e4af4-92ba-4f4f-89d8-f6d4f5501821" providerId="ADAL" clId="{CE44BA01-297F-E041-9FF7-9BC574E0188B}" dt="2023-01-12T16:05:46.468" v="252"/>
+          <ac:spMkLst>
+            <pc:docMk/>
+            <pc:sldMk cId="1618769077" sldId="256"/>
+            <ac:spMk id="21" creationId="{0C2592EE-AC56-28FD-1CFE-F2A1F2C64D8F}"/>
+          </ac:spMkLst>
+        </pc:spChg>
+        <pc:spChg chg="mod">
+          <ac:chgData name="Bloom PhD, Jesse D" userId="e17e4af4-92ba-4f4f-89d8-f6d4f5501821" providerId="ADAL" clId="{CE44BA01-297F-E041-9FF7-9BC574E0188B}" dt="2023-01-12T16:05:46.468" v="252"/>
+          <ac:spMkLst>
+            <pc:docMk/>
+            <pc:sldMk cId="1618769077" sldId="256"/>
+            <ac:spMk id="22" creationId="{4BB3846C-18E5-E2B4-28ED-C8FB5E24B2B7}"/>
+          </ac:spMkLst>
+        </pc:spChg>
+        <pc:spChg chg="mod">
+          <ac:chgData name="Bloom PhD, Jesse D" userId="e17e4af4-92ba-4f4f-89d8-f6d4f5501821" providerId="ADAL" clId="{CE44BA01-297F-E041-9FF7-9BC574E0188B}" dt="2023-01-12T16:05:46.468" v="252"/>
+          <ac:spMkLst>
+            <pc:docMk/>
+            <pc:sldMk cId="1618769077" sldId="256"/>
+            <ac:spMk id="23" creationId="{12058F39-5FC4-D850-5D85-034E44092A34}"/>
+          </ac:spMkLst>
+        </pc:spChg>
+        <pc:spChg chg="mod">
+          <ac:chgData name="Bloom PhD, Jesse D" userId="e17e4af4-92ba-4f4f-89d8-f6d4f5501821" providerId="ADAL" clId="{CE44BA01-297F-E041-9FF7-9BC574E0188B}" dt="2023-01-12T16:05:46.468" v="252"/>
+          <ac:spMkLst>
+            <pc:docMk/>
+            <pc:sldMk cId="1618769077" sldId="256"/>
+            <ac:spMk id="25" creationId="{513CA3CF-CC97-00ED-94AD-88628F9424B4}"/>
+          </ac:spMkLst>
+        </pc:spChg>
+        <pc:spChg chg="mod">
+          <ac:chgData name="Bloom PhD, Jesse D" userId="e17e4af4-92ba-4f4f-89d8-f6d4f5501821" providerId="ADAL" clId="{CE44BA01-297F-E041-9FF7-9BC574E0188B}" dt="2023-01-12T16:05:46.468" v="252"/>
+          <ac:spMkLst>
+            <pc:docMk/>
+            <pc:sldMk cId="1618769077" sldId="256"/>
+            <ac:spMk id="26" creationId="{9F23B181-616C-1944-BA3E-9535EA136E2F}"/>
+          </ac:spMkLst>
+        </pc:spChg>
+        <pc:spChg chg="mod">
+          <ac:chgData name="Bloom PhD, Jesse D" userId="e17e4af4-92ba-4f4f-89d8-f6d4f5501821" providerId="ADAL" clId="{CE44BA01-297F-E041-9FF7-9BC574E0188B}" dt="2023-01-12T16:05:46.468" v="252"/>
+          <ac:spMkLst>
+            <pc:docMk/>
+            <pc:sldMk cId="1618769077" sldId="256"/>
+            <ac:spMk id="27" creationId="{35C3D25F-5885-F1AB-0471-2927CD74A49C}"/>
+          </ac:spMkLst>
+        </pc:spChg>
+        <pc:spChg chg="mod">
+          <ac:chgData name="Bloom PhD, Jesse D" userId="e17e4af4-92ba-4f4f-89d8-f6d4f5501821" providerId="ADAL" clId="{CE44BA01-297F-E041-9FF7-9BC574E0188B}" dt="2023-01-12T16:05:46.468" v="252"/>
+          <ac:spMkLst>
+            <pc:docMk/>
+            <pc:sldMk cId="1618769077" sldId="256"/>
+            <ac:spMk id="29" creationId="{EC13B39D-4806-6203-6FA9-FCBEA6B9E2E7}"/>
+          </ac:spMkLst>
+        </pc:spChg>
+        <pc:spChg chg="mod">
+          <ac:chgData name="Bloom PhD, Jesse D" userId="e17e4af4-92ba-4f4f-89d8-f6d4f5501821" providerId="ADAL" clId="{CE44BA01-297F-E041-9FF7-9BC574E0188B}" dt="2023-01-12T16:05:46.468" v="252"/>
+          <ac:spMkLst>
+            <pc:docMk/>
+            <pc:sldMk cId="1618769077" sldId="256"/>
+            <ac:spMk id="30" creationId="{268EB04F-7CB2-77BD-67C6-628084493398}"/>
+          </ac:spMkLst>
+        </pc:spChg>
+        <pc:spChg chg="mod">
+          <ac:chgData name="Bloom PhD, Jesse D" userId="e17e4af4-92ba-4f4f-89d8-f6d4f5501821" providerId="ADAL" clId="{CE44BA01-297F-E041-9FF7-9BC574E0188B}" dt="2023-01-12T16:05:46.468" v="252"/>
+          <ac:spMkLst>
+            <pc:docMk/>
+            <pc:sldMk cId="1618769077" sldId="256"/>
+            <ac:spMk id="31" creationId="{1D9550FB-5AFD-45E1-277D-8EC6CA0CA883}"/>
+          </ac:spMkLst>
+        </pc:spChg>
+        <pc:spChg chg="mod">
+          <ac:chgData name="Bloom PhD, Jesse D" userId="e17e4af4-92ba-4f4f-89d8-f6d4f5501821" providerId="ADAL" clId="{CE44BA01-297F-E041-9FF7-9BC574E0188B}" dt="2023-01-12T16:05:46.468" v="252"/>
+          <ac:spMkLst>
+            <pc:docMk/>
+            <pc:sldMk cId="1618769077" sldId="256"/>
+            <ac:spMk id="32" creationId="{CE0B82B3-1384-41A9-A768-E52A61711D6F}"/>
+          </ac:spMkLst>
+        </pc:spChg>
+        <pc:spChg chg="mod">
+          <ac:chgData name="Bloom PhD, Jesse D" userId="e17e4af4-92ba-4f4f-89d8-f6d4f5501821" providerId="ADAL" clId="{CE44BA01-297F-E041-9FF7-9BC574E0188B}" dt="2023-01-12T16:05:46.468" v="252"/>
+          <ac:spMkLst>
+            <pc:docMk/>
+            <pc:sldMk cId="1618769077" sldId="256"/>
+            <ac:spMk id="33" creationId="{36438DCB-3C91-74A6-37C8-5EEB12A0CAB4}"/>
+          </ac:spMkLst>
+        </pc:spChg>
+        <pc:spChg chg="mod">
+          <ac:chgData name="Bloom PhD, Jesse D" userId="e17e4af4-92ba-4f4f-89d8-f6d4f5501821" providerId="ADAL" clId="{CE44BA01-297F-E041-9FF7-9BC574E0188B}" dt="2023-01-12T16:05:46.468" v="252"/>
+          <ac:spMkLst>
+            <pc:docMk/>
+            <pc:sldMk cId="1618769077" sldId="256"/>
+            <ac:spMk id="34" creationId="{4D389C47-FD4A-BE42-462D-7E3AE5F65A06}"/>
+          </ac:spMkLst>
+        </pc:spChg>
+        <pc:spChg chg="mod">
+          <ac:chgData name="Bloom PhD, Jesse D" userId="e17e4af4-92ba-4f4f-89d8-f6d4f5501821" providerId="ADAL" clId="{CE44BA01-297F-E041-9FF7-9BC574E0188B}" dt="2023-01-12T16:05:46.468" v="252"/>
+          <ac:spMkLst>
+            <pc:docMk/>
+            <pc:sldMk cId="1618769077" sldId="256"/>
+            <ac:spMk id="35" creationId="{1AF711DB-D228-D24A-086D-EBA7EBAB1177}"/>
+          </ac:spMkLst>
+        </pc:spChg>
+        <pc:spChg chg="mod">
+          <ac:chgData name="Bloom PhD, Jesse D" userId="e17e4af4-92ba-4f4f-89d8-f6d4f5501821" providerId="ADAL" clId="{CE44BA01-297F-E041-9FF7-9BC574E0188B}" dt="2023-01-12T16:05:46.468" v="252"/>
+          <ac:spMkLst>
+            <pc:docMk/>
+            <pc:sldMk cId="1618769077" sldId="256"/>
+            <ac:spMk id="36" creationId="{5DA79DBB-9208-835A-A170-F576916FCF49}"/>
+          </ac:spMkLst>
+        </pc:spChg>
+        <pc:spChg chg="mod">
+          <ac:chgData name="Bloom PhD, Jesse D" userId="e17e4af4-92ba-4f4f-89d8-f6d4f5501821" providerId="ADAL" clId="{CE44BA01-297F-E041-9FF7-9BC574E0188B}" dt="2023-01-12T16:05:46.468" v="252"/>
+          <ac:spMkLst>
+            <pc:docMk/>
+            <pc:sldMk cId="1618769077" sldId="256"/>
+            <ac:spMk id="37" creationId="{C532407C-4101-2230-C373-5D64772B521A}"/>
+          </ac:spMkLst>
+        </pc:spChg>
+        <pc:spChg chg="mod">
+          <ac:chgData name="Bloom PhD, Jesse D" userId="e17e4af4-92ba-4f4f-89d8-f6d4f5501821" providerId="ADAL" clId="{CE44BA01-297F-E041-9FF7-9BC574E0188B}" dt="2023-01-12T16:05:46.468" v="252"/>
+          <ac:spMkLst>
+            <pc:docMk/>
+            <pc:sldMk cId="1618769077" sldId="256"/>
+            <ac:spMk id="38" creationId="{81A26EBD-2F5F-6A13-536B-C8D934FD2B2F}"/>
+          </ac:spMkLst>
+        </pc:spChg>
+        <pc:spChg chg="mod">
+          <ac:chgData name="Bloom PhD, Jesse D" userId="e17e4af4-92ba-4f4f-89d8-f6d4f5501821" providerId="ADAL" clId="{CE44BA01-297F-E041-9FF7-9BC574E0188B}" dt="2023-01-12T16:05:46.468" v="252"/>
+          <ac:spMkLst>
+            <pc:docMk/>
+            <pc:sldMk cId="1618769077" sldId="256"/>
+            <ac:spMk id="39" creationId="{2CBA89C2-E07E-50BF-11B4-C4A00497837D}"/>
+          </ac:spMkLst>
+        </pc:spChg>
+        <pc:spChg chg="mod">
+          <ac:chgData name="Bloom PhD, Jesse D" userId="e17e4af4-92ba-4f4f-89d8-f6d4f5501821" providerId="ADAL" clId="{CE44BA01-297F-E041-9FF7-9BC574E0188B}" dt="2023-01-12T16:06:23.556" v="256"/>
+          <ac:spMkLst>
+            <pc:docMk/>
+            <pc:sldMk cId="1618769077" sldId="256"/>
+            <ac:spMk id="43" creationId="{58347DE4-D4B5-981D-44D3-A5AFB47E9A03}"/>
+          </ac:spMkLst>
+        </pc:spChg>
+        <pc:spChg chg="mod">
+          <ac:chgData name="Bloom PhD, Jesse D" userId="e17e4af4-92ba-4f4f-89d8-f6d4f5501821" providerId="ADAL" clId="{CE44BA01-297F-E041-9FF7-9BC574E0188B}" dt="2023-01-12T16:06:23.556" v="256"/>
+          <ac:spMkLst>
+            <pc:docMk/>
+            <pc:sldMk cId="1618769077" sldId="256"/>
+            <ac:spMk id="44" creationId="{78B8061B-22FC-C02B-A7E3-6982D9CFC56E}"/>
+          </ac:spMkLst>
+        </pc:spChg>
+        <pc:spChg chg="mod">
+          <ac:chgData name="Bloom PhD, Jesse D" userId="e17e4af4-92ba-4f4f-89d8-f6d4f5501821" providerId="ADAL" clId="{CE44BA01-297F-E041-9FF7-9BC574E0188B}" dt="2023-01-12T16:06:23.556" v="256"/>
+          <ac:spMkLst>
+            <pc:docMk/>
+            <pc:sldMk cId="1618769077" sldId="256"/>
+            <ac:spMk id="45" creationId="{4B74CC47-CA20-C89C-D7E9-200E54A1A81C}"/>
+          </ac:spMkLst>
+        </pc:spChg>
+        <pc:spChg chg="mod">
+          <ac:chgData name="Bloom PhD, Jesse D" userId="e17e4af4-92ba-4f4f-89d8-f6d4f5501821" providerId="ADAL" clId="{CE44BA01-297F-E041-9FF7-9BC574E0188B}" dt="2023-01-12T16:06:23.556" v="256"/>
+          <ac:spMkLst>
+            <pc:docMk/>
+            <pc:sldMk cId="1618769077" sldId="256"/>
+            <ac:spMk id="47" creationId="{EEEAA09D-52AE-8359-6A40-174D667E7450}"/>
+          </ac:spMkLst>
+        </pc:spChg>
+        <pc:spChg chg="mod">
+          <ac:chgData name="Bloom PhD, Jesse D" userId="e17e4af4-92ba-4f4f-89d8-f6d4f5501821" providerId="ADAL" clId="{CE44BA01-297F-E041-9FF7-9BC574E0188B}" dt="2023-01-12T16:06:23.556" v="256"/>
+          <ac:spMkLst>
+            <pc:docMk/>
+            <pc:sldMk cId="1618769077" sldId="256"/>
+            <ac:spMk id="49" creationId="{9A3EB3C3-E479-5325-B721-C19FD63F334A}"/>
+          </ac:spMkLst>
+        </pc:spChg>
+        <pc:spChg chg="mod">
+          <ac:chgData name="Bloom PhD, Jesse D" userId="e17e4af4-92ba-4f4f-89d8-f6d4f5501821" providerId="ADAL" clId="{CE44BA01-297F-E041-9FF7-9BC574E0188B}" dt="2023-01-12T16:06:23.556" v="256"/>
+          <ac:spMkLst>
+            <pc:docMk/>
+            <pc:sldMk cId="1618769077" sldId="256"/>
+            <ac:spMk id="50" creationId="{E2EE91A6-F911-4503-BDDD-60017C786944}"/>
+          </ac:spMkLst>
+        </pc:spChg>
+        <pc:spChg chg="mod">
+          <ac:chgData name="Bloom PhD, Jesse D" userId="e17e4af4-92ba-4f4f-89d8-f6d4f5501821" providerId="ADAL" clId="{CE44BA01-297F-E041-9FF7-9BC574E0188B}" dt="2023-01-12T16:06:23.556" v="256"/>
+          <ac:spMkLst>
+            <pc:docMk/>
+            <pc:sldMk cId="1618769077" sldId="256"/>
+            <ac:spMk id="51" creationId="{002E6E0F-2960-FDBB-27F3-5E7ABB0F6A54}"/>
+          </ac:spMkLst>
+        </pc:spChg>
+        <pc:spChg chg="mod">
+          <ac:chgData name="Bloom PhD, Jesse D" userId="e17e4af4-92ba-4f4f-89d8-f6d4f5501821" providerId="ADAL" clId="{CE44BA01-297F-E041-9FF7-9BC574E0188B}" dt="2023-01-12T16:06:23.556" v="256"/>
+          <ac:spMkLst>
+            <pc:docMk/>
+            <pc:sldMk cId="1618769077" sldId="256"/>
+            <ac:spMk id="52" creationId="{9460A7D8-37A0-BA86-0B21-D151D43D1A96}"/>
+          </ac:spMkLst>
+        </pc:spChg>
+        <pc:spChg chg="mod">
+          <ac:chgData name="Bloom PhD, Jesse D" userId="e17e4af4-92ba-4f4f-89d8-f6d4f5501821" providerId="ADAL" clId="{CE44BA01-297F-E041-9FF7-9BC574E0188B}" dt="2023-01-12T16:06:23.556" v="256"/>
+          <ac:spMkLst>
+            <pc:docMk/>
+            <pc:sldMk cId="1618769077" sldId="256"/>
+            <ac:spMk id="53" creationId="{B40C4209-17BC-F8D6-22C1-02B31E3F49F1}"/>
+          </ac:spMkLst>
+        </pc:spChg>
+        <pc:spChg chg="mod">
+          <ac:chgData name="Bloom PhD, Jesse D" userId="e17e4af4-92ba-4f4f-89d8-f6d4f5501821" providerId="ADAL" clId="{CE44BA01-297F-E041-9FF7-9BC574E0188B}" dt="2023-01-12T16:06:23.556" v="256"/>
+          <ac:spMkLst>
+            <pc:docMk/>
+            <pc:sldMk cId="1618769077" sldId="256"/>
+            <ac:spMk id="54" creationId="{CD377C53-C181-9ED0-9F7E-EA60C85E7FBF}"/>
+          </ac:spMkLst>
+        </pc:spChg>
+        <pc:spChg chg="mod">
+          <ac:chgData name="Bloom PhD, Jesse D" userId="e17e4af4-92ba-4f4f-89d8-f6d4f5501821" providerId="ADAL" clId="{CE44BA01-297F-E041-9FF7-9BC574E0188B}" dt="2023-01-12T16:06:23.556" v="256"/>
+          <ac:spMkLst>
+            <pc:docMk/>
+            <pc:sldMk cId="1618769077" sldId="256"/>
+            <ac:spMk id="55" creationId="{F1F6041B-CC99-0C7C-501A-0803BDB4AC69}"/>
+          </ac:spMkLst>
+        </pc:spChg>
+        <pc:spChg chg="mod">
+          <ac:chgData name="Bloom PhD, Jesse D" userId="e17e4af4-92ba-4f4f-89d8-f6d4f5501821" providerId="ADAL" clId="{CE44BA01-297F-E041-9FF7-9BC574E0188B}" dt="2023-01-12T16:06:23.556" v="256"/>
+          <ac:spMkLst>
+            <pc:docMk/>
+            <pc:sldMk cId="1618769077" sldId="256"/>
+            <ac:spMk id="56" creationId="{690F2D6B-14B0-5DDA-A59A-DE875A053A48}"/>
+          </ac:spMkLst>
+        </pc:spChg>
+        <pc:spChg chg="mod">
+          <ac:chgData name="Bloom PhD, Jesse D" userId="e17e4af4-92ba-4f4f-89d8-f6d4f5501821" providerId="ADAL" clId="{CE44BA01-297F-E041-9FF7-9BC574E0188B}" dt="2023-01-12T16:06:23.556" v="256"/>
+          <ac:spMkLst>
+            <pc:docMk/>
+            <pc:sldMk cId="1618769077" sldId="256"/>
+            <ac:spMk id="57" creationId="{89DF3E15-6EB5-223F-C576-8CCA1736E8EB}"/>
+          </ac:spMkLst>
+        </pc:spChg>
+        <pc:spChg chg="mod">
+          <ac:chgData name="Bloom PhD, Jesse D" userId="e17e4af4-92ba-4f4f-89d8-f6d4f5501821" providerId="ADAL" clId="{CE44BA01-297F-E041-9FF7-9BC574E0188B}" dt="2023-01-12T16:06:23.556" v="256"/>
+          <ac:spMkLst>
+            <pc:docMk/>
+            <pc:sldMk cId="1618769077" sldId="256"/>
+            <ac:spMk id="58" creationId="{D355A262-B0FD-F51C-4F2E-D681BD5D1042}"/>
+          </ac:spMkLst>
+        </pc:spChg>
+        <pc:spChg chg="mod">
+          <ac:chgData name="Bloom PhD, Jesse D" userId="e17e4af4-92ba-4f4f-89d8-f6d4f5501821" providerId="ADAL" clId="{CE44BA01-297F-E041-9FF7-9BC574E0188B}" dt="2023-01-12T16:06:23.556" v="256"/>
+          <ac:spMkLst>
+            <pc:docMk/>
+            <pc:sldMk cId="1618769077" sldId="256"/>
+            <ac:spMk id="59" creationId="{0C62996A-F18B-087D-3E5F-74BAFF335CB9}"/>
+          </ac:spMkLst>
+        </pc:spChg>
+        <pc:spChg chg="mod">
+          <ac:chgData name="Bloom PhD, Jesse D" userId="e17e4af4-92ba-4f4f-89d8-f6d4f5501821" providerId="ADAL" clId="{CE44BA01-297F-E041-9FF7-9BC574E0188B}" dt="2023-01-12T16:06:23.556" v="256"/>
+          <ac:spMkLst>
+            <pc:docMk/>
+            <pc:sldMk cId="1618769077" sldId="256"/>
+            <ac:spMk id="61" creationId="{B7C687D1-2363-6C49-2209-720020AC79DC}"/>
+          </ac:spMkLst>
+        </pc:spChg>
+        <pc:spChg chg="mod">
+          <ac:chgData name="Bloom PhD, Jesse D" userId="e17e4af4-92ba-4f4f-89d8-f6d4f5501821" providerId="ADAL" clId="{CE44BA01-297F-E041-9FF7-9BC574E0188B}" dt="2023-01-12T16:06:23.556" v="256"/>
+          <ac:spMkLst>
+            <pc:docMk/>
+            <pc:sldMk cId="1618769077" sldId="256"/>
+            <ac:spMk id="62" creationId="{71BBFB5C-B7D3-04F1-FD70-C0ADED29FFDC}"/>
+          </ac:spMkLst>
+        </pc:spChg>
+        <pc:spChg chg="mod">
+          <ac:chgData name="Bloom PhD, Jesse D" userId="e17e4af4-92ba-4f4f-89d8-f6d4f5501821" providerId="ADAL" clId="{CE44BA01-297F-E041-9FF7-9BC574E0188B}" dt="2023-01-12T16:06:23.556" v="256"/>
+          <ac:spMkLst>
+            <pc:docMk/>
+            <pc:sldMk cId="1618769077" sldId="256"/>
+            <ac:spMk id="63" creationId="{8994ABE7-D9CB-A06A-5440-DABAD02B1B0B}"/>
+          </ac:spMkLst>
+        </pc:spChg>
+        <pc:spChg chg="mod">
+          <ac:chgData name="Bloom PhD, Jesse D" userId="e17e4af4-92ba-4f4f-89d8-f6d4f5501821" providerId="ADAL" clId="{CE44BA01-297F-E041-9FF7-9BC574E0188B}" dt="2023-01-12T16:06:23.556" v="256"/>
+          <ac:spMkLst>
+            <pc:docMk/>
+            <pc:sldMk cId="1618769077" sldId="256"/>
+            <ac:spMk id="65" creationId="{645377EC-54D7-13A7-053C-C891CCE92356}"/>
+          </ac:spMkLst>
+        </pc:spChg>
+        <pc:spChg chg="mod">
+          <ac:chgData name="Bloom PhD, Jesse D" userId="e17e4af4-92ba-4f4f-89d8-f6d4f5501821" providerId="ADAL" clId="{CE44BA01-297F-E041-9FF7-9BC574E0188B}" dt="2023-01-12T16:06:23.556" v="256"/>
+          <ac:spMkLst>
+            <pc:docMk/>
+            <pc:sldMk cId="1618769077" sldId="256"/>
+            <ac:spMk id="66" creationId="{44CD9DC0-FFEF-09C2-92CF-316CF4A4F316}"/>
+          </ac:spMkLst>
+        </pc:spChg>
+        <pc:spChg chg="mod">
+          <ac:chgData name="Bloom PhD, Jesse D" userId="e17e4af4-92ba-4f4f-89d8-f6d4f5501821" providerId="ADAL" clId="{CE44BA01-297F-E041-9FF7-9BC574E0188B}" dt="2023-01-12T16:06:23.556" v="256"/>
+          <ac:spMkLst>
+            <pc:docMk/>
+            <pc:sldMk cId="1618769077" sldId="256"/>
+            <ac:spMk id="67" creationId="{D7932A2B-7775-F841-128A-D4B34DF0F20E}"/>
+          </ac:spMkLst>
+        </pc:spChg>
+        <pc:spChg chg="mod">
+          <ac:chgData name="Bloom PhD, Jesse D" userId="e17e4af4-92ba-4f4f-89d8-f6d4f5501821" providerId="ADAL" clId="{CE44BA01-297F-E041-9FF7-9BC574E0188B}" dt="2023-01-12T16:06:23.556" v="256"/>
+          <ac:spMkLst>
+            <pc:docMk/>
+            <pc:sldMk cId="1618769077" sldId="256"/>
+            <ac:spMk id="68" creationId="{12F5DB00-8A13-742C-6FBF-4A1B525EFB9C}"/>
+          </ac:spMkLst>
+        </pc:spChg>
+        <pc:spChg chg="mod">
+          <ac:chgData name="Bloom PhD, Jesse D" userId="e17e4af4-92ba-4f4f-89d8-f6d4f5501821" providerId="ADAL" clId="{CE44BA01-297F-E041-9FF7-9BC574E0188B}" dt="2023-01-12T16:06:23.556" v="256"/>
+          <ac:spMkLst>
+            <pc:docMk/>
+            <pc:sldMk cId="1618769077" sldId="256"/>
+            <ac:spMk id="69" creationId="{B81508B4-392F-F8DF-BE03-453B7ACE615D}"/>
+          </ac:spMkLst>
+        </pc:spChg>
+        <pc:spChg chg="mod">
+          <ac:chgData name="Bloom PhD, Jesse D" userId="e17e4af4-92ba-4f4f-89d8-f6d4f5501821" providerId="ADAL" clId="{CE44BA01-297F-E041-9FF7-9BC574E0188B}" dt="2023-01-12T16:06:23.556" v="256"/>
+          <ac:spMkLst>
+            <pc:docMk/>
+            <pc:sldMk cId="1618769077" sldId="256"/>
+            <ac:spMk id="70" creationId="{FF6D1FDF-11C9-201C-CFA4-01221599D562}"/>
+          </ac:spMkLst>
+        </pc:spChg>
+        <pc:spChg chg="mod">
+          <ac:chgData name="Bloom PhD, Jesse D" userId="e17e4af4-92ba-4f4f-89d8-f6d4f5501821" providerId="ADAL" clId="{CE44BA01-297F-E041-9FF7-9BC574E0188B}" dt="2023-01-12T16:06:23.556" v="256"/>
+          <ac:spMkLst>
+            <pc:docMk/>
+            <pc:sldMk cId="1618769077" sldId="256"/>
+            <ac:spMk id="71" creationId="{10E527A8-271C-3C5C-A7F5-B2E7B3E04838}"/>
+          </ac:spMkLst>
+        </pc:spChg>
+        <pc:spChg chg="mod">
+          <ac:chgData name="Bloom PhD, Jesse D" userId="e17e4af4-92ba-4f4f-89d8-f6d4f5501821" providerId="ADAL" clId="{CE44BA01-297F-E041-9FF7-9BC574E0188B}" dt="2023-01-12T16:06:23.556" v="256"/>
+          <ac:spMkLst>
+            <pc:docMk/>
+            <pc:sldMk cId="1618769077" sldId="256"/>
+            <ac:spMk id="72" creationId="{E7D96E23-162A-B160-C65D-F61270F9B72A}"/>
+          </ac:spMkLst>
+        </pc:spChg>
+        <pc:spChg chg="mod">
+          <ac:chgData name="Bloom PhD, Jesse D" userId="e17e4af4-92ba-4f4f-89d8-f6d4f5501821" providerId="ADAL" clId="{CE44BA01-297F-E041-9FF7-9BC574E0188B}" dt="2023-01-12T16:06:23.556" v="256"/>
+          <ac:spMkLst>
+            <pc:docMk/>
+            <pc:sldMk cId="1618769077" sldId="256"/>
+            <ac:spMk id="73" creationId="{C36A5BC9-9B4A-DA82-B930-0153A1478A12}"/>
+          </ac:spMkLst>
+        </pc:spChg>
+        <pc:spChg chg="mod">
+          <ac:chgData name="Bloom PhD, Jesse D" userId="e17e4af4-92ba-4f4f-89d8-f6d4f5501821" providerId="ADAL" clId="{CE44BA01-297F-E041-9FF7-9BC574E0188B}" dt="2023-01-12T16:06:23.556" v="256"/>
+          <ac:spMkLst>
+            <pc:docMk/>
+            <pc:sldMk cId="1618769077" sldId="256"/>
+            <ac:spMk id="74" creationId="{DDD5D0B2-D946-FA99-1573-F3C7AE8E952E}"/>
+          </ac:spMkLst>
+        </pc:spChg>
+        <pc:spChg chg="mod">
+          <ac:chgData name="Bloom PhD, Jesse D" userId="e17e4af4-92ba-4f4f-89d8-f6d4f5501821" providerId="ADAL" clId="{CE44BA01-297F-E041-9FF7-9BC574E0188B}" dt="2023-01-12T16:06:23.556" v="256"/>
+          <ac:spMkLst>
+            <pc:docMk/>
+            <pc:sldMk cId="1618769077" sldId="256"/>
+            <ac:spMk id="75" creationId="{A6D6AD89-C134-09EB-0A2E-2E6AC382AE31}"/>
+          </ac:spMkLst>
+        </pc:spChg>
+        <pc:spChg chg="mod">
+          <ac:chgData name="Bloom PhD, Jesse D" userId="e17e4af4-92ba-4f4f-89d8-f6d4f5501821" providerId="ADAL" clId="{CE44BA01-297F-E041-9FF7-9BC574E0188B}" dt="2023-01-12T16:05:29.194" v="249" actId="164"/>
+          <ac:spMkLst>
+            <pc:docMk/>
+            <pc:sldMk cId="1618769077" sldId="256"/>
+            <ac:spMk id="137" creationId="{E923A5F0-AA21-E349-5BC5-52906D12D22E}"/>
+          </ac:spMkLst>
+        </pc:spChg>
+        <pc:spChg chg="mod">
+          <ac:chgData name="Bloom PhD, Jesse D" userId="e17e4af4-92ba-4f4f-89d8-f6d4f5501821" providerId="ADAL" clId="{CE44BA01-297F-E041-9FF7-9BC574E0188B}" dt="2023-01-12T16:05:29.194" v="249" actId="164"/>
+          <ac:spMkLst>
+            <pc:docMk/>
+            <pc:sldMk cId="1618769077" sldId="256"/>
+            <ac:spMk id="138" creationId="{2861BE95-C23D-7525-D703-9FA4CBA63B02}"/>
+          </ac:spMkLst>
+        </pc:spChg>
+        <pc:grpChg chg="add del mod">
+          <ac:chgData name="Bloom PhD, Jesse D" userId="e17e4af4-92ba-4f4f-89d8-f6d4f5501821" providerId="ADAL" clId="{CE44BA01-297F-E041-9FF7-9BC574E0188B}" dt="2023-01-12T16:05:32.381" v="250" actId="21"/>
+          <ac:grpSpMkLst>
+            <pc:docMk/>
+            <pc:sldMk cId="1618769077" sldId="256"/>
+            <ac:grpSpMk id="3" creationId="{A5595F7A-2091-2762-8CA8-7C398AC2E926}"/>
+          </ac:grpSpMkLst>
+        </pc:grpChg>
+        <pc:grpChg chg="add del mod">
+          <ac:chgData name="Bloom PhD, Jesse D" userId="e17e4af4-92ba-4f4f-89d8-f6d4f5501821" providerId="ADAL" clId="{CE44BA01-297F-E041-9FF7-9BC574E0188B}" dt="2023-01-12T16:06:11.300" v="254" actId="21"/>
+          <ac:grpSpMkLst>
+            <pc:docMk/>
+            <pc:sldMk cId="1618769077" sldId="256"/>
+            <ac:grpSpMk id="4" creationId="{22E13805-114D-4DAD-9268-EAA2F2ABC803}"/>
+          </ac:grpSpMkLst>
+        </pc:grpChg>
+        <pc:grpChg chg="mod">
+          <ac:chgData name="Bloom PhD, Jesse D" userId="e17e4af4-92ba-4f4f-89d8-f6d4f5501821" providerId="ADAL" clId="{CE44BA01-297F-E041-9FF7-9BC574E0188B}" dt="2023-01-12T16:05:46.468" v="252"/>
+          <ac:grpSpMkLst>
+            <pc:docMk/>
+            <pc:sldMk cId="1618769077" sldId="256"/>
+            <ac:grpSpMk id="5" creationId="{1E5AED9C-5DB2-9E64-EB74-BA47EDC6799D}"/>
+          </ac:grpSpMkLst>
+        </pc:grpChg>
+        <pc:grpChg chg="mod">
+          <ac:chgData name="Bloom PhD, Jesse D" userId="e17e4af4-92ba-4f4f-89d8-f6d4f5501821" providerId="ADAL" clId="{CE44BA01-297F-E041-9FF7-9BC574E0188B}" dt="2023-01-12T16:05:46.468" v="252"/>
+          <ac:grpSpMkLst>
+            <pc:docMk/>
+            <pc:sldMk cId="1618769077" sldId="256"/>
+            <ac:grpSpMk id="6" creationId="{9542DC25-E7BD-CC7F-3A53-98BD5ADB6441}"/>
+          </ac:grpSpMkLst>
+        </pc:grpChg>
+        <pc:grpChg chg="mod">
+          <ac:chgData name="Bloom PhD, Jesse D" userId="e17e4af4-92ba-4f4f-89d8-f6d4f5501821" providerId="ADAL" clId="{CE44BA01-297F-E041-9FF7-9BC574E0188B}" dt="2023-01-12T16:05:46.468" v="252"/>
+          <ac:grpSpMkLst>
+            <pc:docMk/>
+            <pc:sldMk cId="1618769077" sldId="256"/>
+            <ac:grpSpMk id="10" creationId="{26E88BA1-8EF4-F4DD-E874-C69C9EA3611B}"/>
+          </ac:grpSpMkLst>
+        </pc:grpChg>
+        <pc:grpChg chg="mod">
+          <ac:chgData name="Bloom PhD, Jesse D" userId="e17e4af4-92ba-4f4f-89d8-f6d4f5501821" providerId="ADAL" clId="{CE44BA01-297F-E041-9FF7-9BC574E0188B}" dt="2023-01-12T16:05:46.468" v="252"/>
+          <ac:grpSpMkLst>
+            <pc:docMk/>
+            <pc:sldMk cId="1618769077" sldId="256"/>
+            <ac:grpSpMk id="24" creationId="{5A6C8347-025F-97D8-FEBE-851E34663825}"/>
+          </ac:grpSpMkLst>
+        </pc:grpChg>
+        <pc:grpChg chg="add mod">
+          <ac:chgData name="Bloom PhD, Jesse D" userId="e17e4af4-92ba-4f4f-89d8-f6d4f5501821" providerId="ADAL" clId="{CE44BA01-297F-E041-9FF7-9BC574E0188B}" dt="2023-01-12T16:06:23.556" v="256"/>
+          <ac:grpSpMkLst>
+            <pc:docMk/>
+            <pc:sldMk cId="1618769077" sldId="256"/>
+            <ac:grpSpMk id="40" creationId="{E2F20CE1-087B-7560-4003-EBF706BF604F}"/>
+          </ac:grpSpMkLst>
+        </pc:grpChg>
+        <pc:grpChg chg="mod">
+          <ac:chgData name="Bloom PhD, Jesse D" userId="e17e4af4-92ba-4f4f-89d8-f6d4f5501821" providerId="ADAL" clId="{CE44BA01-297F-E041-9FF7-9BC574E0188B}" dt="2023-01-12T16:06:23.556" v="256"/>
+          <ac:grpSpMkLst>
+            <pc:docMk/>
+            <pc:sldMk cId="1618769077" sldId="256"/>
+            <ac:grpSpMk id="41" creationId="{8E54E6F3-D831-6080-6764-D11A914E15AA}"/>
+          </ac:grpSpMkLst>
+        </pc:grpChg>
+        <pc:grpChg chg="mod">
+          <ac:chgData name="Bloom PhD, Jesse D" userId="e17e4af4-92ba-4f4f-89d8-f6d4f5501821" providerId="ADAL" clId="{CE44BA01-297F-E041-9FF7-9BC574E0188B}" dt="2023-01-12T16:06:23.556" v="256"/>
+          <ac:grpSpMkLst>
+            <pc:docMk/>
+            <pc:sldMk cId="1618769077" sldId="256"/>
+            <ac:grpSpMk id="42" creationId="{673E85BA-5337-8F96-66CE-235884446371}"/>
+          </ac:grpSpMkLst>
+        </pc:grpChg>
+        <pc:grpChg chg="mod">
+          <ac:chgData name="Bloom PhD, Jesse D" userId="e17e4af4-92ba-4f4f-89d8-f6d4f5501821" providerId="ADAL" clId="{CE44BA01-297F-E041-9FF7-9BC574E0188B}" dt="2023-01-12T16:06:23.556" v="256"/>
+          <ac:grpSpMkLst>
+            <pc:docMk/>
+            <pc:sldMk cId="1618769077" sldId="256"/>
+            <ac:grpSpMk id="46" creationId="{05754702-90F6-780C-2634-94639065C99B}"/>
+          </ac:grpSpMkLst>
+        </pc:grpChg>
+        <pc:grpChg chg="mod">
+          <ac:chgData name="Bloom PhD, Jesse D" userId="e17e4af4-92ba-4f4f-89d8-f6d4f5501821" providerId="ADAL" clId="{CE44BA01-297F-E041-9FF7-9BC574E0188B}" dt="2023-01-12T16:06:23.556" v="256"/>
+          <ac:grpSpMkLst>
+            <pc:docMk/>
+            <pc:sldMk cId="1618769077" sldId="256"/>
+            <ac:grpSpMk id="60" creationId="{9E7AD127-DC64-3B93-F6B9-BB71DFC38B71}"/>
+          </ac:grpSpMkLst>
+        </pc:grpChg>
+        <pc:grpChg chg="mod">
+          <ac:chgData name="Bloom PhD, Jesse D" userId="e17e4af4-92ba-4f4f-89d8-f6d4f5501821" providerId="ADAL" clId="{CE44BA01-297F-E041-9FF7-9BC574E0188B}" dt="2023-01-12T16:05:29.194" v="249" actId="164"/>
+          <ac:grpSpMkLst>
+            <pc:docMk/>
+            <pc:sldMk cId="1618769077" sldId="256"/>
+            <ac:grpSpMk id="105" creationId="{B884B99D-7865-3BCE-7875-FAF337B5732C}"/>
+          </ac:grpSpMkLst>
+        </pc:grpChg>
+        <pc:grpChg chg="mod">
+          <ac:chgData name="Bloom PhD, Jesse D" userId="e17e4af4-92ba-4f4f-89d8-f6d4f5501821" providerId="ADAL" clId="{CE44BA01-297F-E041-9FF7-9BC574E0188B}" dt="2023-01-12T16:05:29.194" v="249" actId="164"/>
+          <ac:grpSpMkLst>
+            <pc:docMk/>
+            <pc:sldMk cId="1618769077" sldId="256"/>
+            <ac:grpSpMk id="122" creationId="{E07AD770-606F-DD1F-9DCE-0AD111887A3E}"/>
+          </ac:grpSpMkLst>
+        </pc:grpChg>
+        <pc:picChg chg="mod">
+          <ac:chgData name="Bloom PhD, Jesse D" userId="e17e4af4-92ba-4f4f-89d8-f6d4f5501821" providerId="ADAL" clId="{CE44BA01-297F-E041-9FF7-9BC574E0188B}" dt="2023-01-12T16:05:46.468" v="252"/>
+          <ac:picMkLst>
+            <pc:docMk/>
+            <pc:sldMk cId="1618769077" sldId="256"/>
+            <ac:picMk id="12" creationId="{051951E0-BDEE-F838-4A0B-43F82281D0FD}"/>
+          </ac:picMkLst>
+        </pc:picChg>
+        <pc:picChg chg="mod">
+          <ac:chgData name="Bloom PhD, Jesse D" userId="e17e4af4-92ba-4f4f-89d8-f6d4f5501821" providerId="ADAL" clId="{CE44BA01-297F-E041-9FF7-9BC574E0188B}" dt="2023-01-12T16:05:46.468" v="252"/>
+          <ac:picMkLst>
+            <pc:docMk/>
+            <pc:sldMk cId="1618769077" sldId="256"/>
+            <ac:picMk id="28" creationId="{3DDC6116-7055-564C-B21D-ED3FCF381B86}"/>
+          </ac:picMkLst>
+        </pc:picChg>
+        <pc:picChg chg="mod">
+          <ac:chgData name="Bloom PhD, Jesse D" userId="e17e4af4-92ba-4f4f-89d8-f6d4f5501821" providerId="ADAL" clId="{CE44BA01-297F-E041-9FF7-9BC574E0188B}" dt="2023-01-12T16:06:23.556" v="256"/>
+          <ac:picMkLst>
+            <pc:docMk/>
+            <pc:sldMk cId="1618769077" sldId="256"/>
+            <ac:picMk id="48" creationId="{18325514-BBD3-1DAA-0DE7-EE66EBF9610E}"/>
+          </ac:picMkLst>
+        </pc:picChg>
+        <pc:picChg chg="mod">
+          <ac:chgData name="Bloom PhD, Jesse D" userId="e17e4af4-92ba-4f4f-89d8-f6d4f5501821" providerId="ADAL" clId="{CE44BA01-297F-E041-9FF7-9BC574E0188B}" dt="2023-01-12T16:06:23.556" v="256"/>
+          <ac:picMkLst>
+            <pc:docMk/>
+            <pc:sldMk cId="1618769077" sldId="256"/>
+            <ac:picMk id="64" creationId="{4F076D78-2AA4-42B9-7D58-4BA5802D3B14}"/>
+          </ac:picMkLst>
+        </pc:picChg>
+      </pc:sldChg>
+      <pc:sldMasterChg chg="modSp modSldLayout">
+        <pc:chgData name="Bloom PhD, Jesse D" userId="e17e4af4-92ba-4f4f-89d8-f6d4f5501821" providerId="ADAL" clId="{CE44BA01-297F-E041-9FF7-9BC574E0188B}" dt="2023-01-12T16:05:44.782" v="251"/>
+        <pc:sldMasterMkLst>
+          <pc:docMk/>
+          <pc:sldMasterMk cId="2318259227" sldId="2147483708"/>
+        </pc:sldMasterMkLst>
+        <pc:spChg chg="mod">
+          <ac:chgData name="Bloom PhD, Jesse D" userId="e17e4af4-92ba-4f4f-89d8-f6d4f5501821" providerId="ADAL" clId="{CE44BA01-297F-E041-9FF7-9BC574E0188B}" dt="2023-01-12T16:05:44.782" v="251"/>
+          <ac:spMkLst>
+            <pc:docMk/>
+            <pc:sldMasterMk cId="2318259227" sldId="2147483708"/>
+            <ac:spMk id="2" creationId="{00000000-0000-0000-0000-000000000000}"/>
+          </ac:spMkLst>
+        </pc:spChg>
+        <pc:spChg chg="mod">
+          <ac:chgData name="Bloom PhD, Jesse D" userId="e17e4af4-92ba-4f4f-89d8-f6d4f5501821" providerId="ADAL" clId="{CE44BA01-297F-E041-9FF7-9BC574E0188B}" dt="2023-01-12T16:05:44.782" v="251"/>
+          <ac:spMkLst>
+            <pc:docMk/>
+            <pc:sldMasterMk cId="2318259227" sldId="2147483708"/>
+            <ac:spMk id="3" creationId="{00000000-0000-0000-0000-000000000000}"/>
+          </ac:spMkLst>
+        </pc:spChg>
+        <pc:spChg chg="mod">
+          <ac:chgData name="Bloom PhD, Jesse D" userId="e17e4af4-92ba-4f4f-89d8-f6d4f5501821" providerId="ADAL" clId="{CE44BA01-297F-E041-9FF7-9BC574E0188B}" dt="2023-01-12T16:05:44.782" v="251"/>
+          <ac:spMkLst>
+            <pc:docMk/>
+            <pc:sldMasterMk cId="2318259227" sldId="2147483708"/>
+            <ac:spMk id="4" creationId="{00000000-0000-0000-0000-000000000000}"/>
+          </ac:spMkLst>
+        </pc:spChg>
+        <pc:spChg chg="mod">
+          <ac:chgData name="Bloom PhD, Jesse D" userId="e17e4af4-92ba-4f4f-89d8-f6d4f5501821" providerId="ADAL" clId="{CE44BA01-297F-E041-9FF7-9BC574E0188B}" dt="2023-01-12T16:05:44.782" v="251"/>
+          <ac:spMkLst>
+            <pc:docMk/>
+            <pc:sldMasterMk cId="2318259227" sldId="2147483708"/>
+            <ac:spMk id="5" creationId="{00000000-0000-0000-0000-000000000000}"/>
+          </ac:spMkLst>
+        </pc:spChg>
+        <pc:spChg chg="mod">
+          <ac:chgData name="Bloom PhD, Jesse D" userId="e17e4af4-92ba-4f4f-89d8-f6d4f5501821" providerId="ADAL" clId="{CE44BA01-297F-E041-9FF7-9BC574E0188B}" dt="2023-01-12T16:05:44.782" v="251"/>
+          <ac:spMkLst>
+            <pc:docMk/>
+            <pc:sldMasterMk cId="2318259227" sldId="2147483708"/>
+            <ac:spMk id="6" creationId="{00000000-0000-0000-0000-000000000000}"/>
+          </ac:spMkLst>
+        </pc:spChg>
+        <pc:sldLayoutChg chg="modSp">
+          <pc:chgData name="Bloom PhD, Jesse D" userId="e17e4af4-92ba-4f4f-89d8-f6d4f5501821" providerId="ADAL" clId="{CE44BA01-297F-E041-9FF7-9BC574E0188B}" dt="2023-01-12T16:05:44.782" v="251"/>
+          <pc:sldLayoutMkLst>
+            <pc:docMk/>
+            <pc:sldMasterMk cId="2318259227" sldId="2147483708"/>
+            <pc:sldLayoutMk cId="1182136511" sldId="2147483709"/>
+          </pc:sldLayoutMkLst>
+          <pc:spChg chg="mod">
+            <ac:chgData name="Bloom PhD, Jesse D" userId="e17e4af4-92ba-4f4f-89d8-f6d4f5501821" providerId="ADAL" clId="{CE44BA01-297F-E041-9FF7-9BC574E0188B}" dt="2023-01-12T16:05:44.782" v="251"/>
+            <ac:spMkLst>
+              <pc:docMk/>
+              <pc:sldMasterMk cId="2318259227" sldId="2147483708"/>
+              <pc:sldLayoutMk cId="1182136511" sldId="2147483709"/>
+              <ac:spMk id="2" creationId="{00000000-0000-0000-0000-000000000000}"/>
+            </ac:spMkLst>
+          </pc:spChg>
+          <pc:spChg chg="mod">
+            <ac:chgData name="Bloom PhD, Jesse D" userId="e17e4af4-92ba-4f4f-89d8-f6d4f5501821" providerId="ADAL" clId="{CE44BA01-297F-E041-9FF7-9BC574E0188B}" dt="2023-01-12T16:05:44.782" v="251"/>
+            <ac:spMkLst>
+              <pc:docMk/>
+              <pc:sldMasterMk cId="2318259227" sldId="2147483708"/>
+              <pc:sldLayoutMk cId="1182136511" sldId="2147483709"/>
+              <ac:spMk id="3" creationId="{00000000-0000-0000-0000-000000000000}"/>
+            </ac:spMkLst>
+          </pc:spChg>
+        </pc:sldLayoutChg>
+        <pc:sldLayoutChg chg="modSp">
+          <pc:chgData name="Bloom PhD, Jesse D" userId="e17e4af4-92ba-4f4f-89d8-f6d4f5501821" providerId="ADAL" clId="{CE44BA01-297F-E041-9FF7-9BC574E0188B}" dt="2023-01-12T16:05:44.782" v="251"/>
+          <pc:sldLayoutMkLst>
+            <pc:docMk/>
+            <pc:sldMasterMk cId="2318259227" sldId="2147483708"/>
+            <pc:sldLayoutMk cId="4265022949" sldId="2147483711"/>
+          </pc:sldLayoutMkLst>
+          <pc:spChg chg="mod">
+            <ac:chgData name="Bloom PhD, Jesse D" userId="e17e4af4-92ba-4f4f-89d8-f6d4f5501821" providerId="ADAL" clId="{CE44BA01-297F-E041-9FF7-9BC574E0188B}" dt="2023-01-12T16:05:44.782" v="251"/>
+            <ac:spMkLst>
+              <pc:docMk/>
+              <pc:sldMasterMk cId="2318259227" sldId="2147483708"/>
+              <pc:sldLayoutMk cId="4265022949" sldId="2147483711"/>
+              <ac:spMk id="2" creationId="{00000000-0000-0000-0000-000000000000}"/>
+            </ac:spMkLst>
+          </pc:spChg>
+          <pc:spChg chg="mod">
+            <ac:chgData name="Bloom PhD, Jesse D" userId="e17e4af4-92ba-4f4f-89d8-f6d4f5501821" providerId="ADAL" clId="{CE44BA01-297F-E041-9FF7-9BC574E0188B}" dt="2023-01-12T16:05:44.782" v="251"/>
+            <ac:spMkLst>
+              <pc:docMk/>
+              <pc:sldMasterMk cId="2318259227" sldId="2147483708"/>
+              <pc:sldLayoutMk cId="4265022949" sldId="2147483711"/>
+              <ac:spMk id="3" creationId="{00000000-0000-0000-0000-000000000000}"/>
+            </ac:spMkLst>
+          </pc:spChg>
+        </pc:sldLayoutChg>
+        <pc:sldLayoutChg chg="modSp">
+          <pc:chgData name="Bloom PhD, Jesse D" userId="e17e4af4-92ba-4f4f-89d8-f6d4f5501821" providerId="ADAL" clId="{CE44BA01-297F-E041-9FF7-9BC574E0188B}" dt="2023-01-12T16:05:44.782" v="251"/>
+          <pc:sldLayoutMkLst>
+            <pc:docMk/>
+            <pc:sldMasterMk cId="2318259227" sldId="2147483708"/>
+            <pc:sldLayoutMk cId="1611463938" sldId="2147483712"/>
+          </pc:sldLayoutMkLst>
+          <pc:spChg chg="mod">
+            <ac:chgData name="Bloom PhD, Jesse D" userId="e17e4af4-92ba-4f4f-89d8-f6d4f5501821" providerId="ADAL" clId="{CE44BA01-297F-E041-9FF7-9BC574E0188B}" dt="2023-01-12T16:05:44.782" v="251"/>
+            <ac:spMkLst>
+              <pc:docMk/>
+              <pc:sldMasterMk cId="2318259227" sldId="2147483708"/>
+              <pc:sldLayoutMk cId="1611463938" sldId="2147483712"/>
+              <ac:spMk id="3" creationId="{00000000-0000-0000-0000-000000000000}"/>
+            </ac:spMkLst>
+          </pc:spChg>
+          <pc:spChg chg="mod">
+            <ac:chgData name="Bloom PhD, Jesse D" userId="e17e4af4-92ba-4f4f-89d8-f6d4f5501821" providerId="ADAL" clId="{CE44BA01-297F-E041-9FF7-9BC574E0188B}" dt="2023-01-12T16:05:44.782" v="251"/>
+            <ac:spMkLst>
+              <pc:docMk/>
+              <pc:sldMasterMk cId="2318259227" sldId="2147483708"/>
+              <pc:sldLayoutMk cId="1611463938" sldId="2147483712"/>
+              <ac:spMk id="4" creationId="{00000000-0000-0000-0000-000000000000}"/>
+            </ac:spMkLst>
+          </pc:spChg>
+        </pc:sldLayoutChg>
+        <pc:sldLayoutChg chg="modSp">
+          <pc:chgData name="Bloom PhD, Jesse D" userId="e17e4af4-92ba-4f4f-89d8-f6d4f5501821" providerId="ADAL" clId="{CE44BA01-297F-E041-9FF7-9BC574E0188B}" dt="2023-01-12T16:05:44.782" v="251"/>
+          <pc:sldLayoutMkLst>
+            <pc:docMk/>
+            <pc:sldMasterMk cId="2318259227" sldId="2147483708"/>
+            <pc:sldLayoutMk cId="2063001953" sldId="2147483713"/>
+          </pc:sldLayoutMkLst>
+          <pc:spChg chg="mod">
+            <ac:chgData name="Bloom PhD, Jesse D" userId="e17e4af4-92ba-4f4f-89d8-f6d4f5501821" providerId="ADAL" clId="{CE44BA01-297F-E041-9FF7-9BC574E0188B}" dt="2023-01-12T16:05:44.782" v="251"/>
+            <ac:spMkLst>
+              <pc:docMk/>
+              <pc:sldMasterMk cId="2318259227" sldId="2147483708"/>
+              <pc:sldLayoutMk cId="2063001953" sldId="2147483713"/>
+              <ac:spMk id="2" creationId="{00000000-0000-0000-0000-000000000000}"/>
+            </ac:spMkLst>
+          </pc:spChg>
+          <pc:spChg chg="mod">
+            <ac:chgData name="Bloom PhD, Jesse D" userId="e17e4af4-92ba-4f4f-89d8-f6d4f5501821" providerId="ADAL" clId="{CE44BA01-297F-E041-9FF7-9BC574E0188B}" dt="2023-01-12T16:05:44.782" v="251"/>
+            <ac:spMkLst>
+              <pc:docMk/>
+              <pc:sldMasterMk cId="2318259227" sldId="2147483708"/>
+              <pc:sldLayoutMk cId="2063001953" sldId="2147483713"/>
+              <ac:spMk id="3" creationId="{00000000-0000-0000-0000-000000000000}"/>
+            </ac:spMkLst>
+          </pc:spChg>
+          <pc:spChg chg="mod">
+            <ac:chgData name="Bloom PhD, Jesse D" userId="e17e4af4-92ba-4f4f-89d8-f6d4f5501821" providerId="ADAL" clId="{CE44BA01-297F-E041-9FF7-9BC574E0188B}" dt="2023-01-12T16:05:44.782" v="251"/>
+            <ac:spMkLst>
+              <pc:docMk/>
+              <pc:sldMasterMk cId="2318259227" sldId="2147483708"/>
+              <pc:sldLayoutMk cId="2063001953" sldId="2147483713"/>
+              <ac:spMk id="4" creationId="{00000000-0000-0000-0000-000000000000}"/>
+            </ac:spMkLst>
+          </pc:spChg>
+          <pc:spChg chg="mod">
+            <ac:chgData name="Bloom PhD, Jesse D" userId="e17e4af4-92ba-4f4f-89d8-f6d4f5501821" providerId="ADAL" clId="{CE44BA01-297F-E041-9FF7-9BC574E0188B}" dt="2023-01-12T16:05:44.782" v="251"/>
+            <ac:spMkLst>
+              <pc:docMk/>
+              <pc:sldMasterMk cId="2318259227" sldId="2147483708"/>
+              <pc:sldLayoutMk cId="2063001953" sldId="2147483713"/>
+              <ac:spMk id="5" creationId="{00000000-0000-0000-0000-000000000000}"/>
+            </ac:spMkLst>
+          </pc:spChg>
+          <pc:spChg chg="mod">
+            <ac:chgData name="Bloom PhD, Jesse D" userId="e17e4af4-92ba-4f4f-89d8-f6d4f5501821" providerId="ADAL" clId="{CE44BA01-297F-E041-9FF7-9BC574E0188B}" dt="2023-01-12T16:05:44.782" v="251"/>
+            <ac:spMkLst>
+              <pc:docMk/>
+              <pc:sldMasterMk cId="2318259227" sldId="2147483708"/>
+              <pc:sldLayoutMk cId="2063001953" sldId="2147483713"/>
+              <ac:spMk id="6" creationId="{00000000-0000-0000-0000-000000000000}"/>
+            </ac:spMkLst>
+          </pc:spChg>
+        </pc:sldLayoutChg>
+        <pc:sldLayoutChg chg="modSp">
+          <pc:chgData name="Bloom PhD, Jesse D" userId="e17e4af4-92ba-4f4f-89d8-f6d4f5501821" providerId="ADAL" clId="{CE44BA01-297F-E041-9FF7-9BC574E0188B}" dt="2023-01-12T16:05:44.782" v="251"/>
+          <pc:sldLayoutMkLst>
+            <pc:docMk/>
+            <pc:sldMasterMk cId="2318259227" sldId="2147483708"/>
+            <pc:sldLayoutMk cId="3949816901" sldId="2147483716"/>
+          </pc:sldLayoutMkLst>
+          <pc:spChg chg="mod">
+            <ac:chgData name="Bloom PhD, Jesse D" userId="e17e4af4-92ba-4f4f-89d8-f6d4f5501821" providerId="ADAL" clId="{CE44BA01-297F-E041-9FF7-9BC574E0188B}" dt="2023-01-12T16:05:44.782" v="251"/>
+            <ac:spMkLst>
+              <pc:docMk/>
+              <pc:sldMasterMk cId="2318259227" sldId="2147483708"/>
+              <pc:sldLayoutMk cId="3949816901" sldId="2147483716"/>
+              <ac:spMk id="2" creationId="{00000000-0000-0000-0000-000000000000}"/>
+            </ac:spMkLst>
+          </pc:spChg>
+          <pc:spChg chg="mod">
+            <ac:chgData name="Bloom PhD, Jesse D" userId="e17e4af4-92ba-4f4f-89d8-f6d4f5501821" providerId="ADAL" clId="{CE44BA01-297F-E041-9FF7-9BC574E0188B}" dt="2023-01-12T16:05:44.782" v="251"/>
+            <ac:spMkLst>
+              <pc:docMk/>
+              <pc:sldMasterMk cId="2318259227" sldId="2147483708"/>
+              <pc:sldLayoutMk cId="3949816901" sldId="2147483716"/>
+              <ac:spMk id="3" creationId="{00000000-0000-0000-0000-000000000000}"/>
+            </ac:spMkLst>
+          </pc:spChg>
+          <pc:spChg chg="mod">
+            <ac:chgData name="Bloom PhD, Jesse D" userId="e17e4af4-92ba-4f4f-89d8-f6d4f5501821" providerId="ADAL" clId="{CE44BA01-297F-E041-9FF7-9BC574E0188B}" dt="2023-01-12T16:05:44.782" v="251"/>
+            <ac:spMkLst>
+              <pc:docMk/>
+              <pc:sldMasterMk cId="2318259227" sldId="2147483708"/>
+              <pc:sldLayoutMk cId="3949816901" sldId="2147483716"/>
+              <ac:spMk id="4" creationId="{00000000-0000-0000-0000-000000000000}"/>
+            </ac:spMkLst>
+          </pc:spChg>
+        </pc:sldLayoutChg>
+        <pc:sldLayoutChg chg="modSp">
+          <pc:chgData name="Bloom PhD, Jesse D" userId="e17e4af4-92ba-4f4f-89d8-f6d4f5501821" providerId="ADAL" clId="{CE44BA01-297F-E041-9FF7-9BC574E0188B}" dt="2023-01-12T16:05:44.782" v="251"/>
+          <pc:sldLayoutMkLst>
+            <pc:docMk/>
+            <pc:sldMasterMk cId="2318259227" sldId="2147483708"/>
+            <pc:sldLayoutMk cId="2588406395" sldId="2147483717"/>
+          </pc:sldLayoutMkLst>
+          <pc:spChg chg="mod">
+            <ac:chgData name="Bloom PhD, Jesse D" userId="e17e4af4-92ba-4f4f-89d8-f6d4f5501821" providerId="ADAL" clId="{CE44BA01-297F-E041-9FF7-9BC574E0188B}" dt="2023-01-12T16:05:44.782" v="251"/>
+            <ac:spMkLst>
+              <pc:docMk/>
+              <pc:sldMasterMk cId="2318259227" sldId="2147483708"/>
+              <pc:sldLayoutMk cId="2588406395" sldId="2147483717"/>
+              <ac:spMk id="2" creationId="{00000000-0000-0000-0000-000000000000}"/>
+            </ac:spMkLst>
+          </pc:spChg>
+          <pc:spChg chg="mod">
+            <ac:chgData name="Bloom PhD, Jesse D" userId="e17e4af4-92ba-4f4f-89d8-f6d4f5501821" providerId="ADAL" clId="{CE44BA01-297F-E041-9FF7-9BC574E0188B}" dt="2023-01-12T16:05:44.782" v="251"/>
+            <ac:spMkLst>
+              <pc:docMk/>
+              <pc:sldMasterMk cId="2318259227" sldId="2147483708"/>
+              <pc:sldLayoutMk cId="2588406395" sldId="2147483717"/>
+              <ac:spMk id="3" creationId="{00000000-0000-0000-0000-000000000000}"/>
+            </ac:spMkLst>
+          </pc:spChg>
+          <pc:spChg chg="mod">
+            <ac:chgData name="Bloom PhD, Jesse D" userId="e17e4af4-92ba-4f4f-89d8-f6d4f5501821" providerId="ADAL" clId="{CE44BA01-297F-E041-9FF7-9BC574E0188B}" dt="2023-01-12T16:05:44.782" v="251"/>
+            <ac:spMkLst>
+              <pc:docMk/>
+              <pc:sldMasterMk cId="2318259227" sldId="2147483708"/>
+              <pc:sldLayoutMk cId="2588406395" sldId="2147483717"/>
+              <ac:spMk id="4" creationId="{00000000-0000-0000-0000-000000000000}"/>
+            </ac:spMkLst>
+          </pc:spChg>
+        </pc:sldLayoutChg>
+        <pc:sldLayoutChg chg="modSp">
+          <pc:chgData name="Bloom PhD, Jesse D" userId="e17e4af4-92ba-4f4f-89d8-f6d4f5501821" providerId="ADAL" clId="{CE44BA01-297F-E041-9FF7-9BC574E0188B}" dt="2023-01-12T16:05:44.782" v="251"/>
+          <pc:sldLayoutMkLst>
+            <pc:docMk/>
+            <pc:sldMasterMk cId="2318259227" sldId="2147483708"/>
+            <pc:sldLayoutMk cId="4243814793" sldId="2147483719"/>
+          </pc:sldLayoutMkLst>
+          <pc:spChg chg="mod">
+            <ac:chgData name="Bloom PhD, Jesse D" userId="e17e4af4-92ba-4f4f-89d8-f6d4f5501821" providerId="ADAL" clId="{CE44BA01-297F-E041-9FF7-9BC574E0188B}" dt="2023-01-12T16:05:44.782" v="251"/>
+            <ac:spMkLst>
+              <pc:docMk/>
+              <pc:sldMasterMk cId="2318259227" sldId="2147483708"/>
+              <pc:sldLayoutMk cId="4243814793" sldId="2147483719"/>
+              <ac:spMk id="2" creationId="{00000000-0000-0000-0000-000000000000}"/>
+            </ac:spMkLst>
+          </pc:spChg>
+          <pc:spChg chg="mod">
+            <ac:chgData name="Bloom PhD, Jesse D" userId="e17e4af4-92ba-4f4f-89d8-f6d4f5501821" providerId="ADAL" clId="{CE44BA01-297F-E041-9FF7-9BC574E0188B}" dt="2023-01-12T16:05:44.782" v="251"/>
+            <ac:spMkLst>
+              <pc:docMk/>
+              <pc:sldMasterMk cId="2318259227" sldId="2147483708"/>
+              <pc:sldLayoutMk cId="4243814793" sldId="2147483719"/>
+              <ac:spMk id="3" creationId="{00000000-0000-0000-0000-000000000000}"/>
+            </ac:spMkLst>
+          </pc:spChg>
+        </pc:sldLayoutChg>
+      </pc:sldMasterChg>
+      <pc:sldMasterChg chg="modSp modSldLayout">
+        <pc:chgData name="Bloom PhD, Jesse D" userId="e17e4af4-92ba-4f4f-89d8-f6d4f5501821" providerId="ADAL" clId="{CE44BA01-297F-E041-9FF7-9BC574E0188B}" dt="2023-01-12T16:06:22.150" v="255"/>
+        <pc:sldMasterMkLst>
+          <pc:docMk/>
+          <pc:sldMasterMk cId="82227348" sldId="2147483720"/>
+        </pc:sldMasterMkLst>
+        <pc:spChg chg="mod">
+          <ac:chgData name="Bloom PhD, Jesse D" userId="e17e4af4-92ba-4f4f-89d8-f6d4f5501821" providerId="ADAL" clId="{CE44BA01-297F-E041-9FF7-9BC574E0188B}" dt="2023-01-12T16:06:22.150" v="255"/>
+          <ac:spMkLst>
+            <pc:docMk/>
+            <pc:sldMasterMk cId="82227348" sldId="2147483720"/>
+            <ac:spMk id="2" creationId="{00000000-0000-0000-0000-000000000000}"/>
+          </ac:spMkLst>
+        </pc:spChg>
+        <pc:spChg chg="mod">
+          <ac:chgData name="Bloom PhD, Jesse D" userId="e17e4af4-92ba-4f4f-89d8-f6d4f5501821" providerId="ADAL" clId="{CE44BA01-297F-E041-9FF7-9BC574E0188B}" dt="2023-01-12T16:06:22.150" v="255"/>
+          <ac:spMkLst>
+            <pc:docMk/>
+            <pc:sldMasterMk cId="82227348" sldId="2147483720"/>
+            <ac:spMk id="3" creationId="{00000000-0000-0000-0000-000000000000}"/>
+          </ac:spMkLst>
+        </pc:spChg>
+        <pc:spChg chg="mod">
+          <ac:chgData name="Bloom PhD, Jesse D" userId="e17e4af4-92ba-4f4f-89d8-f6d4f5501821" providerId="ADAL" clId="{CE44BA01-297F-E041-9FF7-9BC574E0188B}" dt="2023-01-12T16:06:22.150" v="255"/>
+          <ac:spMkLst>
+            <pc:docMk/>
+            <pc:sldMasterMk cId="82227348" sldId="2147483720"/>
+            <ac:spMk id="4" creationId="{00000000-0000-0000-0000-000000000000}"/>
+          </ac:spMkLst>
+        </pc:spChg>
+        <pc:spChg chg="mod">
+          <ac:chgData name="Bloom PhD, Jesse D" userId="e17e4af4-92ba-4f4f-89d8-f6d4f5501821" providerId="ADAL" clId="{CE44BA01-297F-E041-9FF7-9BC574E0188B}" dt="2023-01-12T16:06:22.150" v="255"/>
+          <ac:spMkLst>
+            <pc:docMk/>
+            <pc:sldMasterMk cId="82227348" sldId="2147483720"/>
+            <ac:spMk id="5" creationId="{00000000-0000-0000-0000-000000000000}"/>
+          </ac:spMkLst>
+        </pc:spChg>
+        <pc:spChg chg="mod">
+          <ac:chgData name="Bloom PhD, Jesse D" userId="e17e4af4-92ba-4f4f-89d8-f6d4f5501821" providerId="ADAL" clId="{CE44BA01-297F-E041-9FF7-9BC574E0188B}" dt="2023-01-12T16:06:22.150" v="255"/>
+          <ac:spMkLst>
+            <pc:docMk/>
+            <pc:sldMasterMk cId="82227348" sldId="2147483720"/>
+            <ac:spMk id="6" creationId="{00000000-0000-0000-0000-000000000000}"/>
+          </ac:spMkLst>
+        </pc:spChg>
+        <pc:sldLayoutChg chg="modSp">
+          <pc:chgData name="Bloom PhD, Jesse D" userId="e17e4af4-92ba-4f4f-89d8-f6d4f5501821" providerId="ADAL" clId="{CE44BA01-297F-E041-9FF7-9BC574E0188B}" dt="2023-01-12T16:06:22.150" v="255"/>
+          <pc:sldLayoutMkLst>
+            <pc:docMk/>
+            <pc:sldMasterMk cId="82227348" sldId="2147483720"/>
+            <pc:sldLayoutMk cId="4220557438" sldId="2147483721"/>
+          </pc:sldLayoutMkLst>
+          <pc:spChg chg="mod">
+            <ac:chgData name="Bloom PhD, Jesse D" userId="e17e4af4-92ba-4f4f-89d8-f6d4f5501821" providerId="ADAL" clId="{CE44BA01-297F-E041-9FF7-9BC574E0188B}" dt="2023-01-12T16:06:22.150" v="255"/>
+            <ac:spMkLst>
+              <pc:docMk/>
+              <pc:sldMasterMk cId="82227348" sldId="2147483720"/>
+              <pc:sldLayoutMk cId="4220557438" sldId="2147483721"/>
+              <ac:spMk id="2" creationId="{00000000-0000-0000-0000-000000000000}"/>
+            </ac:spMkLst>
+          </pc:spChg>
+          <pc:spChg chg="mod">
+            <ac:chgData name="Bloom PhD, Jesse D" userId="e17e4af4-92ba-4f4f-89d8-f6d4f5501821" providerId="ADAL" clId="{CE44BA01-297F-E041-9FF7-9BC574E0188B}" dt="2023-01-12T16:06:22.150" v="255"/>
+            <ac:spMkLst>
+              <pc:docMk/>
+              <pc:sldMasterMk cId="82227348" sldId="2147483720"/>
+              <pc:sldLayoutMk cId="4220557438" sldId="2147483721"/>
+              <ac:spMk id="3" creationId="{00000000-0000-0000-0000-000000000000}"/>
+            </ac:spMkLst>
+          </pc:spChg>
+        </pc:sldLayoutChg>
+        <pc:sldLayoutChg chg="modSp">
+          <pc:chgData name="Bloom PhD, Jesse D" userId="e17e4af4-92ba-4f4f-89d8-f6d4f5501821" providerId="ADAL" clId="{CE44BA01-297F-E041-9FF7-9BC574E0188B}" dt="2023-01-12T16:06:22.150" v="255"/>
+          <pc:sldLayoutMkLst>
+            <pc:docMk/>
+            <pc:sldMasterMk cId="82227348" sldId="2147483720"/>
+            <pc:sldLayoutMk cId="2216405385" sldId="2147483723"/>
+          </pc:sldLayoutMkLst>
+          <pc:spChg chg="mod">
+            <ac:chgData name="Bloom PhD, Jesse D" userId="e17e4af4-92ba-4f4f-89d8-f6d4f5501821" providerId="ADAL" clId="{CE44BA01-297F-E041-9FF7-9BC574E0188B}" dt="2023-01-12T16:06:22.150" v="255"/>
+            <ac:spMkLst>
+              <pc:docMk/>
+              <pc:sldMasterMk cId="82227348" sldId="2147483720"/>
+              <pc:sldLayoutMk cId="2216405385" sldId="2147483723"/>
+              <ac:spMk id="2" creationId="{00000000-0000-0000-0000-000000000000}"/>
+            </ac:spMkLst>
+          </pc:spChg>
+          <pc:spChg chg="mod">
+            <ac:chgData name="Bloom PhD, Jesse D" userId="e17e4af4-92ba-4f4f-89d8-f6d4f5501821" providerId="ADAL" clId="{CE44BA01-297F-E041-9FF7-9BC574E0188B}" dt="2023-01-12T16:06:22.150" v="255"/>
+            <ac:spMkLst>
+              <pc:docMk/>
+              <pc:sldMasterMk cId="82227348" sldId="2147483720"/>
+              <pc:sldLayoutMk cId="2216405385" sldId="2147483723"/>
+              <ac:spMk id="3" creationId="{00000000-0000-0000-0000-000000000000}"/>
+            </ac:spMkLst>
+          </pc:spChg>
+        </pc:sldLayoutChg>
+        <pc:sldLayoutChg chg="modSp">
+          <pc:chgData name="Bloom PhD, Jesse D" userId="e17e4af4-92ba-4f4f-89d8-f6d4f5501821" providerId="ADAL" clId="{CE44BA01-297F-E041-9FF7-9BC574E0188B}" dt="2023-01-12T16:06:22.150" v="255"/>
+          <pc:sldLayoutMkLst>
+            <pc:docMk/>
+            <pc:sldMasterMk cId="82227348" sldId="2147483720"/>
+            <pc:sldLayoutMk cId="273451330" sldId="2147483724"/>
+          </pc:sldLayoutMkLst>
+          <pc:spChg chg="mod">
+            <ac:chgData name="Bloom PhD, Jesse D" userId="e17e4af4-92ba-4f4f-89d8-f6d4f5501821" providerId="ADAL" clId="{CE44BA01-297F-E041-9FF7-9BC574E0188B}" dt="2023-01-12T16:06:22.150" v="255"/>
+            <ac:spMkLst>
+              <pc:docMk/>
+              <pc:sldMasterMk cId="82227348" sldId="2147483720"/>
+              <pc:sldLayoutMk cId="273451330" sldId="2147483724"/>
+              <ac:spMk id="3" creationId="{00000000-0000-0000-0000-000000000000}"/>
+            </ac:spMkLst>
+          </pc:spChg>
+          <pc:spChg chg="mod">
+            <ac:chgData name="Bloom PhD, Jesse D" userId="e17e4af4-92ba-4f4f-89d8-f6d4f5501821" providerId="ADAL" clId="{CE44BA01-297F-E041-9FF7-9BC574E0188B}" dt="2023-01-12T16:06:22.150" v="255"/>
+            <ac:spMkLst>
+              <pc:docMk/>
+              <pc:sldMasterMk cId="82227348" sldId="2147483720"/>
+              <pc:sldLayoutMk cId="273451330" sldId="2147483724"/>
+              <ac:spMk id="4" creationId="{00000000-0000-0000-0000-000000000000}"/>
+            </ac:spMkLst>
+          </pc:spChg>
+        </pc:sldLayoutChg>
+        <pc:sldLayoutChg chg="modSp">
+          <pc:chgData name="Bloom PhD, Jesse D" userId="e17e4af4-92ba-4f4f-89d8-f6d4f5501821" providerId="ADAL" clId="{CE44BA01-297F-E041-9FF7-9BC574E0188B}" dt="2023-01-12T16:06:22.150" v="255"/>
+          <pc:sldLayoutMkLst>
+            <pc:docMk/>
+            <pc:sldMasterMk cId="82227348" sldId="2147483720"/>
+            <pc:sldLayoutMk cId="2191834422" sldId="2147483725"/>
+          </pc:sldLayoutMkLst>
+          <pc:spChg chg="mod">
+            <ac:chgData name="Bloom PhD, Jesse D" userId="e17e4af4-92ba-4f4f-89d8-f6d4f5501821" providerId="ADAL" clId="{CE44BA01-297F-E041-9FF7-9BC574E0188B}" dt="2023-01-12T16:06:22.150" v="255"/>
+            <ac:spMkLst>
+              <pc:docMk/>
+              <pc:sldMasterMk cId="82227348" sldId="2147483720"/>
+              <pc:sldLayoutMk cId="2191834422" sldId="2147483725"/>
+              <ac:spMk id="2" creationId="{00000000-0000-0000-0000-000000000000}"/>
+            </ac:spMkLst>
+          </pc:spChg>
+          <pc:spChg chg="mod">
+            <ac:chgData name="Bloom PhD, Jesse D" userId="e17e4af4-92ba-4f4f-89d8-f6d4f5501821" providerId="ADAL" clId="{CE44BA01-297F-E041-9FF7-9BC574E0188B}" dt="2023-01-12T16:06:22.150" v="255"/>
+            <ac:spMkLst>
+              <pc:docMk/>
+              <pc:sldMasterMk cId="82227348" sldId="2147483720"/>
+              <pc:sldLayoutMk cId="2191834422" sldId="2147483725"/>
+              <ac:spMk id="3" creationId="{00000000-0000-0000-0000-000000000000}"/>
+            </ac:spMkLst>
+          </pc:spChg>
+          <pc:spChg chg="mod">
+            <ac:chgData name="Bloom PhD, Jesse D" userId="e17e4af4-92ba-4f4f-89d8-f6d4f5501821" providerId="ADAL" clId="{CE44BA01-297F-E041-9FF7-9BC574E0188B}" dt="2023-01-12T16:06:22.150" v="255"/>
+            <ac:spMkLst>
+              <pc:docMk/>
+              <pc:sldMasterMk cId="82227348" sldId="2147483720"/>
+              <pc:sldLayoutMk cId="2191834422" sldId="2147483725"/>
+              <ac:spMk id="4" creationId="{00000000-0000-0000-0000-000000000000}"/>
+            </ac:spMkLst>
+          </pc:spChg>
+          <pc:spChg chg="mod">
+            <ac:chgData name="Bloom PhD, Jesse D" userId="e17e4af4-92ba-4f4f-89d8-f6d4f5501821" providerId="ADAL" clId="{CE44BA01-297F-E041-9FF7-9BC574E0188B}" dt="2023-01-12T16:06:22.150" v="255"/>
+            <ac:spMkLst>
+              <pc:docMk/>
+              <pc:sldMasterMk cId="82227348" sldId="2147483720"/>
+              <pc:sldLayoutMk cId="2191834422" sldId="2147483725"/>
+              <ac:spMk id="5" creationId="{00000000-0000-0000-0000-000000000000}"/>
+            </ac:spMkLst>
+          </pc:spChg>
+          <pc:spChg chg="mod">
+            <ac:chgData name="Bloom PhD, Jesse D" userId="e17e4af4-92ba-4f4f-89d8-f6d4f5501821" providerId="ADAL" clId="{CE44BA01-297F-E041-9FF7-9BC574E0188B}" dt="2023-01-12T16:06:22.150" v="255"/>
+            <ac:spMkLst>
+              <pc:docMk/>
+              <pc:sldMasterMk cId="82227348" sldId="2147483720"/>
+              <pc:sldLayoutMk cId="2191834422" sldId="2147483725"/>
+              <ac:spMk id="6" creationId="{00000000-0000-0000-0000-000000000000}"/>
+            </ac:spMkLst>
+          </pc:spChg>
+        </pc:sldLayoutChg>
+        <pc:sldLayoutChg chg="modSp">
+          <pc:chgData name="Bloom PhD, Jesse D" userId="e17e4af4-92ba-4f4f-89d8-f6d4f5501821" providerId="ADAL" clId="{CE44BA01-297F-E041-9FF7-9BC574E0188B}" dt="2023-01-12T16:06:22.150" v="255"/>
+          <pc:sldLayoutMkLst>
+            <pc:docMk/>
+            <pc:sldMasterMk cId="82227348" sldId="2147483720"/>
+            <pc:sldLayoutMk cId="2173305432" sldId="2147483728"/>
+          </pc:sldLayoutMkLst>
+          <pc:spChg chg="mod">
+            <ac:chgData name="Bloom PhD, Jesse D" userId="e17e4af4-92ba-4f4f-89d8-f6d4f5501821" providerId="ADAL" clId="{CE44BA01-297F-E041-9FF7-9BC574E0188B}" dt="2023-01-12T16:06:22.150" v="255"/>
+            <ac:spMkLst>
+              <pc:docMk/>
+              <pc:sldMasterMk cId="82227348" sldId="2147483720"/>
+              <pc:sldLayoutMk cId="2173305432" sldId="2147483728"/>
+              <ac:spMk id="2" creationId="{00000000-0000-0000-0000-000000000000}"/>
+            </ac:spMkLst>
+          </pc:spChg>
+          <pc:spChg chg="mod">
+            <ac:chgData name="Bloom PhD, Jesse D" userId="e17e4af4-92ba-4f4f-89d8-f6d4f5501821" providerId="ADAL" clId="{CE44BA01-297F-E041-9FF7-9BC574E0188B}" dt="2023-01-12T16:06:22.150" v="255"/>
+            <ac:spMkLst>
+              <pc:docMk/>
+              <pc:sldMasterMk cId="82227348" sldId="2147483720"/>
+              <pc:sldLayoutMk cId="2173305432" sldId="2147483728"/>
+              <ac:spMk id="3" creationId="{00000000-0000-0000-0000-000000000000}"/>
+            </ac:spMkLst>
+          </pc:spChg>
+          <pc:spChg chg="mod">
+            <ac:chgData name="Bloom PhD, Jesse D" userId="e17e4af4-92ba-4f4f-89d8-f6d4f5501821" providerId="ADAL" clId="{CE44BA01-297F-E041-9FF7-9BC574E0188B}" dt="2023-01-12T16:06:22.150" v="255"/>
+            <ac:spMkLst>
+              <pc:docMk/>
+              <pc:sldMasterMk cId="82227348" sldId="2147483720"/>
+              <pc:sldLayoutMk cId="2173305432" sldId="2147483728"/>
+              <ac:spMk id="4" creationId="{00000000-0000-0000-0000-000000000000}"/>
+            </ac:spMkLst>
+          </pc:spChg>
+        </pc:sldLayoutChg>
+        <pc:sldLayoutChg chg="modSp">
+          <pc:chgData name="Bloom PhD, Jesse D" userId="e17e4af4-92ba-4f4f-89d8-f6d4f5501821" providerId="ADAL" clId="{CE44BA01-297F-E041-9FF7-9BC574E0188B}" dt="2023-01-12T16:06:22.150" v="255"/>
+          <pc:sldLayoutMkLst>
+            <pc:docMk/>
+            <pc:sldMasterMk cId="82227348" sldId="2147483720"/>
+            <pc:sldLayoutMk cId="2409443649" sldId="2147483729"/>
+          </pc:sldLayoutMkLst>
+          <pc:spChg chg="mod">
+            <ac:chgData name="Bloom PhD, Jesse D" userId="e17e4af4-92ba-4f4f-89d8-f6d4f5501821" providerId="ADAL" clId="{CE44BA01-297F-E041-9FF7-9BC574E0188B}" dt="2023-01-12T16:06:22.150" v="255"/>
+            <ac:spMkLst>
+              <pc:docMk/>
+              <pc:sldMasterMk cId="82227348" sldId="2147483720"/>
+              <pc:sldLayoutMk cId="2409443649" sldId="2147483729"/>
+              <ac:spMk id="2" creationId="{00000000-0000-0000-0000-000000000000}"/>
+            </ac:spMkLst>
+          </pc:spChg>
+          <pc:spChg chg="mod">
+            <ac:chgData name="Bloom PhD, Jesse D" userId="e17e4af4-92ba-4f4f-89d8-f6d4f5501821" providerId="ADAL" clId="{CE44BA01-297F-E041-9FF7-9BC574E0188B}" dt="2023-01-12T16:06:22.150" v="255"/>
+            <ac:spMkLst>
+              <pc:docMk/>
+              <pc:sldMasterMk cId="82227348" sldId="2147483720"/>
+              <pc:sldLayoutMk cId="2409443649" sldId="2147483729"/>
+              <ac:spMk id="3" creationId="{00000000-0000-0000-0000-000000000000}"/>
+            </ac:spMkLst>
+          </pc:spChg>
+          <pc:spChg chg="mod">
+            <ac:chgData name="Bloom PhD, Jesse D" userId="e17e4af4-92ba-4f4f-89d8-f6d4f5501821" providerId="ADAL" clId="{CE44BA01-297F-E041-9FF7-9BC574E0188B}" dt="2023-01-12T16:06:22.150" v="255"/>
+            <ac:spMkLst>
+              <pc:docMk/>
+              <pc:sldMasterMk cId="82227348" sldId="2147483720"/>
+              <pc:sldLayoutMk cId="2409443649" sldId="2147483729"/>
+              <ac:spMk id="4" creationId="{00000000-0000-0000-0000-000000000000}"/>
+            </ac:spMkLst>
+          </pc:spChg>
+        </pc:sldLayoutChg>
+        <pc:sldLayoutChg chg="modSp">
+          <pc:chgData name="Bloom PhD, Jesse D" userId="e17e4af4-92ba-4f4f-89d8-f6d4f5501821" providerId="ADAL" clId="{CE44BA01-297F-E041-9FF7-9BC574E0188B}" dt="2023-01-12T16:06:22.150" v="255"/>
+          <pc:sldLayoutMkLst>
+            <pc:docMk/>
+            <pc:sldMasterMk cId="82227348" sldId="2147483720"/>
+            <pc:sldLayoutMk cId="127532751" sldId="2147483731"/>
+          </pc:sldLayoutMkLst>
+          <pc:spChg chg="mod">
+            <ac:chgData name="Bloom PhD, Jesse D" userId="e17e4af4-92ba-4f4f-89d8-f6d4f5501821" providerId="ADAL" clId="{CE44BA01-297F-E041-9FF7-9BC574E0188B}" dt="2023-01-12T16:06:22.150" v="255"/>
+            <ac:spMkLst>
+              <pc:docMk/>
+              <pc:sldMasterMk cId="82227348" sldId="2147483720"/>
+              <pc:sldLayoutMk cId="127532751" sldId="2147483731"/>
+              <ac:spMk id="2" creationId="{00000000-0000-0000-0000-000000000000}"/>
+            </ac:spMkLst>
+          </pc:spChg>
+          <pc:spChg chg="mod">
+            <ac:chgData name="Bloom PhD, Jesse D" userId="e17e4af4-92ba-4f4f-89d8-f6d4f5501821" providerId="ADAL" clId="{CE44BA01-297F-E041-9FF7-9BC574E0188B}" dt="2023-01-12T16:06:22.150" v="255"/>
+            <ac:spMkLst>
+              <pc:docMk/>
+              <pc:sldMasterMk cId="82227348" sldId="2147483720"/>
+              <pc:sldLayoutMk cId="127532751" sldId="2147483731"/>
+              <ac:spMk id="3" creationId="{00000000-0000-0000-0000-000000000000}"/>
+            </ac:spMkLst>
+          </pc:spChg>
+        </pc:sldLayoutChg>
+      </pc:sldMasterChg>
+    </pc:docChg>
+  </pc:docChgLst>
+</pc:chgInfo>
+</file>
+
 <file path=ppt/slideLayouts/slideLayout1.xml><?xml version="1.0" encoding="utf-8"?>
 <p:sldLayout xmlns:a="http://schemas.openxmlformats.org/drawingml/2006/main" xmlns:r="http://schemas.openxmlformats.org/officeDocument/2006/relationships" xmlns:p="http://schemas.openxmlformats.org/presentationml/2006/main" type="title" preserve="1">
   <p:cSld name="Title Slide">
@@ -141,8 +1342,8 @@
         </p:nvSpPr>
         <p:spPr>
           <a:xfrm>
-            <a:off x="2148880" y="1346836"/>
-            <a:ext cx="12893279" cy="2865120"/>
+            <a:off x="1874441" y="1346836"/>
+            <a:ext cx="11246644" cy="2865120"/>
           </a:xfrm>
         </p:spPr>
         <p:txBody>
@@ -173,8 +1374,8 @@
         </p:nvSpPr>
         <p:spPr>
           <a:xfrm>
-            <a:off x="2148880" y="4322446"/>
-            <a:ext cx="12893279" cy="1986914"/>
+            <a:off x="1874441" y="4322446"/>
+            <a:ext cx="11246644" cy="1986914"/>
           </a:xfrm>
         </p:spPr>
         <p:txBody>
@@ -243,7 +1444,7 @@
           <a:p>
             <a:fld id="{4328B3F3-4A5C-9B4D-BC73-E009D96FB836}" type="datetimeFigureOut">
               <a:rPr lang="en-US" smtClean="0"/>
-              <a:t>1/11/23</a:t>
+              <a:t>1/12/23</a:t>
             </a:fld>
             <a:endParaRPr lang="en-US" dirty="0"/>
           </a:p>
@@ -294,7 +1495,7 @@
     </p:spTree>
     <p:extLst>
       <p:ext uri="{BB962C8B-B14F-4D97-AF65-F5344CB8AC3E}">
-        <p14:creationId xmlns:p14="http://schemas.microsoft.com/office/powerpoint/2010/main" val="1182136511"/>
+        <p14:creationId xmlns:p14="http://schemas.microsoft.com/office/powerpoint/2010/main" val="742990407"/>
       </p:ext>
     </p:extLst>
   </p:cSld>
@@ -413,7 +1614,7 @@
           <a:p>
             <a:fld id="{4328B3F3-4A5C-9B4D-BC73-E009D96FB836}" type="datetimeFigureOut">
               <a:rPr lang="en-US" smtClean="0"/>
-              <a:t>1/11/23</a:t>
+              <a:t>1/12/23</a:t>
             </a:fld>
             <a:endParaRPr lang="en-US" dirty="0"/>
           </a:p>
@@ -464,7 +1665,7 @@
     </p:spTree>
     <p:extLst>
       <p:ext uri="{BB962C8B-B14F-4D97-AF65-F5344CB8AC3E}">
-        <p14:creationId xmlns:p14="http://schemas.microsoft.com/office/powerpoint/2010/main" val="1365846911"/>
+        <p14:creationId xmlns:p14="http://schemas.microsoft.com/office/powerpoint/2010/main" val="3703382925"/>
       </p:ext>
     </p:extLst>
   </p:cSld>
@@ -503,8 +1704,8 @@
         </p:nvSpPr>
         <p:spPr>
           <a:xfrm>
-            <a:off x="12302336" y="438150"/>
-            <a:ext cx="3706818" cy="6974206"/>
+            <a:off x="10731173" y="438150"/>
+            <a:ext cx="3233410" cy="6974206"/>
           </a:xfrm>
         </p:spPr>
         <p:txBody>
@@ -531,8 +1732,8 @@
         </p:nvSpPr>
         <p:spPr>
           <a:xfrm>
-            <a:off x="1181884" y="438150"/>
-            <a:ext cx="10905565" cy="6974206"/>
+            <a:off x="1030942" y="438150"/>
+            <a:ext cx="9512786" cy="6974206"/>
           </a:xfrm>
         </p:spPr>
         <p:txBody>
@@ -593,7 +1794,7 @@
           <a:p>
             <a:fld id="{4328B3F3-4A5C-9B4D-BC73-E009D96FB836}" type="datetimeFigureOut">
               <a:rPr lang="en-US" smtClean="0"/>
-              <a:t>1/11/23</a:t>
+              <a:t>1/12/23</a:t>
             </a:fld>
             <a:endParaRPr lang="en-US" dirty="0"/>
           </a:p>
@@ -644,7 +1845,7 @@
     </p:spTree>
     <p:extLst>
       <p:ext uri="{BB962C8B-B14F-4D97-AF65-F5344CB8AC3E}">
-        <p14:creationId xmlns:p14="http://schemas.microsoft.com/office/powerpoint/2010/main" val="4243814793"/>
+        <p14:creationId xmlns:p14="http://schemas.microsoft.com/office/powerpoint/2010/main" val="155700740"/>
       </p:ext>
     </p:extLst>
   </p:cSld>
@@ -763,7 +1964,7 @@
           <a:p>
             <a:fld id="{4328B3F3-4A5C-9B4D-BC73-E009D96FB836}" type="datetimeFigureOut">
               <a:rPr lang="en-US" smtClean="0"/>
-              <a:t>1/11/23</a:t>
+              <a:t>1/12/23</a:t>
             </a:fld>
             <a:endParaRPr lang="en-US" dirty="0"/>
           </a:p>
@@ -814,7 +2015,7 @@
     </p:spTree>
     <p:extLst>
       <p:ext uri="{BB962C8B-B14F-4D97-AF65-F5344CB8AC3E}">
-        <p14:creationId xmlns:p14="http://schemas.microsoft.com/office/powerpoint/2010/main" val="3730301473"/>
+        <p14:creationId xmlns:p14="http://schemas.microsoft.com/office/powerpoint/2010/main" val="5879042"/>
       </p:ext>
     </p:extLst>
   </p:cSld>
@@ -853,8 +2054,8 @@
         </p:nvSpPr>
         <p:spPr>
           <a:xfrm>
-            <a:off x="1172930" y="2051686"/>
-            <a:ext cx="14827270" cy="3423284"/>
+            <a:off x="1023132" y="2051686"/>
+            <a:ext cx="12933640" cy="3423284"/>
           </a:xfrm>
         </p:spPr>
         <p:txBody>
@@ -885,8 +2086,8 @@
         </p:nvSpPr>
         <p:spPr>
           <a:xfrm>
-            <a:off x="1172930" y="5507356"/>
-            <a:ext cx="14827270" cy="1800224"/>
+            <a:off x="1023132" y="5507356"/>
+            <a:ext cx="12933640" cy="1800224"/>
           </a:xfrm>
         </p:spPr>
         <p:txBody>
@@ -1009,7 +2210,7 @@
           <a:p>
             <a:fld id="{4328B3F3-4A5C-9B4D-BC73-E009D96FB836}" type="datetimeFigureOut">
               <a:rPr lang="en-US" smtClean="0"/>
-              <a:t>1/11/23</a:t>
+              <a:t>1/12/23</a:t>
             </a:fld>
             <a:endParaRPr lang="en-US" dirty="0"/>
           </a:p>
@@ -1060,7 +2261,7 @@
     </p:spTree>
     <p:extLst>
       <p:ext uri="{BB962C8B-B14F-4D97-AF65-F5344CB8AC3E}">
-        <p14:creationId xmlns:p14="http://schemas.microsoft.com/office/powerpoint/2010/main" val="4265022949"/>
+        <p14:creationId xmlns:p14="http://schemas.microsoft.com/office/powerpoint/2010/main" val="1541785074"/>
       </p:ext>
     </p:extLst>
   </p:cSld>
@@ -1122,8 +2323,8 @@
         </p:nvSpPr>
         <p:spPr>
           <a:xfrm>
-            <a:off x="1181884" y="2190750"/>
-            <a:ext cx="7306191" cy="5221606"/>
+            <a:off x="1030942" y="2190750"/>
+            <a:ext cx="6373098" cy="5221606"/>
           </a:xfrm>
         </p:spPr>
         <p:txBody>
@@ -1179,8 +2380,8 @@
         </p:nvSpPr>
         <p:spPr>
           <a:xfrm>
-            <a:off x="8702963" y="2190750"/>
-            <a:ext cx="7306191" cy="5221606"/>
+            <a:off x="7591485" y="2190750"/>
+            <a:ext cx="6373098" cy="5221606"/>
           </a:xfrm>
         </p:spPr>
         <p:txBody>
@@ -1241,7 +2442,7 @@
           <a:p>
             <a:fld id="{4328B3F3-4A5C-9B4D-BC73-E009D96FB836}" type="datetimeFigureOut">
               <a:rPr lang="en-US" smtClean="0"/>
-              <a:t>1/11/23</a:t>
+              <a:t>1/12/23</a:t>
             </a:fld>
             <a:endParaRPr lang="en-US" dirty="0"/>
           </a:p>
@@ -1292,7 +2493,7 @@
     </p:spTree>
     <p:extLst>
       <p:ext uri="{BB962C8B-B14F-4D97-AF65-F5344CB8AC3E}">
-        <p14:creationId xmlns:p14="http://schemas.microsoft.com/office/powerpoint/2010/main" val="1611463938"/>
+        <p14:creationId xmlns:p14="http://schemas.microsoft.com/office/powerpoint/2010/main" val="158880846"/>
       </p:ext>
     </p:extLst>
   </p:cSld>
@@ -1331,8 +2532,8 @@
         </p:nvSpPr>
         <p:spPr>
           <a:xfrm>
-            <a:off x="1184123" y="438150"/>
-            <a:ext cx="14827270" cy="1590676"/>
+            <a:off x="1032896" y="438150"/>
+            <a:ext cx="12933640" cy="1590676"/>
           </a:xfrm>
         </p:spPr>
         <p:txBody>
@@ -1359,8 +2560,8 @@
         </p:nvSpPr>
         <p:spPr>
           <a:xfrm>
-            <a:off x="1184124" y="2017396"/>
-            <a:ext cx="7272614" cy="988694"/>
+            <a:off x="1032896" y="2017396"/>
+            <a:ext cx="6343809" cy="988694"/>
           </a:xfrm>
         </p:spPr>
         <p:txBody>
@@ -1424,8 +2625,8 @@
         </p:nvSpPr>
         <p:spPr>
           <a:xfrm>
-            <a:off x="1184124" y="3006090"/>
-            <a:ext cx="7272614" cy="4421506"/>
+            <a:off x="1032896" y="3006090"/>
+            <a:ext cx="6343809" cy="4421506"/>
           </a:xfrm>
         </p:spPr>
         <p:txBody>
@@ -1481,8 +2682,8 @@
         </p:nvSpPr>
         <p:spPr>
           <a:xfrm>
-            <a:off x="8702963" y="2017396"/>
-            <a:ext cx="7308430" cy="988694"/>
+            <a:off x="7591485" y="2017396"/>
+            <a:ext cx="6375051" cy="988694"/>
           </a:xfrm>
         </p:spPr>
         <p:txBody>
@@ -1546,8 +2747,8 @@
         </p:nvSpPr>
         <p:spPr>
           <a:xfrm>
-            <a:off x="8702963" y="3006090"/>
-            <a:ext cx="7308430" cy="4421506"/>
+            <a:off x="7591485" y="3006090"/>
+            <a:ext cx="6375051" cy="4421506"/>
           </a:xfrm>
         </p:spPr>
         <p:txBody>
@@ -1608,7 +2809,7 @@
           <a:p>
             <a:fld id="{4328B3F3-4A5C-9B4D-BC73-E009D96FB836}" type="datetimeFigureOut">
               <a:rPr lang="en-US" smtClean="0"/>
-              <a:t>1/11/23</a:t>
+              <a:t>1/12/23</a:t>
             </a:fld>
             <a:endParaRPr lang="en-US" dirty="0"/>
           </a:p>
@@ -1659,7 +2860,7 @@
     </p:spTree>
     <p:extLst>
       <p:ext uri="{BB962C8B-B14F-4D97-AF65-F5344CB8AC3E}">
-        <p14:creationId xmlns:p14="http://schemas.microsoft.com/office/powerpoint/2010/main" val="2063001953"/>
+        <p14:creationId xmlns:p14="http://schemas.microsoft.com/office/powerpoint/2010/main" val="944570229"/>
       </p:ext>
     </p:extLst>
   </p:cSld>
@@ -1726,7 +2927,7 @@
           <a:p>
             <a:fld id="{4328B3F3-4A5C-9B4D-BC73-E009D96FB836}" type="datetimeFigureOut">
               <a:rPr lang="en-US" smtClean="0"/>
-              <a:t>1/11/23</a:t>
+              <a:t>1/12/23</a:t>
             </a:fld>
             <a:endParaRPr lang="en-US" dirty="0"/>
           </a:p>
@@ -1777,7 +2978,7 @@
     </p:spTree>
     <p:extLst>
       <p:ext uri="{BB962C8B-B14F-4D97-AF65-F5344CB8AC3E}">
-        <p14:creationId xmlns:p14="http://schemas.microsoft.com/office/powerpoint/2010/main" val="1944915349"/>
+        <p14:creationId xmlns:p14="http://schemas.microsoft.com/office/powerpoint/2010/main" val="252480204"/>
       </p:ext>
     </p:extLst>
   </p:cSld>
@@ -1821,7 +3022,7 @@
           <a:p>
             <a:fld id="{4328B3F3-4A5C-9B4D-BC73-E009D96FB836}" type="datetimeFigureOut">
               <a:rPr lang="en-US" smtClean="0"/>
-              <a:t>1/11/23</a:t>
+              <a:t>1/12/23</a:t>
             </a:fld>
             <a:endParaRPr lang="en-US" dirty="0"/>
           </a:p>
@@ -1872,7 +3073,7 @@
     </p:spTree>
     <p:extLst>
       <p:ext uri="{BB962C8B-B14F-4D97-AF65-F5344CB8AC3E}">
-        <p14:creationId xmlns:p14="http://schemas.microsoft.com/office/powerpoint/2010/main" val="1013776895"/>
+        <p14:creationId xmlns:p14="http://schemas.microsoft.com/office/powerpoint/2010/main" val="3720930515"/>
       </p:ext>
     </p:extLst>
   </p:cSld>
@@ -1911,8 +3112,8 @@
         </p:nvSpPr>
         <p:spPr>
           <a:xfrm>
-            <a:off x="1184124" y="548640"/>
-            <a:ext cx="5544557" cy="1920240"/>
+            <a:off x="1032896" y="548640"/>
+            <a:ext cx="4836447" cy="1920240"/>
           </a:xfrm>
         </p:spPr>
         <p:txBody>
@@ -1943,8 +3144,8 @@
         </p:nvSpPr>
         <p:spPr>
           <a:xfrm>
-            <a:off x="7308430" y="1184911"/>
-            <a:ext cx="8702963" cy="5848350"/>
+            <a:off x="6375051" y="1184911"/>
+            <a:ext cx="7591485" cy="5848350"/>
           </a:xfrm>
         </p:spPr>
         <p:txBody>
@@ -2028,8 +3229,8 @@
         </p:nvSpPr>
         <p:spPr>
           <a:xfrm>
-            <a:off x="1184124" y="2468880"/>
-            <a:ext cx="5544557" cy="4573906"/>
+            <a:off x="1032896" y="2468880"/>
+            <a:ext cx="4836447" cy="4573906"/>
           </a:xfrm>
         </p:spPr>
         <p:txBody>
@@ -2098,7 +3299,7 @@
           <a:p>
             <a:fld id="{4328B3F3-4A5C-9B4D-BC73-E009D96FB836}" type="datetimeFigureOut">
               <a:rPr lang="en-US" smtClean="0"/>
-              <a:t>1/11/23</a:t>
+              <a:t>1/12/23</a:t>
             </a:fld>
             <a:endParaRPr lang="en-US" dirty="0"/>
           </a:p>
@@ -2149,7 +3350,7 @@
     </p:spTree>
     <p:extLst>
       <p:ext uri="{BB962C8B-B14F-4D97-AF65-F5344CB8AC3E}">
-        <p14:creationId xmlns:p14="http://schemas.microsoft.com/office/powerpoint/2010/main" val="3949816901"/>
+        <p14:creationId xmlns:p14="http://schemas.microsoft.com/office/powerpoint/2010/main" val="1577159292"/>
       </p:ext>
     </p:extLst>
   </p:cSld>
@@ -2188,8 +3389,8 @@
         </p:nvSpPr>
         <p:spPr>
           <a:xfrm>
-            <a:off x="1184124" y="548640"/>
-            <a:ext cx="5544557" cy="1920240"/>
+            <a:off x="1032896" y="548640"/>
+            <a:ext cx="4836447" cy="1920240"/>
           </a:xfrm>
         </p:spPr>
         <p:txBody>
@@ -2220,8 +3421,8 @@
         </p:nvSpPr>
         <p:spPr>
           <a:xfrm>
-            <a:off x="7308430" y="1184911"/>
-            <a:ext cx="8702963" cy="5848350"/>
+            <a:off x="6375051" y="1184911"/>
+            <a:ext cx="7591485" cy="5848350"/>
           </a:xfrm>
         </p:spPr>
         <p:txBody>
@@ -2285,8 +3486,8 @@
         </p:nvSpPr>
         <p:spPr>
           <a:xfrm>
-            <a:off x="1184124" y="2468880"/>
-            <a:ext cx="5544557" cy="4573906"/>
+            <a:off x="1032896" y="2468880"/>
+            <a:ext cx="4836447" cy="4573906"/>
           </a:xfrm>
         </p:spPr>
         <p:txBody>
@@ -2355,7 +3556,7 @@
           <a:p>
             <a:fld id="{4328B3F3-4A5C-9B4D-BC73-E009D96FB836}" type="datetimeFigureOut">
               <a:rPr lang="en-US" smtClean="0"/>
-              <a:t>1/11/23</a:t>
+              <a:t>1/12/23</a:t>
             </a:fld>
             <a:endParaRPr lang="en-US" dirty="0"/>
           </a:p>
@@ -2406,7 +3607,7 @@
     </p:spTree>
     <p:extLst>
       <p:ext uri="{BB962C8B-B14F-4D97-AF65-F5344CB8AC3E}">
-        <p14:creationId xmlns:p14="http://schemas.microsoft.com/office/powerpoint/2010/main" val="2588406395"/>
+        <p14:creationId xmlns:p14="http://schemas.microsoft.com/office/powerpoint/2010/main" val="3244889043"/>
       </p:ext>
     </p:extLst>
   </p:cSld>
@@ -2450,8 +3651,8 @@
         </p:nvSpPr>
         <p:spPr>
           <a:xfrm>
-            <a:off x="1181884" y="438150"/>
-            <a:ext cx="14827270" cy="1590676"/>
+            <a:off x="1030943" y="438150"/>
+            <a:ext cx="12933640" cy="1590676"/>
           </a:xfrm>
           <a:prstGeom prst="rect">
             <a:avLst/>
@@ -2483,8 +3684,8 @@
         </p:nvSpPr>
         <p:spPr>
           <a:xfrm>
-            <a:off x="1181884" y="2190750"/>
-            <a:ext cx="14827270" cy="5221606"/>
+            <a:off x="1030943" y="2190750"/>
+            <a:ext cx="12933640" cy="5221606"/>
           </a:xfrm>
           <a:prstGeom prst="rect">
             <a:avLst/>
@@ -2545,8 +3746,8 @@
         </p:nvSpPr>
         <p:spPr>
           <a:xfrm>
-            <a:off x="1181884" y="7627621"/>
-            <a:ext cx="3867984" cy="438150"/>
+            <a:off x="1030942" y="7627621"/>
+            <a:ext cx="3373993" cy="438150"/>
           </a:xfrm>
           <a:prstGeom prst="rect">
             <a:avLst/>
@@ -2568,7 +3769,7 @@
           <a:p>
             <a:fld id="{4328B3F3-4A5C-9B4D-BC73-E009D96FB836}" type="datetimeFigureOut">
               <a:rPr lang="en-US" smtClean="0"/>
-              <a:t>1/11/23</a:t>
+              <a:t>1/12/23</a:t>
             </a:fld>
             <a:endParaRPr lang="en-US" dirty="0"/>
           </a:p>
@@ -2586,8 +3787,8 @@
         </p:nvSpPr>
         <p:spPr>
           <a:xfrm>
-            <a:off x="5694532" y="7627621"/>
-            <a:ext cx="5801975" cy="438150"/>
+            <a:off x="4967268" y="7627621"/>
+            <a:ext cx="5060990" cy="438150"/>
           </a:xfrm>
           <a:prstGeom prst="rect">
             <a:avLst/>
@@ -2623,8 +3824,8 @@
         </p:nvSpPr>
         <p:spPr>
           <a:xfrm>
-            <a:off x="12141170" y="7627621"/>
-            <a:ext cx="3867984" cy="438150"/>
+            <a:off x="10590590" y="7627621"/>
+            <a:ext cx="3373993" cy="438150"/>
           </a:xfrm>
           <a:prstGeom prst="rect">
             <a:avLst/>
@@ -2655,23 +3856,23 @@
     </p:spTree>
     <p:extLst>
       <p:ext uri="{BB962C8B-B14F-4D97-AF65-F5344CB8AC3E}">
-        <p14:creationId xmlns:p14="http://schemas.microsoft.com/office/powerpoint/2010/main" val="2318259227"/>
+        <p14:creationId xmlns:p14="http://schemas.microsoft.com/office/powerpoint/2010/main" val="3784175075"/>
       </p:ext>
     </p:extLst>
   </p:cSld>
   <p:clrMap bg1="lt1" tx1="dk1" bg2="lt2" tx2="dk2" accent1="accent1" accent2="accent2" accent3="accent3" accent4="accent4" accent5="accent5" accent6="accent6" hlink="hlink" folHlink="folHlink"/>
   <p:sldLayoutIdLst>
-    <p:sldLayoutId id="2147483709" r:id="rId1"/>
-    <p:sldLayoutId id="2147483710" r:id="rId2"/>
-    <p:sldLayoutId id="2147483711" r:id="rId3"/>
-    <p:sldLayoutId id="2147483712" r:id="rId4"/>
-    <p:sldLayoutId id="2147483713" r:id="rId5"/>
-    <p:sldLayoutId id="2147483714" r:id="rId6"/>
-    <p:sldLayoutId id="2147483715" r:id="rId7"/>
-    <p:sldLayoutId id="2147483716" r:id="rId8"/>
-    <p:sldLayoutId id="2147483717" r:id="rId9"/>
-    <p:sldLayoutId id="2147483718" r:id="rId10"/>
-    <p:sldLayoutId id="2147483719" r:id="rId11"/>
+    <p:sldLayoutId id="2147483733" r:id="rId1"/>
+    <p:sldLayoutId id="2147483734" r:id="rId2"/>
+    <p:sldLayoutId id="2147483735" r:id="rId3"/>
+    <p:sldLayoutId id="2147483736" r:id="rId4"/>
+    <p:sldLayoutId id="2147483737" r:id="rId5"/>
+    <p:sldLayoutId id="2147483738" r:id="rId6"/>
+    <p:sldLayoutId id="2147483739" r:id="rId7"/>
+    <p:sldLayoutId id="2147483740" r:id="rId8"/>
+    <p:sldLayoutId id="2147483741" r:id="rId9"/>
+    <p:sldLayoutId id="2147483742" r:id="rId10"/>
+    <p:sldLayoutId id="2147483743" r:id="rId11"/>
   </p:sldLayoutIdLst>
   <p:txStyles>
     <p:titleStyle>
@@ -2975,10 +4176,10 @@
       </p:grpSpPr>
       <p:grpSp>
         <p:nvGrpSpPr>
-          <p:cNvPr id="105" name="Group 104">
+          <p:cNvPr id="40" name="Group 39">
             <a:extLst>
               <a:ext uri="{FF2B5EF4-FFF2-40B4-BE49-F238E27FC236}">
-                <a16:creationId xmlns:a16="http://schemas.microsoft.com/office/drawing/2014/main" id="{B884B99D-7865-3BCE-7875-FAF337B5732C}"/>
+                <a16:creationId xmlns:a16="http://schemas.microsoft.com/office/drawing/2014/main" id="{E2F20CE1-087B-7560-4003-EBF706BF604F}"/>
               </a:ext>
             </a:extLst>
           </p:cNvPr>
@@ -2987,18 +4188,18 @@
         </p:nvGrpSpPr>
         <p:grpSpPr>
           <a:xfrm>
-            <a:off x="8908943" y="101599"/>
-            <a:ext cx="8077892" cy="3667105"/>
-            <a:chOff x="6945674" y="413964"/>
-            <a:chExt cx="8077892" cy="3667105"/>
+            <a:off x="0" y="0"/>
+            <a:ext cx="14915285" cy="8242491"/>
+            <a:chOff x="2071550" y="11858"/>
+            <a:chExt cx="14915285" cy="8242491"/>
           </a:xfrm>
         </p:grpSpPr>
         <p:grpSp>
           <p:nvGrpSpPr>
-            <p:cNvPr id="106" name="Group 105">
+            <p:cNvPr id="41" name="Group 40">
               <a:extLst>
                 <a:ext uri="{FF2B5EF4-FFF2-40B4-BE49-F238E27FC236}">
-                  <a16:creationId xmlns:a16="http://schemas.microsoft.com/office/drawing/2014/main" id="{503745B2-7222-B200-442E-FB02942A41C5}"/>
+                  <a16:creationId xmlns:a16="http://schemas.microsoft.com/office/drawing/2014/main" id="{8E54E6F3-D831-6080-6764-D11A914E15AA}"/>
                 </a:ext>
               </a:extLst>
             </p:cNvPr>
@@ -3007,566 +4208,1459 @@
           </p:nvGrpSpPr>
           <p:grpSpPr>
             <a:xfrm>
-              <a:off x="6945674" y="413964"/>
+              <a:off x="8908943" y="101599"/>
               <a:ext cx="8077892" cy="3667105"/>
               <a:chOff x="6945674" y="413964"/>
               <a:chExt cx="8077892" cy="3667105"/>
             </a:xfrm>
           </p:grpSpPr>
-          <p:pic>
-            <p:nvPicPr>
-              <p:cNvPr id="110" name="Picture 109">
+          <p:grpSp>
+            <p:nvGrpSpPr>
+              <p:cNvPr id="60" name="Group 59">
                 <a:extLst>
                   <a:ext uri="{FF2B5EF4-FFF2-40B4-BE49-F238E27FC236}">
-                    <a16:creationId xmlns:a16="http://schemas.microsoft.com/office/drawing/2014/main" id="{4E7AD028-34A1-59E2-0DF9-E67DB446C338}"/>
+                    <a16:creationId xmlns:a16="http://schemas.microsoft.com/office/drawing/2014/main" id="{9E7AD127-DC64-3B93-F6B9-BB71DFC38B71}"/>
                   </a:ext>
                 </a:extLst>
               </p:cNvPr>
-              <p:cNvPicPr>
-                <a:picLocks noChangeAspect="1"/>
-              </p:cNvPicPr>
+              <p:cNvGrpSpPr/>
               <p:nvPr/>
-            </p:nvPicPr>
-            <p:blipFill rotWithShape="1">
-              <a:blip r:embed="rId2"/>
-              <a:srcRect l="14477" t="19196" r="23362" b="16224"/>
-              <a:stretch/>
-            </p:blipFill>
-            <p:spPr>
+            </p:nvGrpSpPr>
+            <p:grpSpPr>
               <a:xfrm>
-                <a:off x="6945674" y="575179"/>
-                <a:ext cx="7513416" cy="3469283"/>
+                <a:off x="6945674" y="413964"/>
+                <a:ext cx="8077892" cy="3667105"/>
+                <a:chOff x="6945674" y="413964"/>
+                <a:chExt cx="8077892" cy="3667105"/>
               </a:xfrm>
-              <a:prstGeom prst="rect">
-                <a:avLst/>
-              </a:prstGeom>
-            </p:spPr>
-          </p:pic>
+            </p:grpSpPr>
+            <p:pic>
+              <p:nvPicPr>
+                <p:cNvPr id="64" name="Picture 63">
+                  <a:extLst>
+                    <a:ext uri="{FF2B5EF4-FFF2-40B4-BE49-F238E27FC236}">
+                      <a16:creationId xmlns:a16="http://schemas.microsoft.com/office/drawing/2014/main" id="{4F076D78-2AA4-42B9-7D58-4BA5802D3B14}"/>
+                    </a:ext>
+                  </a:extLst>
+                </p:cNvPr>
+                <p:cNvPicPr>
+                  <a:picLocks noChangeAspect="1"/>
+                </p:cNvPicPr>
+                <p:nvPr/>
+              </p:nvPicPr>
+              <p:blipFill rotWithShape="1">
+                <a:blip r:embed="rId2"/>
+                <a:srcRect l="14477" t="19196" r="23362" b="16224"/>
+                <a:stretch/>
+              </p:blipFill>
+              <p:spPr>
+                <a:xfrm>
+                  <a:off x="6945674" y="575179"/>
+                  <a:ext cx="7513416" cy="3469283"/>
+                </a:xfrm>
+                <a:prstGeom prst="rect">
+                  <a:avLst/>
+                </a:prstGeom>
+              </p:spPr>
+            </p:pic>
+            <p:sp>
+              <p:nvSpPr>
+                <p:cNvPr id="65" name="TextBox 64">
+                  <a:extLst>
+                    <a:ext uri="{FF2B5EF4-FFF2-40B4-BE49-F238E27FC236}">
+                      <a16:creationId xmlns:a16="http://schemas.microsoft.com/office/drawing/2014/main" id="{645377EC-54D7-13A7-053C-C891CCE92356}"/>
+                    </a:ext>
+                  </a:extLst>
+                </p:cNvPr>
+                <p:cNvSpPr txBox="1"/>
+                <p:nvPr/>
+              </p:nvSpPr>
+              <p:spPr>
+                <a:xfrm>
+                  <a:off x="8839157" y="2309820"/>
+                  <a:ext cx="829073" cy="523220"/>
+                </a:xfrm>
+                <a:prstGeom prst="rect">
+                  <a:avLst/>
+                </a:prstGeom>
+                <a:noFill/>
+              </p:spPr>
+              <p:txBody>
+                <a:bodyPr wrap="none" rtlCol="0">
+                  <a:spAutoFit/>
+                </a:bodyPr>
+                <a:lstStyle/>
+                <a:p>
+                  <a:r>
+                    <a:rPr lang="en-US" sz="2800" dirty="0">
+                      <a:latin typeface="Courier" pitchFamily="2" charset="0"/>
+                    </a:rPr>
+                    <a:t>ac</a:t>
+                  </a:r>
+                  <a:r>
+                    <a:rPr lang="en-US" sz="2800" b="1" dirty="0">
+                      <a:latin typeface="Courier" pitchFamily="2" charset="0"/>
+                    </a:rPr>
+                    <a:t>c</a:t>
+                  </a:r>
+                </a:p>
+              </p:txBody>
+            </p:sp>
+            <p:sp>
+              <p:nvSpPr>
+                <p:cNvPr id="66" name="TextBox 65">
+                  <a:extLst>
+                    <a:ext uri="{FF2B5EF4-FFF2-40B4-BE49-F238E27FC236}">
+                      <a16:creationId xmlns:a16="http://schemas.microsoft.com/office/drawing/2014/main" id="{44CD9DC0-FFEF-09C2-92CF-316CF4A4F316}"/>
+                    </a:ext>
+                  </a:extLst>
+                </p:cNvPr>
+                <p:cNvSpPr txBox="1"/>
+                <p:nvPr/>
+              </p:nvSpPr>
+              <p:spPr>
+                <a:xfrm>
+                  <a:off x="10610045" y="3248604"/>
+                  <a:ext cx="829073" cy="523220"/>
+                </a:xfrm>
+                <a:prstGeom prst="rect">
+                  <a:avLst/>
+                </a:prstGeom>
+                <a:noFill/>
+              </p:spPr>
+              <p:txBody>
+                <a:bodyPr wrap="none" rtlCol="0">
+                  <a:spAutoFit/>
+                </a:bodyPr>
+                <a:lstStyle/>
+                <a:p>
+                  <a:r>
+                    <a:rPr lang="en-US" sz="2800" dirty="0">
+                      <a:latin typeface="Courier" pitchFamily="2" charset="0"/>
+                    </a:rPr>
+                    <a:t>ac</a:t>
+                  </a:r>
+                  <a:r>
+                    <a:rPr lang="en-US" sz="2800" b="1" dirty="0">
+                      <a:latin typeface="Courier" pitchFamily="2" charset="0"/>
+                    </a:rPr>
+                    <a:t>c</a:t>
+                  </a:r>
+                </a:p>
+              </p:txBody>
+            </p:sp>
+            <p:sp>
+              <p:nvSpPr>
+                <p:cNvPr id="67" name="TextBox 66">
+                  <a:extLst>
+                    <a:ext uri="{FF2B5EF4-FFF2-40B4-BE49-F238E27FC236}">
+                      <a16:creationId xmlns:a16="http://schemas.microsoft.com/office/drawing/2014/main" id="{D7932A2B-7775-F841-128A-D4B34DF0F20E}"/>
+                    </a:ext>
+                  </a:extLst>
+                </p:cNvPr>
+                <p:cNvSpPr txBox="1"/>
+                <p:nvPr/>
+              </p:nvSpPr>
+              <p:spPr>
+                <a:xfrm>
+                  <a:off x="12393125" y="2919420"/>
+                  <a:ext cx="829073" cy="523220"/>
+                </a:xfrm>
+                <a:prstGeom prst="rect">
+                  <a:avLst/>
+                </a:prstGeom>
+                <a:noFill/>
+              </p:spPr>
+              <p:txBody>
+                <a:bodyPr wrap="none" rtlCol="0">
+                  <a:spAutoFit/>
+                </a:bodyPr>
+                <a:lstStyle/>
+                <a:p>
+                  <a:r>
+                    <a:rPr lang="en-US" sz="2800" dirty="0">
+                      <a:latin typeface="Courier" pitchFamily="2" charset="0"/>
+                    </a:rPr>
+                    <a:t>ac</a:t>
+                  </a:r>
+                  <a:r>
+                    <a:rPr lang="en-US" sz="2800" b="1" dirty="0">
+                      <a:latin typeface="Courier" pitchFamily="2" charset="0"/>
+                    </a:rPr>
+                    <a:t>c</a:t>
+                  </a:r>
+                </a:p>
+              </p:txBody>
+            </p:sp>
+            <p:sp>
+              <p:nvSpPr>
+                <p:cNvPr id="68" name="TextBox 67">
+                  <a:extLst>
+                    <a:ext uri="{FF2B5EF4-FFF2-40B4-BE49-F238E27FC236}">
+                      <a16:creationId xmlns:a16="http://schemas.microsoft.com/office/drawing/2014/main" id="{12F5DB00-8A13-742C-6FBF-4A1B525EFB9C}"/>
+                    </a:ext>
+                  </a:extLst>
+                </p:cNvPr>
+                <p:cNvSpPr txBox="1"/>
+                <p:nvPr/>
+              </p:nvSpPr>
+              <p:spPr>
+                <a:xfrm>
+                  <a:off x="12393125" y="3557849"/>
+                  <a:ext cx="829073" cy="523220"/>
+                </a:xfrm>
+                <a:prstGeom prst="rect">
+                  <a:avLst/>
+                </a:prstGeom>
+                <a:noFill/>
+              </p:spPr>
+              <p:txBody>
+                <a:bodyPr wrap="none" rtlCol="0">
+                  <a:spAutoFit/>
+                </a:bodyPr>
+                <a:lstStyle/>
+                <a:p>
+                  <a:r>
+                    <a:rPr lang="en-US" sz="2800" dirty="0" err="1">
+                      <a:latin typeface="Courier" pitchFamily="2" charset="0"/>
+                    </a:rPr>
+                    <a:t>ac</a:t>
+                  </a:r>
+                  <a:r>
+                    <a:rPr lang="en-US" sz="2800" b="1" dirty="0" err="1">
+                      <a:solidFill>
+                        <a:srgbClr val="FF0000"/>
+                      </a:solidFill>
+                      <a:latin typeface="Courier" pitchFamily="2" charset="0"/>
+                    </a:rPr>
+                    <a:t>g</a:t>
+                  </a:r>
+                  <a:endParaRPr lang="en-US" sz="2800" b="1" dirty="0">
+                    <a:solidFill>
+                      <a:srgbClr val="FF0000"/>
+                    </a:solidFill>
+                    <a:latin typeface="Courier" pitchFamily="2" charset="0"/>
+                  </a:endParaRPr>
+                </a:p>
+              </p:txBody>
+            </p:sp>
+            <p:sp>
+              <p:nvSpPr>
+                <p:cNvPr id="69" name="TextBox 68">
+                  <a:extLst>
+                    <a:ext uri="{FF2B5EF4-FFF2-40B4-BE49-F238E27FC236}">
+                      <a16:creationId xmlns:a16="http://schemas.microsoft.com/office/drawing/2014/main" id="{B81508B4-392F-F8DF-BE03-453B7ACE615D}"/>
+                    </a:ext>
+                  </a:extLst>
+                </p:cNvPr>
+                <p:cNvSpPr txBox="1"/>
+                <p:nvPr/>
+              </p:nvSpPr>
+              <p:spPr>
+                <a:xfrm>
+                  <a:off x="10610045" y="1355796"/>
+                  <a:ext cx="829073" cy="523220"/>
+                </a:xfrm>
+                <a:prstGeom prst="rect">
+                  <a:avLst/>
+                </a:prstGeom>
+                <a:noFill/>
+              </p:spPr>
+              <p:txBody>
+                <a:bodyPr wrap="none" rtlCol="0">
+                  <a:spAutoFit/>
+                </a:bodyPr>
+                <a:lstStyle/>
+                <a:p>
+                  <a:r>
+                    <a:rPr lang="en-US" sz="2800" dirty="0">
+                      <a:latin typeface="Courier" pitchFamily="2" charset="0"/>
+                    </a:rPr>
+                    <a:t>ac</a:t>
+                  </a:r>
+                  <a:r>
+                    <a:rPr lang="en-US" sz="2800" b="1" dirty="0">
+                      <a:latin typeface="Courier" pitchFamily="2" charset="0"/>
+                    </a:rPr>
+                    <a:t>c</a:t>
+                  </a:r>
+                </a:p>
+              </p:txBody>
+            </p:sp>
+            <p:sp>
+              <p:nvSpPr>
+                <p:cNvPr id="70" name="TextBox 69">
+                  <a:extLst>
+                    <a:ext uri="{FF2B5EF4-FFF2-40B4-BE49-F238E27FC236}">
+                      <a16:creationId xmlns:a16="http://schemas.microsoft.com/office/drawing/2014/main" id="{FF6D1FDF-11C9-201C-CFA4-01221599D562}"/>
+                    </a:ext>
+                  </a:extLst>
+                </p:cNvPr>
+                <p:cNvSpPr txBox="1"/>
+                <p:nvPr/>
+              </p:nvSpPr>
+              <p:spPr>
+                <a:xfrm>
+                  <a:off x="12393125" y="1986732"/>
+                  <a:ext cx="829073" cy="523220"/>
+                </a:xfrm>
+                <a:prstGeom prst="rect">
+                  <a:avLst/>
+                </a:prstGeom>
+                <a:noFill/>
+              </p:spPr>
+              <p:txBody>
+                <a:bodyPr wrap="none" rtlCol="0">
+                  <a:spAutoFit/>
+                </a:bodyPr>
+                <a:lstStyle/>
+                <a:p>
+                  <a:r>
+                    <a:rPr lang="en-US" sz="2800" dirty="0">
+                      <a:latin typeface="Courier" pitchFamily="2" charset="0"/>
+                    </a:rPr>
+                    <a:t>ac</a:t>
+                  </a:r>
+                  <a:r>
+                    <a:rPr lang="en-US" sz="2800" b="1" dirty="0">
+                      <a:latin typeface="Courier" pitchFamily="2" charset="0"/>
+                    </a:rPr>
+                    <a:t>c</a:t>
+                  </a:r>
+                </a:p>
+              </p:txBody>
+            </p:sp>
+            <p:sp>
+              <p:nvSpPr>
+                <p:cNvPr id="71" name="TextBox 70">
+                  <a:extLst>
+                    <a:ext uri="{FF2B5EF4-FFF2-40B4-BE49-F238E27FC236}">
+                      <a16:creationId xmlns:a16="http://schemas.microsoft.com/office/drawing/2014/main" id="{10E527A8-271C-3C5C-A7F5-B2E7B3E04838}"/>
+                    </a:ext>
+                  </a:extLst>
+                </p:cNvPr>
+                <p:cNvSpPr txBox="1"/>
+                <p:nvPr/>
+              </p:nvSpPr>
+              <p:spPr>
+                <a:xfrm>
+                  <a:off x="12393125" y="715716"/>
+                  <a:ext cx="829073" cy="523220"/>
+                </a:xfrm>
+                <a:prstGeom prst="rect">
+                  <a:avLst/>
+                </a:prstGeom>
+                <a:noFill/>
+              </p:spPr>
+              <p:txBody>
+                <a:bodyPr wrap="none" rtlCol="0">
+                  <a:spAutoFit/>
+                </a:bodyPr>
+                <a:lstStyle/>
+                <a:p>
+                  <a:r>
+                    <a:rPr lang="en-US" sz="2800" dirty="0" err="1">
+                      <a:latin typeface="Courier" pitchFamily="2" charset="0"/>
+                    </a:rPr>
+                    <a:t>ac</a:t>
+                  </a:r>
+                  <a:r>
+                    <a:rPr lang="en-US" sz="2800" b="1" dirty="0" err="1">
+                      <a:solidFill>
+                        <a:srgbClr val="FF0000"/>
+                      </a:solidFill>
+                      <a:latin typeface="Courier" pitchFamily="2" charset="0"/>
+                    </a:rPr>
+                    <a:t>g</a:t>
+                  </a:r>
+                  <a:endParaRPr lang="en-US" sz="2800" b="1" dirty="0">
+                    <a:solidFill>
+                      <a:srgbClr val="FF0000"/>
+                    </a:solidFill>
+                    <a:latin typeface="Courier" pitchFamily="2" charset="0"/>
+                  </a:endParaRPr>
+                </a:p>
+              </p:txBody>
+            </p:sp>
+            <p:sp>
+              <p:nvSpPr>
+                <p:cNvPr id="72" name="TextBox 71">
+                  <a:extLst>
+                    <a:ext uri="{FF2B5EF4-FFF2-40B4-BE49-F238E27FC236}">
+                      <a16:creationId xmlns:a16="http://schemas.microsoft.com/office/drawing/2014/main" id="{E7D96E23-162A-B160-C65D-F61270F9B72A}"/>
+                    </a:ext>
+                  </a:extLst>
+                </p:cNvPr>
+                <p:cNvSpPr txBox="1"/>
+                <p:nvPr/>
+              </p:nvSpPr>
+              <p:spPr>
+                <a:xfrm>
+                  <a:off x="14194493" y="413964"/>
+                  <a:ext cx="829073" cy="523220"/>
+                </a:xfrm>
+                <a:prstGeom prst="rect">
+                  <a:avLst/>
+                </a:prstGeom>
+                <a:noFill/>
+              </p:spPr>
+              <p:txBody>
+                <a:bodyPr wrap="none" rtlCol="0">
+                  <a:spAutoFit/>
+                </a:bodyPr>
+                <a:lstStyle/>
+                <a:p>
+                  <a:r>
+                    <a:rPr lang="en-US" sz="2800" dirty="0" err="1">
+                      <a:latin typeface="Courier" pitchFamily="2" charset="0"/>
+                    </a:rPr>
+                    <a:t>ac</a:t>
+                  </a:r>
+                  <a:r>
+                    <a:rPr lang="en-US" sz="2800" b="1" dirty="0" err="1">
+                      <a:solidFill>
+                        <a:srgbClr val="FF0000"/>
+                      </a:solidFill>
+                      <a:latin typeface="Courier" pitchFamily="2" charset="0"/>
+                    </a:rPr>
+                    <a:t>g</a:t>
+                  </a:r>
+                  <a:endParaRPr lang="en-US" sz="2800" b="1" dirty="0">
+                    <a:solidFill>
+                      <a:srgbClr val="FF0000"/>
+                    </a:solidFill>
+                    <a:latin typeface="Courier" pitchFamily="2" charset="0"/>
+                  </a:endParaRPr>
+                </a:p>
+              </p:txBody>
+            </p:sp>
+            <p:sp>
+              <p:nvSpPr>
+                <p:cNvPr id="73" name="TextBox 72">
+                  <a:extLst>
+                    <a:ext uri="{FF2B5EF4-FFF2-40B4-BE49-F238E27FC236}">
+                      <a16:creationId xmlns:a16="http://schemas.microsoft.com/office/drawing/2014/main" id="{C36A5BC9-9B4A-DA82-B930-0153A1478A12}"/>
+                    </a:ext>
+                  </a:extLst>
+                </p:cNvPr>
+                <p:cNvSpPr txBox="1"/>
+                <p:nvPr/>
+              </p:nvSpPr>
+              <p:spPr>
+                <a:xfrm>
+                  <a:off x="14194493" y="1034320"/>
+                  <a:ext cx="829073" cy="523220"/>
+                </a:xfrm>
+                <a:prstGeom prst="rect">
+                  <a:avLst/>
+                </a:prstGeom>
+                <a:noFill/>
+              </p:spPr>
+              <p:txBody>
+                <a:bodyPr wrap="none" rtlCol="0">
+                  <a:spAutoFit/>
+                </a:bodyPr>
+                <a:lstStyle/>
+                <a:p>
+                  <a:r>
+                    <a:rPr lang="en-US" sz="2800" dirty="0" err="1">
+                      <a:latin typeface="Courier" pitchFamily="2" charset="0"/>
+                    </a:rPr>
+                    <a:t>ac</a:t>
+                  </a:r>
+                  <a:r>
+                    <a:rPr lang="en-US" sz="2800" b="1" dirty="0" err="1">
+                      <a:solidFill>
+                        <a:srgbClr val="FF0000"/>
+                      </a:solidFill>
+                      <a:latin typeface="Courier" pitchFamily="2" charset="0"/>
+                    </a:rPr>
+                    <a:t>g</a:t>
+                  </a:r>
+                  <a:endParaRPr lang="en-US" sz="2800" b="1" dirty="0">
+                    <a:solidFill>
+                      <a:srgbClr val="FF0000"/>
+                    </a:solidFill>
+                    <a:latin typeface="Courier" pitchFamily="2" charset="0"/>
+                  </a:endParaRPr>
+                </a:p>
+              </p:txBody>
+            </p:sp>
+            <p:sp>
+              <p:nvSpPr>
+                <p:cNvPr id="74" name="TextBox 73">
+                  <a:extLst>
+                    <a:ext uri="{FF2B5EF4-FFF2-40B4-BE49-F238E27FC236}">
+                      <a16:creationId xmlns:a16="http://schemas.microsoft.com/office/drawing/2014/main" id="{DDD5D0B2-D946-FA99-1573-F3C7AE8E952E}"/>
+                    </a:ext>
+                  </a:extLst>
+                </p:cNvPr>
+                <p:cNvSpPr txBox="1"/>
+                <p:nvPr/>
+              </p:nvSpPr>
+              <p:spPr>
+                <a:xfrm>
+                  <a:off x="14194493" y="1661296"/>
+                  <a:ext cx="829073" cy="523220"/>
+                </a:xfrm>
+                <a:prstGeom prst="rect">
+                  <a:avLst/>
+                </a:prstGeom>
+                <a:noFill/>
+              </p:spPr>
+              <p:txBody>
+                <a:bodyPr wrap="none" rtlCol="0">
+                  <a:spAutoFit/>
+                </a:bodyPr>
+                <a:lstStyle/>
+                <a:p>
+                  <a:r>
+                    <a:rPr lang="en-US" sz="2800" dirty="0">
+                      <a:latin typeface="Courier" pitchFamily="2" charset="0"/>
+                    </a:rPr>
+                    <a:t>ac</a:t>
+                  </a:r>
+                  <a:r>
+                    <a:rPr lang="en-US" sz="2800" b="1" dirty="0">
+                      <a:latin typeface="Courier" pitchFamily="2" charset="0"/>
+                    </a:rPr>
+                    <a:t>c</a:t>
+                  </a:r>
+                </a:p>
+              </p:txBody>
+            </p:sp>
+            <p:sp>
+              <p:nvSpPr>
+                <p:cNvPr id="75" name="TextBox 74">
+                  <a:extLst>
+                    <a:ext uri="{FF2B5EF4-FFF2-40B4-BE49-F238E27FC236}">
+                      <a16:creationId xmlns:a16="http://schemas.microsoft.com/office/drawing/2014/main" id="{A6D6AD89-C134-09EB-0A2E-2E6AC382AE31}"/>
+                    </a:ext>
+                  </a:extLst>
+                </p:cNvPr>
+                <p:cNvSpPr txBox="1"/>
+                <p:nvPr/>
+              </p:nvSpPr>
+              <p:spPr>
+                <a:xfrm>
+                  <a:off x="14194493" y="2289008"/>
+                  <a:ext cx="829073" cy="523220"/>
+                </a:xfrm>
+                <a:prstGeom prst="rect">
+                  <a:avLst/>
+                </a:prstGeom>
+                <a:noFill/>
+              </p:spPr>
+              <p:txBody>
+                <a:bodyPr wrap="none" rtlCol="0">
+                  <a:spAutoFit/>
+                </a:bodyPr>
+                <a:lstStyle/>
+                <a:p>
+                  <a:r>
+                    <a:rPr lang="en-US" sz="2800" dirty="0" err="1">
+                      <a:latin typeface="Courier" pitchFamily="2" charset="0"/>
+                    </a:rPr>
+                    <a:t>ac</a:t>
+                  </a:r>
+                  <a:r>
+                    <a:rPr lang="en-US" sz="2800" b="1" dirty="0" err="1">
+                      <a:solidFill>
+                        <a:srgbClr val="FF0000"/>
+                      </a:solidFill>
+                      <a:latin typeface="Courier" pitchFamily="2" charset="0"/>
+                    </a:rPr>
+                    <a:t>g</a:t>
+                  </a:r>
+                  <a:endParaRPr lang="en-US" sz="2800" b="1" dirty="0">
+                    <a:solidFill>
+                      <a:srgbClr val="FF0000"/>
+                    </a:solidFill>
+                    <a:latin typeface="Courier" pitchFamily="2" charset="0"/>
+                  </a:endParaRPr>
+                </a:p>
+              </p:txBody>
+            </p:sp>
+          </p:grpSp>
           <p:sp>
             <p:nvSpPr>
-              <p:cNvPr id="111" name="TextBox 110">
+              <p:cNvPr id="61" name="Lightning Bolt 60">
                 <a:extLst>
                   <a:ext uri="{FF2B5EF4-FFF2-40B4-BE49-F238E27FC236}">
-                    <a16:creationId xmlns:a16="http://schemas.microsoft.com/office/drawing/2014/main" id="{07B1D410-04A1-4901-4AEE-E23DD5064CCB}"/>
+                    <a16:creationId xmlns:a16="http://schemas.microsoft.com/office/drawing/2014/main" id="{B7C687D1-2363-6C49-2209-720020AC79DC}"/>
                   </a:ext>
                 </a:extLst>
               </p:cNvPr>
-              <p:cNvSpPr txBox="1"/>
+              <p:cNvSpPr/>
               <p:nvPr/>
             </p:nvSpPr>
             <p:spPr>
-              <a:xfrm>
-                <a:off x="8839157" y="2309820"/>
-                <a:ext cx="829073" cy="523220"/>
+              <a:xfrm rot="5400000">
+                <a:off x="11646384" y="3387262"/>
+                <a:ext cx="364530" cy="499864"/>
               </a:xfrm>
-              <a:prstGeom prst="rect">
+              <a:prstGeom prst="lightningBolt">
                 <a:avLst/>
               </a:prstGeom>
-              <a:noFill/>
+              <a:solidFill>
+                <a:srgbClr val="FF0000"/>
+              </a:solidFill>
+              <a:ln>
+                <a:noFill/>
+              </a:ln>
             </p:spPr>
+            <p:style>
+              <a:lnRef idx="2">
+                <a:schemeClr val="accent1">
+                  <a:shade val="50000"/>
+                </a:schemeClr>
+              </a:lnRef>
+              <a:fillRef idx="1">
+                <a:schemeClr val="accent1"/>
+              </a:fillRef>
+              <a:effectRef idx="0">
+                <a:schemeClr val="accent1"/>
+              </a:effectRef>
+              <a:fontRef idx="minor">
+                <a:schemeClr val="lt1"/>
+              </a:fontRef>
+            </p:style>
             <p:txBody>
-              <a:bodyPr wrap="none" rtlCol="0">
-                <a:spAutoFit/>
-              </a:bodyPr>
+              <a:bodyPr rtlCol="0" anchor="ctr"/>
               <a:lstStyle/>
               <a:p>
-                <a:r>
-                  <a:rPr lang="en-US" sz="2800" dirty="0">
-                    <a:latin typeface="Courier" pitchFamily="2" charset="0"/>
-                  </a:rPr>
-                  <a:t>ac</a:t>
-                </a:r>
-                <a:r>
-                  <a:rPr lang="en-US" sz="2800" b="1" dirty="0">
-                    <a:latin typeface="Courier" pitchFamily="2" charset="0"/>
-                  </a:rPr>
-                  <a:t>c</a:t>
-                </a:r>
+                <a:pPr algn="ctr"/>
+                <a:endParaRPr lang="en-US"/>
               </a:p>
             </p:txBody>
           </p:sp>
           <p:sp>
             <p:nvSpPr>
-              <p:cNvPr id="112" name="TextBox 111">
+              <p:cNvPr id="62" name="Lightning Bolt 61">
                 <a:extLst>
                   <a:ext uri="{FF2B5EF4-FFF2-40B4-BE49-F238E27FC236}">
-                    <a16:creationId xmlns:a16="http://schemas.microsoft.com/office/drawing/2014/main" id="{4737B3E2-276A-E8B4-08CD-04882C5C1AEB}"/>
+                    <a16:creationId xmlns:a16="http://schemas.microsoft.com/office/drawing/2014/main" id="{71BBFB5C-B7D3-04F1-FD70-C0ADED29FFDC}"/>
                   </a:ext>
                 </a:extLst>
               </p:cNvPr>
-              <p:cNvSpPr txBox="1"/>
+              <p:cNvSpPr/>
               <p:nvPr/>
             </p:nvSpPr>
             <p:spPr>
-              <a:xfrm>
-                <a:off x="10610045" y="3248604"/>
-                <a:ext cx="829073" cy="523220"/>
+              <a:xfrm rot="5400000">
+                <a:off x="13526080" y="2139233"/>
+                <a:ext cx="364530" cy="499864"/>
               </a:xfrm>
-              <a:prstGeom prst="rect">
+              <a:prstGeom prst="lightningBolt">
                 <a:avLst/>
               </a:prstGeom>
-              <a:noFill/>
+              <a:solidFill>
+                <a:srgbClr val="FF0000"/>
+              </a:solidFill>
+              <a:ln>
+                <a:noFill/>
+              </a:ln>
             </p:spPr>
+            <p:style>
+              <a:lnRef idx="2">
+                <a:schemeClr val="accent1">
+                  <a:shade val="50000"/>
+                </a:schemeClr>
+              </a:lnRef>
+              <a:fillRef idx="1">
+                <a:schemeClr val="accent1"/>
+              </a:fillRef>
+              <a:effectRef idx="0">
+                <a:schemeClr val="accent1"/>
+              </a:effectRef>
+              <a:fontRef idx="minor">
+                <a:schemeClr val="lt1"/>
+              </a:fontRef>
+            </p:style>
             <p:txBody>
-              <a:bodyPr wrap="none" rtlCol="0">
-                <a:spAutoFit/>
-              </a:bodyPr>
+              <a:bodyPr rtlCol="0" anchor="ctr"/>
               <a:lstStyle/>
               <a:p>
-                <a:r>
-                  <a:rPr lang="en-US" sz="2800" dirty="0">
-                    <a:latin typeface="Courier" pitchFamily="2" charset="0"/>
-                  </a:rPr>
-                  <a:t>ac</a:t>
-                </a:r>
-                <a:r>
-                  <a:rPr lang="en-US" sz="2800" b="1" dirty="0">
-                    <a:latin typeface="Courier" pitchFamily="2" charset="0"/>
-                  </a:rPr>
-                  <a:t>c</a:t>
-                </a:r>
+                <a:pPr algn="ctr"/>
+                <a:endParaRPr lang="en-US"/>
               </a:p>
             </p:txBody>
           </p:sp>
           <p:sp>
             <p:nvSpPr>
-              <p:cNvPr id="113" name="TextBox 112">
+              <p:cNvPr id="63" name="Lightning Bolt 62">
                 <a:extLst>
                   <a:ext uri="{FF2B5EF4-FFF2-40B4-BE49-F238E27FC236}">
-                    <a16:creationId xmlns:a16="http://schemas.microsoft.com/office/drawing/2014/main" id="{020D6AC4-D5C5-946A-9673-ACBB3DF59AD8}"/>
+                    <a16:creationId xmlns:a16="http://schemas.microsoft.com/office/drawing/2014/main" id="{8994ABE7-D9CB-A06A-5440-DABAD02B1B0B}"/>
                   </a:ext>
                 </a:extLst>
               </p:cNvPr>
-              <p:cNvSpPr txBox="1"/>
+              <p:cNvSpPr/>
               <p:nvPr/>
             </p:nvSpPr>
             <p:spPr>
-              <a:xfrm>
-                <a:off x="12393125" y="2919420"/>
-                <a:ext cx="829073" cy="523220"/>
+              <a:xfrm rot="5400000">
+                <a:off x="11646384" y="582235"/>
+                <a:ext cx="364530" cy="499864"/>
               </a:xfrm>
-              <a:prstGeom prst="rect">
+              <a:prstGeom prst="lightningBolt">
                 <a:avLst/>
               </a:prstGeom>
-              <a:noFill/>
+              <a:solidFill>
+                <a:srgbClr val="FF0000"/>
+              </a:solidFill>
+              <a:ln>
+                <a:noFill/>
+              </a:ln>
             </p:spPr>
+            <p:style>
+              <a:lnRef idx="2">
+                <a:schemeClr val="accent1">
+                  <a:shade val="50000"/>
+                </a:schemeClr>
+              </a:lnRef>
+              <a:fillRef idx="1">
+                <a:schemeClr val="accent1"/>
+              </a:fillRef>
+              <a:effectRef idx="0">
+                <a:schemeClr val="accent1"/>
+              </a:effectRef>
+              <a:fontRef idx="minor">
+                <a:schemeClr val="lt1"/>
+              </a:fontRef>
+            </p:style>
             <p:txBody>
-              <a:bodyPr wrap="none" rtlCol="0">
-                <a:spAutoFit/>
-              </a:bodyPr>
+              <a:bodyPr rtlCol="0" anchor="ctr"/>
               <a:lstStyle/>
               <a:p>
-                <a:r>
-                  <a:rPr lang="en-US" sz="2800" dirty="0">
-                    <a:latin typeface="Courier" pitchFamily="2" charset="0"/>
-                  </a:rPr>
-                  <a:t>ac</a:t>
-                </a:r>
-                <a:r>
-                  <a:rPr lang="en-US" sz="2800" b="1" dirty="0">
-                    <a:latin typeface="Courier" pitchFamily="2" charset="0"/>
-                  </a:rPr>
-                  <a:t>c</a:t>
-                </a:r>
+                <a:pPr algn="ctr"/>
+                <a:endParaRPr lang="en-US"/>
               </a:p>
             </p:txBody>
           </p:sp>
-          <p:sp>
-            <p:nvSpPr>
-              <p:cNvPr id="114" name="TextBox 113">
+        </p:grpSp>
+        <p:grpSp>
+          <p:nvGrpSpPr>
+            <p:cNvPr id="42" name="Group 41">
+              <a:extLst>
+                <a:ext uri="{FF2B5EF4-FFF2-40B4-BE49-F238E27FC236}">
+                  <a16:creationId xmlns:a16="http://schemas.microsoft.com/office/drawing/2014/main" id="{673E85BA-5337-8F96-66CE-235884446371}"/>
+                </a:ext>
+              </a:extLst>
+            </p:cNvPr>
+            <p:cNvGrpSpPr/>
+            <p:nvPr/>
+          </p:nvGrpSpPr>
+          <p:grpSpPr>
+            <a:xfrm>
+              <a:off x="8908943" y="4587244"/>
+              <a:ext cx="8077892" cy="3667105"/>
+              <a:chOff x="6945674" y="413964"/>
+              <a:chExt cx="8077892" cy="3667105"/>
+            </a:xfrm>
+          </p:grpSpPr>
+          <p:grpSp>
+            <p:nvGrpSpPr>
+              <p:cNvPr id="46" name="Group 45">
                 <a:extLst>
                   <a:ext uri="{FF2B5EF4-FFF2-40B4-BE49-F238E27FC236}">
-                    <a16:creationId xmlns:a16="http://schemas.microsoft.com/office/drawing/2014/main" id="{76751441-521B-C8EC-15BF-A86D7DB6FE25}"/>
+                    <a16:creationId xmlns:a16="http://schemas.microsoft.com/office/drawing/2014/main" id="{05754702-90F6-780C-2634-94639065C99B}"/>
                   </a:ext>
                 </a:extLst>
               </p:cNvPr>
-              <p:cNvSpPr txBox="1"/>
+              <p:cNvGrpSpPr/>
               <p:nvPr/>
-            </p:nvSpPr>
-            <p:spPr>
+            </p:nvGrpSpPr>
+            <p:grpSpPr>
               <a:xfrm>
-                <a:off x="12393125" y="3557849"/>
-                <a:ext cx="829073" cy="523220"/>
+                <a:off x="6945674" y="413964"/>
+                <a:ext cx="8077892" cy="3667105"/>
+                <a:chOff x="6945674" y="413964"/>
+                <a:chExt cx="8077892" cy="3667105"/>
               </a:xfrm>
-              <a:prstGeom prst="rect">
-                <a:avLst/>
-              </a:prstGeom>
-              <a:noFill/>
-            </p:spPr>
-            <p:txBody>
-              <a:bodyPr wrap="none" rtlCol="0">
-                <a:spAutoFit/>
-              </a:bodyPr>
-              <a:lstStyle/>
-              <a:p>
-                <a:r>
-                  <a:rPr lang="en-US" sz="2800" dirty="0" err="1">
+            </p:grpSpPr>
+            <p:pic>
+              <p:nvPicPr>
+                <p:cNvPr id="48" name="Picture 47">
+                  <a:extLst>
+                    <a:ext uri="{FF2B5EF4-FFF2-40B4-BE49-F238E27FC236}">
+                      <a16:creationId xmlns:a16="http://schemas.microsoft.com/office/drawing/2014/main" id="{18325514-BBD3-1DAA-0DE7-EE66EBF9610E}"/>
+                    </a:ext>
+                  </a:extLst>
+                </p:cNvPr>
+                <p:cNvPicPr>
+                  <a:picLocks noChangeAspect="1"/>
+                </p:cNvPicPr>
+                <p:nvPr/>
+              </p:nvPicPr>
+              <p:blipFill rotWithShape="1">
+                <a:blip r:embed="rId2"/>
+                <a:srcRect l="14477" t="19196" r="23362" b="16224"/>
+                <a:stretch/>
+              </p:blipFill>
+              <p:spPr>
+                <a:xfrm>
+                  <a:off x="6945674" y="575179"/>
+                  <a:ext cx="7513416" cy="3469283"/>
+                </a:xfrm>
+                <a:prstGeom prst="rect">
+                  <a:avLst/>
+                </a:prstGeom>
+              </p:spPr>
+            </p:pic>
+            <p:sp>
+              <p:nvSpPr>
+                <p:cNvPr id="49" name="TextBox 48">
+                  <a:extLst>
+                    <a:ext uri="{FF2B5EF4-FFF2-40B4-BE49-F238E27FC236}">
+                      <a16:creationId xmlns:a16="http://schemas.microsoft.com/office/drawing/2014/main" id="{9A3EB3C3-E479-5325-B721-C19FD63F334A}"/>
+                    </a:ext>
+                  </a:extLst>
+                </p:cNvPr>
+                <p:cNvSpPr txBox="1"/>
+                <p:nvPr/>
+              </p:nvSpPr>
+              <p:spPr>
+                <a:xfrm>
+                  <a:off x="8839157" y="2309820"/>
+                  <a:ext cx="829073" cy="523220"/>
+                </a:xfrm>
+                <a:prstGeom prst="rect">
+                  <a:avLst/>
+                </a:prstGeom>
+                <a:noFill/>
+              </p:spPr>
+              <p:txBody>
+                <a:bodyPr wrap="none" rtlCol="0">
+                  <a:spAutoFit/>
+                </a:bodyPr>
+                <a:lstStyle/>
+                <a:p>
+                  <a:r>
+                    <a:rPr lang="en-US" sz="2800" dirty="0" err="1">
+                      <a:latin typeface="Courier" pitchFamily="2" charset="0"/>
+                    </a:rPr>
+                    <a:t>g</a:t>
+                  </a:r>
+                  <a:r>
+                    <a:rPr lang="en-US" sz="2800" b="1" dirty="0" err="1">
+                      <a:latin typeface="Courier" pitchFamily="2" charset="0"/>
+                    </a:rPr>
+                    <a:t>c</a:t>
+                  </a:r>
+                  <a:r>
+                    <a:rPr lang="en-US" sz="2800" dirty="0" err="1">
+                      <a:latin typeface="Courier" pitchFamily="2" charset="0"/>
+                    </a:rPr>
+                    <a:t>a</a:t>
+                  </a:r>
+                  <a:endParaRPr lang="en-US" sz="2800" dirty="0">
                     <a:latin typeface="Courier" pitchFamily="2" charset="0"/>
-                  </a:rPr>
-                  <a:t>ac</a:t>
-                </a:r>
-                <a:r>
-                  <a:rPr lang="en-US" sz="2800" b="1" dirty="0" err="1">
+                  </a:endParaRPr>
+                </a:p>
+              </p:txBody>
+            </p:sp>
+            <p:sp>
+              <p:nvSpPr>
+                <p:cNvPr id="50" name="TextBox 49">
+                  <a:extLst>
+                    <a:ext uri="{FF2B5EF4-FFF2-40B4-BE49-F238E27FC236}">
+                      <a16:creationId xmlns:a16="http://schemas.microsoft.com/office/drawing/2014/main" id="{E2EE91A6-F911-4503-BDDD-60017C786944}"/>
+                    </a:ext>
+                  </a:extLst>
+                </p:cNvPr>
+                <p:cNvSpPr txBox="1"/>
+                <p:nvPr/>
+              </p:nvSpPr>
+              <p:spPr>
+                <a:xfrm>
+                  <a:off x="10610045" y="3248604"/>
+                  <a:ext cx="829073" cy="523220"/>
+                </a:xfrm>
+                <a:prstGeom prst="rect">
+                  <a:avLst/>
+                </a:prstGeom>
+                <a:noFill/>
+              </p:spPr>
+              <p:txBody>
+                <a:bodyPr wrap="none" rtlCol="0">
+                  <a:spAutoFit/>
+                </a:bodyPr>
+                <a:lstStyle/>
+                <a:p>
+                  <a:r>
+                    <a:rPr lang="en-US" sz="2800" dirty="0" err="1">
+                      <a:latin typeface="Courier" pitchFamily="2" charset="0"/>
+                    </a:rPr>
+                    <a:t>g</a:t>
+                  </a:r>
+                  <a:r>
+                    <a:rPr lang="en-US" sz="2800" b="1" dirty="0" err="1">
+                      <a:latin typeface="Courier" pitchFamily="2" charset="0"/>
+                    </a:rPr>
+                    <a:t>c</a:t>
+                  </a:r>
+                  <a:r>
+                    <a:rPr lang="en-US" sz="2800" dirty="0" err="1">
+                      <a:latin typeface="Courier" pitchFamily="2" charset="0"/>
+                    </a:rPr>
+                    <a:t>a</a:t>
+                  </a:r>
+                  <a:endParaRPr lang="en-US" sz="2800" dirty="0">
+                    <a:latin typeface="Courier" pitchFamily="2" charset="0"/>
+                  </a:endParaRPr>
+                </a:p>
+              </p:txBody>
+            </p:sp>
+            <p:sp>
+              <p:nvSpPr>
+                <p:cNvPr id="51" name="TextBox 50">
+                  <a:extLst>
+                    <a:ext uri="{FF2B5EF4-FFF2-40B4-BE49-F238E27FC236}">
+                      <a16:creationId xmlns:a16="http://schemas.microsoft.com/office/drawing/2014/main" id="{002E6E0F-2960-FDBB-27F3-5E7ABB0F6A54}"/>
+                    </a:ext>
+                  </a:extLst>
+                </p:cNvPr>
+                <p:cNvSpPr txBox="1"/>
+                <p:nvPr/>
+              </p:nvSpPr>
+              <p:spPr>
+                <a:xfrm>
+                  <a:off x="12393125" y="2919420"/>
+                  <a:ext cx="829073" cy="523220"/>
+                </a:xfrm>
+                <a:prstGeom prst="rect">
+                  <a:avLst/>
+                </a:prstGeom>
+                <a:noFill/>
+              </p:spPr>
+              <p:txBody>
+                <a:bodyPr wrap="none" rtlCol="0">
+                  <a:spAutoFit/>
+                </a:bodyPr>
+                <a:lstStyle/>
+                <a:p>
+                  <a:r>
+                    <a:rPr lang="en-US" sz="2800" dirty="0" err="1">
+                      <a:latin typeface="Courier" pitchFamily="2" charset="0"/>
+                    </a:rPr>
+                    <a:t>g</a:t>
+                  </a:r>
+                  <a:r>
+                    <a:rPr lang="en-US" sz="2800" b="1" dirty="0" err="1">
+                      <a:latin typeface="Courier" pitchFamily="2" charset="0"/>
+                    </a:rPr>
+                    <a:t>c</a:t>
+                  </a:r>
+                  <a:r>
+                    <a:rPr lang="en-US" sz="2800" dirty="0" err="1">
+                      <a:latin typeface="Courier" pitchFamily="2" charset="0"/>
+                    </a:rPr>
+                    <a:t>a</a:t>
+                  </a:r>
+                  <a:endParaRPr lang="en-US" sz="2800" b="1" dirty="0">
+                    <a:latin typeface="Courier" pitchFamily="2" charset="0"/>
+                  </a:endParaRPr>
+                </a:p>
+              </p:txBody>
+            </p:sp>
+            <p:sp>
+              <p:nvSpPr>
+                <p:cNvPr id="52" name="TextBox 51">
+                  <a:extLst>
+                    <a:ext uri="{FF2B5EF4-FFF2-40B4-BE49-F238E27FC236}">
+                      <a16:creationId xmlns:a16="http://schemas.microsoft.com/office/drawing/2014/main" id="{9460A7D8-37A0-BA86-0B21-D151D43D1A96}"/>
+                    </a:ext>
+                  </a:extLst>
+                </p:cNvPr>
+                <p:cNvSpPr txBox="1"/>
+                <p:nvPr/>
+              </p:nvSpPr>
+              <p:spPr>
+                <a:xfrm>
+                  <a:off x="12393125" y="3557849"/>
+                  <a:ext cx="829073" cy="523220"/>
+                </a:xfrm>
+                <a:prstGeom prst="rect">
+                  <a:avLst/>
+                </a:prstGeom>
+                <a:noFill/>
+              </p:spPr>
+              <p:txBody>
+                <a:bodyPr wrap="none" rtlCol="0">
+                  <a:spAutoFit/>
+                </a:bodyPr>
+                <a:lstStyle/>
+                <a:p>
+                  <a:r>
+                    <a:rPr lang="en-US" sz="2800" dirty="0" err="1">
+                      <a:latin typeface="Courier" pitchFamily="2" charset="0"/>
+                    </a:rPr>
+                    <a:t>g</a:t>
+                  </a:r>
+                  <a:r>
+                    <a:rPr lang="en-US" sz="2800" b="1" dirty="0" err="1">
+                      <a:latin typeface="Courier" pitchFamily="2" charset="0"/>
+                    </a:rPr>
+                    <a:t>c</a:t>
+                  </a:r>
+                  <a:r>
+                    <a:rPr lang="en-US" sz="2800" dirty="0" err="1">
+                      <a:latin typeface="Courier" pitchFamily="2" charset="0"/>
+                    </a:rPr>
+                    <a:t>a</a:t>
+                  </a:r>
+                  <a:endParaRPr lang="en-US" sz="2800" dirty="0">
+                    <a:latin typeface="Courier" pitchFamily="2" charset="0"/>
+                  </a:endParaRPr>
+                </a:p>
+              </p:txBody>
+            </p:sp>
+            <p:sp>
+              <p:nvSpPr>
+                <p:cNvPr id="53" name="TextBox 52">
+                  <a:extLst>
+                    <a:ext uri="{FF2B5EF4-FFF2-40B4-BE49-F238E27FC236}">
+                      <a16:creationId xmlns:a16="http://schemas.microsoft.com/office/drawing/2014/main" id="{B40C4209-17BC-F8D6-22C1-02B31E3F49F1}"/>
+                    </a:ext>
+                  </a:extLst>
+                </p:cNvPr>
+                <p:cNvSpPr txBox="1"/>
+                <p:nvPr/>
+              </p:nvSpPr>
+              <p:spPr>
+                <a:xfrm>
+                  <a:off x="10610045" y="1355796"/>
+                  <a:ext cx="829073" cy="523220"/>
+                </a:xfrm>
+                <a:prstGeom prst="rect">
+                  <a:avLst/>
+                </a:prstGeom>
+                <a:noFill/>
+              </p:spPr>
+              <p:txBody>
+                <a:bodyPr wrap="none" rtlCol="0">
+                  <a:spAutoFit/>
+                </a:bodyPr>
+                <a:lstStyle/>
+                <a:p>
+                  <a:r>
+                    <a:rPr lang="en-US" sz="2800" dirty="0" err="1">
+                      <a:latin typeface="Courier" pitchFamily="2" charset="0"/>
+                    </a:rPr>
+                    <a:t>g</a:t>
+                  </a:r>
+                  <a:r>
+                    <a:rPr lang="en-US" sz="2800" b="1" dirty="0" err="1">
+                      <a:latin typeface="Courier" pitchFamily="2" charset="0"/>
+                    </a:rPr>
+                    <a:t>c</a:t>
+                  </a:r>
+                  <a:r>
+                    <a:rPr lang="en-US" sz="2800" dirty="0" err="1">
+                      <a:latin typeface="Courier" pitchFamily="2" charset="0"/>
+                    </a:rPr>
+                    <a:t>a</a:t>
+                  </a:r>
+                  <a:endParaRPr lang="en-US" sz="2800" dirty="0">
+                    <a:latin typeface="Courier" pitchFamily="2" charset="0"/>
+                  </a:endParaRPr>
+                </a:p>
+              </p:txBody>
+            </p:sp>
+            <p:sp>
+              <p:nvSpPr>
+                <p:cNvPr id="54" name="TextBox 53">
+                  <a:extLst>
+                    <a:ext uri="{FF2B5EF4-FFF2-40B4-BE49-F238E27FC236}">
+                      <a16:creationId xmlns:a16="http://schemas.microsoft.com/office/drawing/2014/main" id="{CD377C53-C181-9ED0-9F7E-EA60C85E7FBF}"/>
+                    </a:ext>
+                  </a:extLst>
+                </p:cNvPr>
+                <p:cNvSpPr txBox="1"/>
+                <p:nvPr/>
+              </p:nvSpPr>
+              <p:spPr>
+                <a:xfrm>
+                  <a:off x="12393125" y="1986732"/>
+                  <a:ext cx="829073" cy="523220"/>
+                </a:xfrm>
+                <a:prstGeom prst="rect">
+                  <a:avLst/>
+                </a:prstGeom>
+                <a:noFill/>
+              </p:spPr>
+              <p:txBody>
+                <a:bodyPr wrap="none" rtlCol="0">
+                  <a:spAutoFit/>
+                </a:bodyPr>
+                <a:lstStyle/>
+                <a:p>
+                  <a:r>
+                    <a:rPr lang="en-US" sz="2800" dirty="0" err="1">
+                      <a:latin typeface="Courier" pitchFamily="2" charset="0"/>
+                    </a:rPr>
+                    <a:t>g</a:t>
+                  </a:r>
+                  <a:r>
+                    <a:rPr lang="en-US" sz="2800" b="1" dirty="0" err="1">
+                      <a:solidFill>
+                        <a:srgbClr val="FF0000"/>
+                      </a:solidFill>
+                      <a:latin typeface="Courier" pitchFamily="2" charset="0"/>
+                    </a:rPr>
+                    <a:t>g</a:t>
+                  </a:r>
+                  <a:r>
+                    <a:rPr lang="en-US" sz="2800" dirty="0" err="1">
+                      <a:latin typeface="Courier" pitchFamily="2" charset="0"/>
+                    </a:rPr>
+                    <a:t>a</a:t>
+                  </a:r>
+                  <a:endParaRPr lang="en-US" sz="2800" b="1" dirty="0">
+                    <a:latin typeface="Courier" pitchFamily="2" charset="0"/>
+                  </a:endParaRPr>
+                </a:p>
+              </p:txBody>
+            </p:sp>
+            <p:sp>
+              <p:nvSpPr>
+                <p:cNvPr id="55" name="TextBox 54">
+                  <a:extLst>
+                    <a:ext uri="{FF2B5EF4-FFF2-40B4-BE49-F238E27FC236}">
+                      <a16:creationId xmlns:a16="http://schemas.microsoft.com/office/drawing/2014/main" id="{F1F6041B-CC99-0C7C-501A-0803BDB4AC69}"/>
+                    </a:ext>
+                  </a:extLst>
+                </p:cNvPr>
+                <p:cNvSpPr txBox="1"/>
+                <p:nvPr/>
+              </p:nvSpPr>
+              <p:spPr>
+                <a:xfrm>
+                  <a:off x="12393125" y="715716"/>
+                  <a:ext cx="829073" cy="523220"/>
+                </a:xfrm>
+                <a:prstGeom prst="rect">
+                  <a:avLst/>
+                </a:prstGeom>
+                <a:noFill/>
+              </p:spPr>
+              <p:txBody>
+                <a:bodyPr wrap="none" rtlCol="0">
+                  <a:spAutoFit/>
+                </a:bodyPr>
+                <a:lstStyle/>
+                <a:p>
+                  <a:r>
+                    <a:rPr lang="en-US" sz="2800" dirty="0" err="1">
+                      <a:latin typeface="Courier" pitchFamily="2" charset="0"/>
+                    </a:rPr>
+                    <a:t>g</a:t>
+                  </a:r>
+                  <a:r>
+                    <a:rPr lang="en-US" sz="2800" b="1" dirty="0" err="1">
+                      <a:latin typeface="Courier" pitchFamily="2" charset="0"/>
+                    </a:rPr>
+                    <a:t>c</a:t>
+                  </a:r>
+                  <a:r>
+                    <a:rPr lang="en-US" sz="2800" dirty="0" err="1">
+                      <a:latin typeface="Courier" pitchFamily="2" charset="0"/>
+                    </a:rPr>
+                    <a:t>a</a:t>
+                  </a:r>
+                  <a:endParaRPr lang="en-US" sz="2800" b="1" dirty="0">
                     <a:solidFill>
                       <a:srgbClr val="FF0000"/>
                     </a:solidFill>
                     <a:latin typeface="Courier" pitchFamily="2" charset="0"/>
-                  </a:rPr>
-                  <a:t>g</a:t>
-                </a:r>
-                <a:endParaRPr lang="en-US" sz="2800" b="1" dirty="0">
-                  <a:solidFill>
-                    <a:srgbClr val="FF0000"/>
-                  </a:solidFill>
-                  <a:latin typeface="Courier" pitchFamily="2" charset="0"/>
-                </a:endParaRPr>
-              </a:p>
-            </p:txBody>
-          </p:sp>
-          <p:sp>
-            <p:nvSpPr>
-              <p:cNvPr id="115" name="TextBox 114">
-                <a:extLst>
-                  <a:ext uri="{FF2B5EF4-FFF2-40B4-BE49-F238E27FC236}">
-                    <a16:creationId xmlns:a16="http://schemas.microsoft.com/office/drawing/2014/main" id="{25431F32-D57D-DF03-D401-F83FF5C1A779}"/>
-                  </a:ext>
-                </a:extLst>
-              </p:cNvPr>
-              <p:cNvSpPr txBox="1"/>
-              <p:nvPr/>
-            </p:nvSpPr>
-            <p:spPr>
-              <a:xfrm>
-                <a:off x="10610045" y="1355796"/>
-                <a:ext cx="829073" cy="523220"/>
-              </a:xfrm>
-              <a:prstGeom prst="rect">
-                <a:avLst/>
-              </a:prstGeom>
-              <a:noFill/>
-            </p:spPr>
-            <p:txBody>
-              <a:bodyPr wrap="none" rtlCol="0">
-                <a:spAutoFit/>
-              </a:bodyPr>
-              <a:lstStyle/>
-              <a:p>
-                <a:r>
-                  <a:rPr lang="en-US" sz="2800" dirty="0">
-                    <a:latin typeface="Courier" pitchFamily="2" charset="0"/>
-                  </a:rPr>
-                  <a:t>ac</a:t>
-                </a:r>
-                <a:r>
-                  <a:rPr lang="en-US" sz="2800" b="1" dirty="0">
-                    <a:latin typeface="Courier" pitchFamily="2" charset="0"/>
-                  </a:rPr>
-                  <a:t>c</a:t>
-                </a:r>
-              </a:p>
-            </p:txBody>
-          </p:sp>
-          <p:sp>
-            <p:nvSpPr>
-              <p:cNvPr id="116" name="TextBox 115">
-                <a:extLst>
-                  <a:ext uri="{FF2B5EF4-FFF2-40B4-BE49-F238E27FC236}">
-                    <a16:creationId xmlns:a16="http://schemas.microsoft.com/office/drawing/2014/main" id="{73290E34-F612-3527-90FA-DE5A3A0A2229}"/>
-                  </a:ext>
-                </a:extLst>
-              </p:cNvPr>
-              <p:cNvSpPr txBox="1"/>
-              <p:nvPr/>
-            </p:nvSpPr>
-            <p:spPr>
-              <a:xfrm>
-                <a:off x="12393125" y="1986732"/>
-                <a:ext cx="829073" cy="523220"/>
-              </a:xfrm>
-              <a:prstGeom prst="rect">
-                <a:avLst/>
-              </a:prstGeom>
-              <a:noFill/>
-            </p:spPr>
-            <p:txBody>
-              <a:bodyPr wrap="none" rtlCol="0">
-                <a:spAutoFit/>
-              </a:bodyPr>
-              <a:lstStyle/>
-              <a:p>
-                <a:r>
-                  <a:rPr lang="en-US" sz="2800" dirty="0">
-                    <a:latin typeface="Courier" pitchFamily="2" charset="0"/>
-                  </a:rPr>
-                  <a:t>ac</a:t>
-                </a:r>
-                <a:r>
-                  <a:rPr lang="en-US" sz="2800" b="1" dirty="0">
-                    <a:latin typeface="Courier" pitchFamily="2" charset="0"/>
-                  </a:rPr>
-                  <a:t>c</a:t>
-                </a:r>
-              </a:p>
-            </p:txBody>
-          </p:sp>
-          <p:sp>
-            <p:nvSpPr>
-              <p:cNvPr id="117" name="TextBox 116">
-                <a:extLst>
-                  <a:ext uri="{FF2B5EF4-FFF2-40B4-BE49-F238E27FC236}">
-                    <a16:creationId xmlns:a16="http://schemas.microsoft.com/office/drawing/2014/main" id="{84BCCA01-A566-FF1F-3DC5-ACADAAADFFF9}"/>
-                  </a:ext>
-                </a:extLst>
-              </p:cNvPr>
-              <p:cNvSpPr txBox="1"/>
-              <p:nvPr/>
-            </p:nvSpPr>
-            <p:spPr>
-              <a:xfrm>
-                <a:off x="12393125" y="715716"/>
-                <a:ext cx="829073" cy="523220"/>
-              </a:xfrm>
-              <a:prstGeom prst="rect">
-                <a:avLst/>
-              </a:prstGeom>
-              <a:noFill/>
-            </p:spPr>
-            <p:txBody>
-              <a:bodyPr wrap="none" rtlCol="0">
-                <a:spAutoFit/>
-              </a:bodyPr>
-              <a:lstStyle/>
-              <a:p>
-                <a:r>
-                  <a:rPr lang="en-US" sz="2800" dirty="0" err="1">
-                    <a:latin typeface="Courier" pitchFamily="2" charset="0"/>
-                  </a:rPr>
-                  <a:t>ac</a:t>
-                </a:r>
-                <a:r>
-                  <a:rPr lang="en-US" sz="2800" b="1" dirty="0" err="1">
+                  </a:endParaRPr>
+                </a:p>
+              </p:txBody>
+            </p:sp>
+            <p:sp>
+              <p:nvSpPr>
+                <p:cNvPr id="56" name="TextBox 55">
+                  <a:extLst>
+                    <a:ext uri="{FF2B5EF4-FFF2-40B4-BE49-F238E27FC236}">
+                      <a16:creationId xmlns:a16="http://schemas.microsoft.com/office/drawing/2014/main" id="{690F2D6B-14B0-5DDA-A59A-DE875A053A48}"/>
+                    </a:ext>
+                  </a:extLst>
+                </p:cNvPr>
+                <p:cNvSpPr txBox="1"/>
+                <p:nvPr/>
+              </p:nvSpPr>
+              <p:spPr>
+                <a:xfrm>
+                  <a:off x="14194493" y="413964"/>
+                  <a:ext cx="829073" cy="523220"/>
+                </a:xfrm>
+                <a:prstGeom prst="rect">
+                  <a:avLst/>
+                </a:prstGeom>
+                <a:noFill/>
+              </p:spPr>
+              <p:txBody>
+                <a:bodyPr wrap="none" rtlCol="0">
+                  <a:spAutoFit/>
+                </a:bodyPr>
+                <a:lstStyle/>
+                <a:p>
+                  <a:r>
+                    <a:rPr lang="en-US" sz="2800" dirty="0" err="1">
+                      <a:latin typeface="Courier" pitchFamily="2" charset="0"/>
+                    </a:rPr>
+                    <a:t>g</a:t>
+                  </a:r>
+                  <a:r>
+                    <a:rPr lang="en-US" sz="2800" b="1" dirty="0" err="1">
+                      <a:latin typeface="Courier" pitchFamily="2" charset="0"/>
+                    </a:rPr>
+                    <a:t>c</a:t>
+                  </a:r>
+                  <a:r>
+                    <a:rPr lang="en-US" sz="2800" dirty="0" err="1">
+                      <a:latin typeface="Courier" pitchFamily="2" charset="0"/>
+                    </a:rPr>
+                    <a:t>a</a:t>
+                  </a:r>
+                  <a:endParaRPr lang="en-US" sz="2800" b="1" dirty="0">
                     <a:solidFill>
                       <a:srgbClr val="FF0000"/>
                     </a:solidFill>
                     <a:latin typeface="Courier" pitchFamily="2" charset="0"/>
-                  </a:rPr>
-                  <a:t>g</a:t>
-                </a:r>
-                <a:endParaRPr lang="en-US" sz="2800" b="1" dirty="0">
-                  <a:solidFill>
-                    <a:srgbClr val="FF0000"/>
-                  </a:solidFill>
-                  <a:latin typeface="Courier" pitchFamily="2" charset="0"/>
-                </a:endParaRPr>
-              </a:p>
-            </p:txBody>
-          </p:sp>
-          <p:sp>
-            <p:nvSpPr>
-              <p:cNvPr id="118" name="TextBox 117">
-                <a:extLst>
-                  <a:ext uri="{FF2B5EF4-FFF2-40B4-BE49-F238E27FC236}">
-                    <a16:creationId xmlns:a16="http://schemas.microsoft.com/office/drawing/2014/main" id="{B4EC7DD7-137E-FF6B-5E11-9E8F84054947}"/>
-                  </a:ext>
-                </a:extLst>
-              </p:cNvPr>
-              <p:cNvSpPr txBox="1"/>
-              <p:nvPr/>
-            </p:nvSpPr>
-            <p:spPr>
-              <a:xfrm>
-                <a:off x="14194493" y="413964"/>
-                <a:ext cx="829073" cy="523220"/>
-              </a:xfrm>
-              <a:prstGeom prst="rect">
-                <a:avLst/>
-              </a:prstGeom>
-              <a:noFill/>
-            </p:spPr>
-            <p:txBody>
-              <a:bodyPr wrap="none" rtlCol="0">
-                <a:spAutoFit/>
-              </a:bodyPr>
-              <a:lstStyle/>
-              <a:p>
-                <a:r>
-                  <a:rPr lang="en-US" sz="2800" dirty="0" err="1">
-                    <a:latin typeface="Courier" pitchFamily="2" charset="0"/>
-                  </a:rPr>
-                  <a:t>ac</a:t>
-                </a:r>
-                <a:r>
-                  <a:rPr lang="en-US" sz="2800" b="1" dirty="0" err="1">
+                  </a:endParaRPr>
+                </a:p>
+              </p:txBody>
+            </p:sp>
+            <p:sp>
+              <p:nvSpPr>
+                <p:cNvPr id="57" name="TextBox 56">
+                  <a:extLst>
+                    <a:ext uri="{FF2B5EF4-FFF2-40B4-BE49-F238E27FC236}">
+                      <a16:creationId xmlns:a16="http://schemas.microsoft.com/office/drawing/2014/main" id="{89DF3E15-6EB5-223F-C576-8CCA1736E8EB}"/>
+                    </a:ext>
+                  </a:extLst>
+                </p:cNvPr>
+                <p:cNvSpPr txBox="1"/>
+                <p:nvPr/>
+              </p:nvSpPr>
+              <p:spPr>
+                <a:xfrm>
+                  <a:off x="14194493" y="1034320"/>
+                  <a:ext cx="829073" cy="523220"/>
+                </a:xfrm>
+                <a:prstGeom prst="rect">
+                  <a:avLst/>
+                </a:prstGeom>
+                <a:noFill/>
+              </p:spPr>
+              <p:txBody>
+                <a:bodyPr wrap="none" rtlCol="0">
+                  <a:spAutoFit/>
+                </a:bodyPr>
+                <a:lstStyle/>
+                <a:p>
+                  <a:r>
+                    <a:rPr lang="en-US" sz="2800" dirty="0" err="1">
+                      <a:latin typeface="Courier" pitchFamily="2" charset="0"/>
+                    </a:rPr>
+                    <a:t>g</a:t>
+                  </a:r>
+                  <a:r>
+                    <a:rPr lang="en-US" sz="2800" b="1" dirty="0" err="1">
+                      <a:latin typeface="Courier" pitchFamily="2" charset="0"/>
+                    </a:rPr>
+                    <a:t>c</a:t>
+                  </a:r>
+                  <a:r>
+                    <a:rPr lang="en-US" sz="2800" dirty="0" err="1">
+                      <a:latin typeface="Courier" pitchFamily="2" charset="0"/>
+                    </a:rPr>
+                    <a:t>a</a:t>
+                  </a:r>
+                  <a:endParaRPr lang="en-US" sz="2800" b="1" dirty="0">
                     <a:solidFill>
                       <a:srgbClr val="FF0000"/>
                     </a:solidFill>
                     <a:latin typeface="Courier" pitchFamily="2" charset="0"/>
-                  </a:rPr>
-                  <a:t>g</a:t>
-                </a:r>
-                <a:endParaRPr lang="en-US" sz="2800" b="1" dirty="0">
-                  <a:solidFill>
-                    <a:srgbClr val="FF0000"/>
-                  </a:solidFill>
-                  <a:latin typeface="Courier" pitchFamily="2" charset="0"/>
-                </a:endParaRPr>
-              </a:p>
-            </p:txBody>
-          </p:sp>
-          <p:sp>
-            <p:nvSpPr>
-              <p:cNvPr id="119" name="TextBox 118">
-                <a:extLst>
-                  <a:ext uri="{FF2B5EF4-FFF2-40B4-BE49-F238E27FC236}">
-                    <a16:creationId xmlns:a16="http://schemas.microsoft.com/office/drawing/2014/main" id="{F7EF6A6B-0740-907B-71C4-E7E9AECAD602}"/>
-                  </a:ext>
-                </a:extLst>
-              </p:cNvPr>
-              <p:cNvSpPr txBox="1"/>
-              <p:nvPr/>
-            </p:nvSpPr>
-            <p:spPr>
-              <a:xfrm>
-                <a:off x="14194493" y="1034320"/>
-                <a:ext cx="829073" cy="523220"/>
-              </a:xfrm>
-              <a:prstGeom prst="rect">
-                <a:avLst/>
-              </a:prstGeom>
-              <a:noFill/>
-            </p:spPr>
-            <p:txBody>
-              <a:bodyPr wrap="none" rtlCol="0">
-                <a:spAutoFit/>
-              </a:bodyPr>
-              <a:lstStyle/>
-              <a:p>
-                <a:r>
-                  <a:rPr lang="en-US" sz="2800" dirty="0" err="1">
+                  </a:endParaRPr>
+                </a:p>
+              </p:txBody>
+            </p:sp>
+            <p:sp>
+              <p:nvSpPr>
+                <p:cNvPr id="58" name="TextBox 57">
+                  <a:extLst>
+                    <a:ext uri="{FF2B5EF4-FFF2-40B4-BE49-F238E27FC236}">
+                      <a16:creationId xmlns:a16="http://schemas.microsoft.com/office/drawing/2014/main" id="{D355A262-B0FD-F51C-4F2E-D681BD5D1042}"/>
+                    </a:ext>
+                  </a:extLst>
+                </p:cNvPr>
+                <p:cNvSpPr txBox="1"/>
+                <p:nvPr/>
+              </p:nvSpPr>
+              <p:spPr>
+                <a:xfrm>
+                  <a:off x="14194493" y="1661296"/>
+                  <a:ext cx="829073" cy="523220"/>
+                </a:xfrm>
+                <a:prstGeom prst="rect">
+                  <a:avLst/>
+                </a:prstGeom>
+                <a:noFill/>
+              </p:spPr>
+              <p:txBody>
+                <a:bodyPr wrap="none" rtlCol="0">
+                  <a:spAutoFit/>
+                </a:bodyPr>
+                <a:lstStyle/>
+                <a:p>
+                  <a:r>
+                    <a:rPr lang="en-US" sz="2800" dirty="0" err="1">
+                      <a:latin typeface="Courier" pitchFamily="2" charset="0"/>
+                    </a:rPr>
+                    <a:t>g</a:t>
+                  </a:r>
+                  <a:r>
+                    <a:rPr lang="en-US" sz="2800" b="1" dirty="0" err="1">
+                      <a:solidFill>
+                        <a:srgbClr val="FF0000"/>
+                      </a:solidFill>
+                      <a:latin typeface="Courier" pitchFamily="2" charset="0"/>
+                    </a:rPr>
+                    <a:t>g</a:t>
+                  </a:r>
+                  <a:r>
+                    <a:rPr lang="en-US" sz="2800" dirty="0" err="1">
+                      <a:latin typeface="Courier" pitchFamily="2" charset="0"/>
+                    </a:rPr>
+                    <a:t>a</a:t>
+                  </a:r>
+                  <a:endParaRPr lang="en-US" sz="2800" b="1" dirty="0">
                     <a:latin typeface="Courier" pitchFamily="2" charset="0"/>
-                  </a:rPr>
-                  <a:t>ac</a:t>
-                </a:r>
-                <a:r>
-                  <a:rPr lang="en-US" sz="2800" b="1" dirty="0" err="1">
+                  </a:endParaRPr>
+                </a:p>
+              </p:txBody>
+            </p:sp>
+            <p:sp>
+              <p:nvSpPr>
+                <p:cNvPr id="59" name="TextBox 58">
+                  <a:extLst>
+                    <a:ext uri="{FF2B5EF4-FFF2-40B4-BE49-F238E27FC236}">
+                      <a16:creationId xmlns:a16="http://schemas.microsoft.com/office/drawing/2014/main" id="{0C62996A-F18B-087D-3E5F-74BAFF335CB9}"/>
+                    </a:ext>
+                  </a:extLst>
+                </p:cNvPr>
+                <p:cNvSpPr txBox="1"/>
+                <p:nvPr/>
+              </p:nvSpPr>
+              <p:spPr>
+                <a:xfrm>
+                  <a:off x="14194493" y="2289008"/>
+                  <a:ext cx="829073" cy="523220"/>
+                </a:xfrm>
+                <a:prstGeom prst="rect">
+                  <a:avLst/>
+                </a:prstGeom>
+                <a:noFill/>
+              </p:spPr>
+              <p:txBody>
+                <a:bodyPr wrap="none" rtlCol="0">
+                  <a:spAutoFit/>
+                </a:bodyPr>
+                <a:lstStyle/>
+                <a:p>
+                  <a:r>
+                    <a:rPr lang="en-US" sz="2800" dirty="0" err="1">
+                      <a:latin typeface="Courier" pitchFamily="2" charset="0"/>
+                    </a:rPr>
+                    <a:t>g</a:t>
+                  </a:r>
+                  <a:r>
+                    <a:rPr lang="en-US" sz="2800" b="1" dirty="0" err="1">
+                      <a:solidFill>
+                        <a:srgbClr val="FF0000"/>
+                      </a:solidFill>
+                      <a:latin typeface="Courier" pitchFamily="2" charset="0"/>
+                    </a:rPr>
+                    <a:t>g</a:t>
+                  </a:r>
+                  <a:r>
+                    <a:rPr lang="en-US" sz="2800" dirty="0" err="1">
+                      <a:latin typeface="Courier" pitchFamily="2" charset="0"/>
+                    </a:rPr>
+                    <a:t>a</a:t>
+                  </a:r>
+                  <a:endParaRPr lang="en-US" sz="2800" b="1" dirty="0">
                     <a:solidFill>
                       <a:srgbClr val="FF0000"/>
                     </a:solidFill>
                     <a:latin typeface="Courier" pitchFamily="2" charset="0"/>
-                  </a:rPr>
-                  <a:t>g</a:t>
-                </a:r>
-                <a:endParaRPr lang="en-US" sz="2800" b="1" dirty="0">
-                  <a:solidFill>
-                    <a:srgbClr val="FF0000"/>
-                  </a:solidFill>
-                  <a:latin typeface="Courier" pitchFamily="2" charset="0"/>
-                </a:endParaRPr>
-              </a:p>
-            </p:txBody>
-          </p:sp>
+                  </a:endParaRPr>
+                </a:p>
+              </p:txBody>
+            </p:sp>
+          </p:grpSp>
           <p:sp>
             <p:nvSpPr>
-              <p:cNvPr id="120" name="TextBox 119">
+              <p:cNvPr id="47" name="Lightning Bolt 46">
                 <a:extLst>
                   <a:ext uri="{FF2B5EF4-FFF2-40B4-BE49-F238E27FC236}">
-                    <a16:creationId xmlns:a16="http://schemas.microsoft.com/office/drawing/2014/main" id="{45B7FB7F-4057-E037-A44E-1E5490C1DD05}"/>
+                    <a16:creationId xmlns:a16="http://schemas.microsoft.com/office/drawing/2014/main" id="{EEEAA09D-52AE-8359-6A40-174D667E7450}"/>
                   </a:ext>
                 </a:extLst>
               </p:cNvPr>
-              <p:cNvSpPr txBox="1"/>
+              <p:cNvSpPr/>
               <p:nvPr/>
             </p:nvSpPr>
             <p:spPr>
-              <a:xfrm>
-                <a:off x="14194493" y="1661296"/>
-                <a:ext cx="829073" cy="523220"/>
+              <a:xfrm rot="5400000">
+                <a:off x="11733809" y="1811349"/>
+                <a:ext cx="364530" cy="499864"/>
               </a:xfrm>
-              <a:prstGeom prst="rect">
+              <a:prstGeom prst="lightningBolt">
                 <a:avLst/>
               </a:prstGeom>
-              <a:noFill/>
+              <a:solidFill>
+                <a:srgbClr val="FF0000"/>
+              </a:solidFill>
+              <a:ln>
+                <a:noFill/>
+              </a:ln>
             </p:spPr>
+            <p:style>
+              <a:lnRef idx="2">
+                <a:schemeClr val="accent1">
+                  <a:shade val="50000"/>
+                </a:schemeClr>
+              </a:lnRef>
+              <a:fillRef idx="1">
+                <a:schemeClr val="accent1"/>
+              </a:fillRef>
+              <a:effectRef idx="0">
+                <a:schemeClr val="accent1"/>
+              </a:effectRef>
+              <a:fontRef idx="minor">
+                <a:schemeClr val="lt1"/>
+              </a:fontRef>
+            </p:style>
             <p:txBody>
-              <a:bodyPr wrap="none" rtlCol="0">
-                <a:spAutoFit/>
-              </a:bodyPr>
+              <a:bodyPr rtlCol="0" anchor="ctr"/>
               <a:lstStyle/>
               <a:p>
-                <a:r>
-                  <a:rPr lang="en-US" sz="2800" dirty="0">
-                    <a:latin typeface="Courier" pitchFamily="2" charset="0"/>
-                  </a:rPr>
-                  <a:t>ac</a:t>
-                </a:r>
-                <a:r>
-                  <a:rPr lang="en-US" sz="2800" b="1" dirty="0">
-                    <a:latin typeface="Courier" pitchFamily="2" charset="0"/>
-                  </a:rPr>
-                  <a:t>c</a:t>
-                </a:r>
-              </a:p>
-            </p:txBody>
-          </p:sp>
-          <p:sp>
-            <p:nvSpPr>
-              <p:cNvPr id="121" name="TextBox 120">
-                <a:extLst>
-                  <a:ext uri="{FF2B5EF4-FFF2-40B4-BE49-F238E27FC236}">
-                    <a16:creationId xmlns:a16="http://schemas.microsoft.com/office/drawing/2014/main" id="{C452EC8A-7088-B755-FFCE-BB929FF3E26C}"/>
-                  </a:ext>
-                </a:extLst>
-              </p:cNvPr>
-              <p:cNvSpPr txBox="1"/>
-              <p:nvPr/>
-            </p:nvSpPr>
-            <p:spPr>
-              <a:xfrm>
-                <a:off x="14194493" y="2289008"/>
-                <a:ext cx="829073" cy="523220"/>
-              </a:xfrm>
-              <a:prstGeom prst="rect">
-                <a:avLst/>
-              </a:prstGeom>
-              <a:noFill/>
-            </p:spPr>
-            <p:txBody>
-              <a:bodyPr wrap="none" rtlCol="0">
-                <a:spAutoFit/>
-              </a:bodyPr>
-              <a:lstStyle/>
-              <a:p>
-                <a:r>
-                  <a:rPr lang="en-US" sz="2800" dirty="0" err="1">
-                    <a:latin typeface="Courier" pitchFamily="2" charset="0"/>
-                  </a:rPr>
-                  <a:t>ac</a:t>
-                </a:r>
-                <a:r>
-                  <a:rPr lang="en-US" sz="2800" b="1" dirty="0" err="1">
-                    <a:solidFill>
-                      <a:srgbClr val="FF0000"/>
-                    </a:solidFill>
-                    <a:latin typeface="Courier" pitchFamily="2" charset="0"/>
-                  </a:rPr>
-                  <a:t>g</a:t>
-                </a:r>
-                <a:endParaRPr lang="en-US" sz="2800" b="1" dirty="0">
-                  <a:solidFill>
-                    <a:srgbClr val="FF0000"/>
-                  </a:solidFill>
-                  <a:latin typeface="Courier" pitchFamily="2" charset="0"/>
-                </a:endParaRPr>
+                <a:pPr algn="ctr"/>
+                <a:endParaRPr lang="en-US"/>
               </a:p>
             </p:txBody>
           </p:sp>
         </p:grpSp>
         <p:sp>
           <p:nvSpPr>
-            <p:cNvPr id="107" name="Lightning Bolt 106">
+            <p:cNvPr id="43" name="Rectangle 42">
               <a:extLst>
                 <a:ext uri="{FF2B5EF4-FFF2-40B4-BE49-F238E27FC236}">
-                  <a16:creationId xmlns:a16="http://schemas.microsoft.com/office/drawing/2014/main" id="{4A48F507-3E2B-2673-3DCF-BD88DDFDAE80}"/>
+                  <a16:creationId xmlns:a16="http://schemas.microsoft.com/office/drawing/2014/main" id="{58347DE4-D4B5-981D-44D3-A5AFB47E9A03}"/>
                 </a:ext>
               </a:extLst>
             </p:cNvPr>
@@ -3574,15 +5668,15 @@
             <p:nvPr/>
           </p:nvSpPr>
           <p:spPr>
-            <a:xfrm rot="5400000">
-              <a:off x="11646384" y="3387262"/>
-              <a:ext cx="364530" cy="499864"/>
+            <a:xfrm>
+              <a:off x="8908943" y="1871804"/>
+              <a:ext cx="1392670" cy="5742941"/>
             </a:xfrm>
-            <a:prstGeom prst="lightningBolt">
+            <a:prstGeom prst="rect">
               <a:avLst/>
             </a:prstGeom>
             <a:solidFill>
-              <a:srgbClr val="FF0000"/>
+              <a:schemeClr val="bg1"/>
             </a:solidFill>
             <a:ln>
               <a:noFill/>
@@ -3615,1041 +5709,242 @@
         </p:sp>
         <p:sp>
           <p:nvSpPr>
-            <p:cNvPr id="108" name="Lightning Bolt 107">
+            <p:cNvPr id="44" name="TextBox 43">
               <a:extLst>
                 <a:ext uri="{FF2B5EF4-FFF2-40B4-BE49-F238E27FC236}">
-                  <a16:creationId xmlns:a16="http://schemas.microsoft.com/office/drawing/2014/main" id="{11FCBCF2-ED52-9D98-51D1-76E38B3325F6}"/>
+                  <a16:creationId xmlns:a16="http://schemas.microsoft.com/office/drawing/2014/main" id="{78B8061B-22FC-C02B-A7E3-6982D9CFC56E}"/>
                 </a:ext>
               </a:extLst>
             </p:cNvPr>
-            <p:cNvSpPr/>
+            <p:cNvSpPr txBox="1"/>
             <p:nvPr/>
           </p:nvSpPr>
           <p:spPr>
-            <a:xfrm rot="5400000">
-              <a:off x="13526080" y="2139233"/>
-              <a:ext cx="364530" cy="499864"/>
+            <a:xfrm>
+              <a:off x="2071550" y="11858"/>
+              <a:ext cx="8308587" cy="4401205"/>
             </a:xfrm>
-            <a:prstGeom prst="lightningBolt">
+            <a:prstGeom prst="rect">
               <a:avLst/>
             </a:prstGeom>
-            <a:solidFill>
-              <a:srgbClr val="FF0000"/>
-            </a:solidFill>
-            <a:ln>
-              <a:noFill/>
-            </a:ln>
+            <a:noFill/>
           </p:spPr>
-          <p:style>
-            <a:lnRef idx="2">
-              <a:schemeClr val="accent1">
-                <a:shade val="50000"/>
-              </a:schemeClr>
-            </a:lnRef>
-            <a:fillRef idx="1">
-              <a:schemeClr val="accent1"/>
-            </a:fillRef>
-            <a:effectRef idx="0">
-              <a:schemeClr val="accent1"/>
-            </a:effectRef>
-            <a:fontRef idx="minor">
-              <a:schemeClr val="lt1"/>
-            </a:fontRef>
-          </p:style>
           <p:txBody>
-            <a:bodyPr rtlCol="0" anchor="ctr"/>
+            <a:bodyPr wrap="square" rtlCol="0">
+              <a:spAutoFit/>
+            </a:bodyPr>
             <a:lstStyle/>
             <a:p>
-              <a:pPr algn="ctr"/>
-              <a:endParaRPr lang="en-US"/>
+              <a:pPr>
+                <a:spcAft>
+                  <a:spcPts val="600"/>
+                </a:spcAft>
+              </a:pPr>
+              <a:r>
+                <a:rPr lang="en-US" sz="3000" b="1" dirty="0">
+                  <a:latin typeface="Arial" panose="020B0604020202020204" pitchFamily="34" charset="0"/>
+                  <a:cs typeface="Arial" panose="020B0604020202020204" pitchFamily="34" charset="0"/>
+                </a:rPr>
+                <a:t>Expected mutation counts from four-fold degenerate sites.</a:t>
+              </a:r>
+            </a:p>
+            <a:p>
+              <a:pPr>
+                <a:spcAft>
+                  <a:spcPts val="600"/>
+                </a:spcAft>
+              </a:pPr>
+              <a:r>
+                <a:rPr lang="en-US" sz="3000" dirty="0">
+                  <a:latin typeface="Arial" panose="020B0604020202020204" pitchFamily="34" charset="0"/>
+                  <a:cs typeface="Arial" panose="020B0604020202020204" pitchFamily="34" charset="0"/>
+                </a:rPr>
+                <a:t>The third nucleotide in codon acc is four-fold degenerate since ac</a:t>
+              </a:r>
+              <a:r>
+                <a:rPr lang="en-US" sz="3000" b="1" dirty="0">
+                  <a:latin typeface="Arial" panose="020B0604020202020204" pitchFamily="34" charset="0"/>
+                  <a:cs typeface="Arial" panose="020B0604020202020204" pitchFamily="34" charset="0"/>
+                </a:rPr>
+                <a:t>a</a:t>
+              </a:r>
+              <a:r>
+                <a:rPr lang="en-US" sz="3000" dirty="0">
+                  <a:latin typeface="Arial" panose="020B0604020202020204" pitchFamily="34" charset="0"/>
+                  <a:cs typeface="Arial" panose="020B0604020202020204" pitchFamily="34" charset="0"/>
+                </a:rPr>
+                <a:t>, ac</a:t>
+              </a:r>
+              <a:r>
+                <a:rPr lang="en-US" sz="3000" b="1" dirty="0">
+                  <a:latin typeface="Arial" panose="020B0604020202020204" pitchFamily="34" charset="0"/>
+                  <a:cs typeface="Arial" panose="020B0604020202020204" pitchFamily="34" charset="0"/>
+                </a:rPr>
+                <a:t>c</a:t>
+              </a:r>
+              <a:r>
+                <a:rPr lang="en-US" sz="3000" dirty="0">
+                  <a:latin typeface="Arial" panose="020B0604020202020204" pitchFamily="34" charset="0"/>
+                  <a:cs typeface="Arial" panose="020B0604020202020204" pitchFamily="34" charset="0"/>
+                </a:rPr>
+                <a:t>, </a:t>
+              </a:r>
+              <a:r>
+                <a:rPr lang="en-US" sz="3000" dirty="0" err="1">
+                  <a:latin typeface="Arial" panose="020B0604020202020204" pitchFamily="34" charset="0"/>
+                  <a:cs typeface="Arial" panose="020B0604020202020204" pitchFamily="34" charset="0"/>
+                </a:rPr>
+                <a:t>ac</a:t>
+              </a:r>
+              <a:r>
+                <a:rPr lang="en-US" sz="3000" b="1" dirty="0" err="1">
+                  <a:latin typeface="Arial" panose="020B0604020202020204" pitchFamily="34" charset="0"/>
+                  <a:cs typeface="Arial" panose="020B0604020202020204" pitchFamily="34" charset="0"/>
+                </a:rPr>
+                <a:t>g</a:t>
+              </a:r>
+              <a:r>
+                <a:rPr lang="en-US" sz="3000" dirty="0">
+                  <a:latin typeface="Arial" panose="020B0604020202020204" pitchFamily="34" charset="0"/>
+                  <a:cs typeface="Arial" panose="020B0604020202020204" pitchFamily="34" charset="0"/>
+                </a:rPr>
+                <a:t>, and ac</a:t>
+              </a:r>
+              <a:r>
+                <a:rPr lang="en-US" sz="3000" b="1" dirty="0">
+                  <a:latin typeface="Arial" panose="020B0604020202020204" pitchFamily="34" charset="0"/>
+                  <a:cs typeface="Arial" panose="020B0604020202020204" pitchFamily="34" charset="0"/>
+                </a:rPr>
+                <a:t>t</a:t>
+              </a:r>
+              <a:r>
+                <a:rPr lang="en-US" sz="3000" dirty="0">
+                  <a:latin typeface="Arial" panose="020B0604020202020204" pitchFamily="34" charset="0"/>
+                  <a:cs typeface="Arial" panose="020B0604020202020204" pitchFamily="34" charset="0"/>
+                </a:rPr>
+                <a:t> all encode threonine. </a:t>
+              </a:r>
+            </a:p>
+            <a:p>
+              <a:pPr>
+                <a:spcAft>
+                  <a:spcPts val="600"/>
+                </a:spcAft>
+              </a:pPr>
+              <a:r>
+                <a:rPr lang="en-US" sz="3000" dirty="0">
+                  <a:latin typeface="Arial" panose="020B0604020202020204" pitchFamily="34" charset="0"/>
+                  <a:cs typeface="Arial" panose="020B0604020202020204" pitchFamily="34" charset="0"/>
+                </a:rPr>
+                <a:t>We count the number of </a:t>
+              </a:r>
+              <a:r>
+                <a:rPr lang="en-US" sz="3000" i="1" dirty="0">
+                  <a:latin typeface="Arial" panose="020B0604020202020204" pitchFamily="34" charset="0"/>
+                  <a:cs typeface="Arial" panose="020B0604020202020204" pitchFamily="34" charset="0"/>
+                </a:rPr>
+                <a:t>mutations</a:t>
+              </a:r>
+              <a:r>
+                <a:rPr lang="en-US" sz="3000" dirty="0">
+                  <a:latin typeface="Arial" panose="020B0604020202020204" pitchFamily="34" charset="0"/>
+                  <a:cs typeface="Arial" panose="020B0604020202020204" pitchFamily="34" charset="0"/>
+                </a:rPr>
+                <a:t> on branches of the tree, not the final alignment: in tree at right there are three </a:t>
+              </a:r>
+              <a:r>
+                <a:rPr lang="en-US" sz="3000" dirty="0" err="1">
+                  <a:latin typeface="Arial" panose="020B0604020202020204" pitchFamily="34" charset="0"/>
+                  <a:cs typeface="Arial" panose="020B0604020202020204" pitchFamily="34" charset="0"/>
+                </a:rPr>
+                <a:t>c→g</a:t>
+              </a:r>
+              <a:r>
+                <a:rPr lang="en-US" sz="3000" dirty="0">
+                  <a:latin typeface="Arial" panose="020B0604020202020204" pitchFamily="34" charset="0"/>
+                  <a:cs typeface="Arial" panose="020B0604020202020204" pitchFamily="34" charset="0"/>
+                </a:rPr>
+                <a:t> mutations even though four sequences have the mutation.</a:t>
+              </a:r>
             </a:p>
           </p:txBody>
         </p:sp>
         <p:sp>
           <p:nvSpPr>
-            <p:cNvPr id="109" name="Lightning Bolt 108">
+            <p:cNvPr id="45" name="TextBox 44">
               <a:extLst>
                 <a:ext uri="{FF2B5EF4-FFF2-40B4-BE49-F238E27FC236}">
-                  <a16:creationId xmlns:a16="http://schemas.microsoft.com/office/drawing/2014/main" id="{DD043EEE-066F-5531-A212-3A77177E704A}"/>
+                  <a16:creationId xmlns:a16="http://schemas.microsoft.com/office/drawing/2014/main" id="{4B74CC47-CA20-C89C-D7E9-200E54A1A81C}"/>
                 </a:ext>
               </a:extLst>
             </p:cNvPr>
-            <p:cNvSpPr/>
+            <p:cNvSpPr txBox="1"/>
             <p:nvPr/>
           </p:nvSpPr>
           <p:spPr>
-            <a:xfrm rot="5400000">
-              <a:off x="11646384" y="582235"/>
-              <a:ext cx="364530" cy="499864"/>
+            <a:xfrm>
+              <a:off x="2071550" y="5150606"/>
+              <a:ext cx="8174182" cy="2939266"/>
             </a:xfrm>
-            <a:prstGeom prst="lightningBolt">
+            <a:prstGeom prst="rect">
               <a:avLst/>
             </a:prstGeom>
-            <a:solidFill>
-              <a:srgbClr val="FF0000"/>
-            </a:solidFill>
-            <a:ln>
-              <a:noFill/>
-            </a:ln>
+            <a:noFill/>
           </p:spPr>
-          <p:style>
-            <a:lnRef idx="2">
-              <a:schemeClr val="accent1">
-                <a:shade val="50000"/>
-              </a:schemeClr>
-            </a:lnRef>
-            <a:fillRef idx="1">
-              <a:schemeClr val="accent1"/>
-            </a:fillRef>
-            <a:effectRef idx="0">
-              <a:schemeClr val="accent1"/>
-            </a:effectRef>
-            <a:fontRef idx="minor">
-              <a:schemeClr val="lt1"/>
-            </a:fontRef>
-          </p:style>
           <p:txBody>
-            <a:bodyPr rtlCol="0" anchor="ctr"/>
+            <a:bodyPr wrap="square" rtlCol="0">
+              <a:spAutoFit/>
+            </a:bodyPr>
             <a:lstStyle/>
             <a:p>
-              <a:pPr algn="ctr"/>
-              <a:endParaRPr lang="en-US"/>
+              <a:pPr>
+                <a:spcAft>
+                  <a:spcPts val="600"/>
+                </a:spcAft>
+              </a:pPr>
+              <a:r>
+                <a:rPr lang="en-US" sz="3000" b="1" dirty="0">
+                  <a:latin typeface="Arial" panose="020B0604020202020204" pitchFamily="34" charset="0"/>
+                  <a:cs typeface="Arial" panose="020B0604020202020204" pitchFamily="34" charset="0"/>
+                </a:rPr>
+                <a:t>Actual counts of mutations at each site.</a:t>
+              </a:r>
+            </a:p>
+            <a:p>
+              <a:pPr>
+                <a:spcAft>
+                  <a:spcPts val="600"/>
+                </a:spcAft>
+              </a:pPr>
+              <a:r>
+                <a:rPr lang="en-US" sz="3000" dirty="0">
+                  <a:latin typeface="Arial" panose="020B0604020202020204" pitchFamily="34" charset="0"/>
+                  <a:cs typeface="Arial" panose="020B0604020202020204" pitchFamily="34" charset="0"/>
+                </a:rPr>
+                <a:t>In tree at right, there is one count of the indicated </a:t>
+              </a:r>
+              <a:r>
+                <a:rPr lang="en-US" sz="3000" dirty="0" err="1">
+                  <a:latin typeface="Arial" panose="020B0604020202020204" pitchFamily="34" charset="0"/>
+                  <a:cs typeface="Arial" panose="020B0604020202020204" pitchFamily="34" charset="0"/>
+                </a:rPr>
+                <a:t>c→g</a:t>
+              </a:r>
+              <a:r>
+                <a:rPr lang="en-US" sz="3000" dirty="0">
+                  <a:latin typeface="Arial" panose="020B0604020202020204" pitchFamily="34" charset="0"/>
+                  <a:cs typeface="Arial" panose="020B0604020202020204" pitchFamily="34" charset="0"/>
+                </a:rPr>
+                <a:t> mutation, which induces an alanine to glycine mutation. The fact that the actual counts are less than the expected counts suggests this mutation is deleterious.</a:t>
+              </a:r>
+              <a:endParaRPr lang="en-US" sz="3000" b="1" dirty="0">
+                <a:latin typeface="Arial" panose="020B0604020202020204" pitchFamily="34" charset="0"/>
+                <a:cs typeface="Arial" panose="020B0604020202020204" pitchFamily="34" charset="0"/>
+              </a:endParaRPr>
             </a:p>
           </p:txBody>
         </p:sp>
       </p:grpSp>
-      <p:grpSp>
-        <p:nvGrpSpPr>
-          <p:cNvPr id="122" name="Group 121">
-            <a:extLst>
-              <a:ext uri="{FF2B5EF4-FFF2-40B4-BE49-F238E27FC236}">
-                <a16:creationId xmlns:a16="http://schemas.microsoft.com/office/drawing/2014/main" id="{E07AD770-606F-DD1F-9DCE-0AD111887A3E}"/>
-              </a:ext>
-            </a:extLst>
-          </p:cNvPr>
-          <p:cNvGrpSpPr/>
-          <p:nvPr/>
-        </p:nvGrpSpPr>
-        <p:grpSpPr>
-          <a:xfrm>
-            <a:off x="8908943" y="4587244"/>
-            <a:ext cx="8077892" cy="3667105"/>
-            <a:chOff x="6945674" y="413964"/>
-            <a:chExt cx="8077892" cy="3667105"/>
-          </a:xfrm>
-        </p:grpSpPr>
-        <p:grpSp>
-          <p:nvGrpSpPr>
-            <p:cNvPr id="123" name="Group 122">
-              <a:extLst>
-                <a:ext uri="{FF2B5EF4-FFF2-40B4-BE49-F238E27FC236}">
-                  <a16:creationId xmlns:a16="http://schemas.microsoft.com/office/drawing/2014/main" id="{4C68BDBA-A415-8641-74F8-C6311D4F0A72}"/>
-                </a:ext>
-              </a:extLst>
-            </p:cNvPr>
-            <p:cNvGrpSpPr/>
-            <p:nvPr/>
-          </p:nvGrpSpPr>
-          <p:grpSpPr>
-            <a:xfrm>
-              <a:off x="6945674" y="413964"/>
-              <a:ext cx="8077892" cy="3667105"/>
-              <a:chOff x="6945674" y="413964"/>
-              <a:chExt cx="8077892" cy="3667105"/>
-            </a:xfrm>
-          </p:grpSpPr>
-          <p:pic>
-            <p:nvPicPr>
-              <p:cNvPr id="125" name="Picture 124">
-                <a:extLst>
-                  <a:ext uri="{FF2B5EF4-FFF2-40B4-BE49-F238E27FC236}">
-                    <a16:creationId xmlns:a16="http://schemas.microsoft.com/office/drawing/2014/main" id="{5AC0DEEC-5AFF-1CD7-9BB8-6BF880F7A023}"/>
-                  </a:ext>
-                </a:extLst>
-              </p:cNvPr>
-              <p:cNvPicPr>
-                <a:picLocks noChangeAspect="1"/>
-              </p:cNvPicPr>
-              <p:nvPr/>
-            </p:nvPicPr>
-            <p:blipFill rotWithShape="1">
-              <a:blip r:embed="rId2"/>
-              <a:srcRect l="14477" t="19196" r="23362" b="16224"/>
-              <a:stretch/>
-            </p:blipFill>
-            <p:spPr>
-              <a:xfrm>
-                <a:off x="6945674" y="575179"/>
-                <a:ext cx="7513416" cy="3469283"/>
-              </a:xfrm>
-              <a:prstGeom prst="rect">
-                <a:avLst/>
-              </a:prstGeom>
-            </p:spPr>
-          </p:pic>
-          <p:sp>
-            <p:nvSpPr>
-              <p:cNvPr id="126" name="TextBox 125">
-                <a:extLst>
-                  <a:ext uri="{FF2B5EF4-FFF2-40B4-BE49-F238E27FC236}">
-                    <a16:creationId xmlns:a16="http://schemas.microsoft.com/office/drawing/2014/main" id="{FF8AF920-4A6E-4B15-D26B-2E5A4C1A1095}"/>
-                  </a:ext>
-                </a:extLst>
-              </p:cNvPr>
-              <p:cNvSpPr txBox="1"/>
-              <p:nvPr/>
-            </p:nvSpPr>
-            <p:spPr>
-              <a:xfrm>
-                <a:off x="8839157" y="2309820"/>
-                <a:ext cx="829073" cy="523220"/>
-              </a:xfrm>
-              <a:prstGeom prst="rect">
-                <a:avLst/>
-              </a:prstGeom>
-              <a:noFill/>
-            </p:spPr>
-            <p:txBody>
-              <a:bodyPr wrap="none" rtlCol="0">
-                <a:spAutoFit/>
-              </a:bodyPr>
-              <a:lstStyle/>
-              <a:p>
-                <a:r>
-                  <a:rPr lang="en-US" sz="2800" dirty="0" err="1">
-                    <a:latin typeface="Courier" pitchFamily="2" charset="0"/>
-                  </a:rPr>
-                  <a:t>g</a:t>
-                </a:r>
-                <a:r>
-                  <a:rPr lang="en-US" sz="2800" b="1" dirty="0" err="1">
-                    <a:latin typeface="Courier" pitchFamily="2" charset="0"/>
-                  </a:rPr>
-                  <a:t>c</a:t>
-                </a:r>
-                <a:r>
-                  <a:rPr lang="en-US" sz="2800" dirty="0" err="1">
-                    <a:latin typeface="Courier" pitchFamily="2" charset="0"/>
-                  </a:rPr>
-                  <a:t>a</a:t>
-                </a:r>
-                <a:endParaRPr lang="en-US" sz="2800" dirty="0">
-                  <a:latin typeface="Courier" pitchFamily="2" charset="0"/>
-                </a:endParaRPr>
-              </a:p>
-            </p:txBody>
-          </p:sp>
-          <p:sp>
-            <p:nvSpPr>
-              <p:cNvPr id="127" name="TextBox 126">
-                <a:extLst>
-                  <a:ext uri="{FF2B5EF4-FFF2-40B4-BE49-F238E27FC236}">
-                    <a16:creationId xmlns:a16="http://schemas.microsoft.com/office/drawing/2014/main" id="{37C9E9B6-498D-0940-F6F8-E165075D6D37}"/>
-                  </a:ext>
-                </a:extLst>
-              </p:cNvPr>
-              <p:cNvSpPr txBox="1"/>
-              <p:nvPr/>
-            </p:nvSpPr>
-            <p:spPr>
-              <a:xfrm>
-                <a:off x="10610045" y="3248604"/>
-                <a:ext cx="829073" cy="523220"/>
-              </a:xfrm>
-              <a:prstGeom prst="rect">
-                <a:avLst/>
-              </a:prstGeom>
-              <a:noFill/>
-            </p:spPr>
-            <p:txBody>
-              <a:bodyPr wrap="none" rtlCol="0">
-                <a:spAutoFit/>
-              </a:bodyPr>
-              <a:lstStyle/>
-              <a:p>
-                <a:r>
-                  <a:rPr lang="en-US" sz="2800" dirty="0" err="1">
-                    <a:latin typeface="Courier" pitchFamily="2" charset="0"/>
-                  </a:rPr>
-                  <a:t>g</a:t>
-                </a:r>
-                <a:r>
-                  <a:rPr lang="en-US" sz="2800" b="1" dirty="0" err="1">
-                    <a:latin typeface="Courier" pitchFamily="2" charset="0"/>
-                  </a:rPr>
-                  <a:t>c</a:t>
-                </a:r>
-                <a:r>
-                  <a:rPr lang="en-US" sz="2800" dirty="0" err="1">
-                    <a:latin typeface="Courier" pitchFamily="2" charset="0"/>
-                  </a:rPr>
-                  <a:t>a</a:t>
-                </a:r>
-                <a:endParaRPr lang="en-US" sz="2800" dirty="0">
-                  <a:latin typeface="Courier" pitchFamily="2" charset="0"/>
-                </a:endParaRPr>
-              </a:p>
-            </p:txBody>
-          </p:sp>
-          <p:sp>
-            <p:nvSpPr>
-              <p:cNvPr id="128" name="TextBox 127">
-                <a:extLst>
-                  <a:ext uri="{FF2B5EF4-FFF2-40B4-BE49-F238E27FC236}">
-                    <a16:creationId xmlns:a16="http://schemas.microsoft.com/office/drawing/2014/main" id="{394CC3DD-E216-A57B-A11F-0D264DE1F380}"/>
-                  </a:ext>
-                </a:extLst>
-              </p:cNvPr>
-              <p:cNvSpPr txBox="1"/>
-              <p:nvPr/>
-            </p:nvSpPr>
-            <p:spPr>
-              <a:xfrm>
-                <a:off x="12393125" y="2919420"/>
-                <a:ext cx="829073" cy="523220"/>
-              </a:xfrm>
-              <a:prstGeom prst="rect">
-                <a:avLst/>
-              </a:prstGeom>
-              <a:noFill/>
-            </p:spPr>
-            <p:txBody>
-              <a:bodyPr wrap="none" rtlCol="0">
-                <a:spAutoFit/>
-              </a:bodyPr>
-              <a:lstStyle/>
-              <a:p>
-                <a:r>
-                  <a:rPr lang="en-US" sz="2800" dirty="0" err="1">
-                    <a:latin typeface="Courier" pitchFamily="2" charset="0"/>
-                  </a:rPr>
-                  <a:t>g</a:t>
-                </a:r>
-                <a:r>
-                  <a:rPr lang="en-US" sz="2800" b="1" dirty="0" err="1">
-                    <a:latin typeface="Courier" pitchFamily="2" charset="0"/>
-                  </a:rPr>
-                  <a:t>c</a:t>
-                </a:r>
-                <a:r>
-                  <a:rPr lang="en-US" sz="2800" dirty="0" err="1">
-                    <a:latin typeface="Courier" pitchFamily="2" charset="0"/>
-                  </a:rPr>
-                  <a:t>a</a:t>
-                </a:r>
-                <a:endParaRPr lang="en-US" sz="2800" b="1" dirty="0">
-                  <a:latin typeface="Courier" pitchFamily="2" charset="0"/>
-                </a:endParaRPr>
-              </a:p>
-            </p:txBody>
-          </p:sp>
-          <p:sp>
-            <p:nvSpPr>
-              <p:cNvPr id="129" name="TextBox 128">
-                <a:extLst>
-                  <a:ext uri="{FF2B5EF4-FFF2-40B4-BE49-F238E27FC236}">
-                    <a16:creationId xmlns:a16="http://schemas.microsoft.com/office/drawing/2014/main" id="{38460F73-C428-952F-8FD1-971296ADB1AF}"/>
-                  </a:ext>
-                </a:extLst>
-              </p:cNvPr>
-              <p:cNvSpPr txBox="1"/>
-              <p:nvPr/>
-            </p:nvSpPr>
-            <p:spPr>
-              <a:xfrm>
-                <a:off x="12393125" y="3557849"/>
-                <a:ext cx="829073" cy="523220"/>
-              </a:xfrm>
-              <a:prstGeom prst="rect">
-                <a:avLst/>
-              </a:prstGeom>
-              <a:noFill/>
-            </p:spPr>
-            <p:txBody>
-              <a:bodyPr wrap="none" rtlCol="0">
-                <a:spAutoFit/>
-              </a:bodyPr>
-              <a:lstStyle/>
-              <a:p>
-                <a:r>
-                  <a:rPr lang="en-US" sz="2800" dirty="0" err="1">
-                    <a:latin typeface="Courier" pitchFamily="2" charset="0"/>
-                  </a:rPr>
-                  <a:t>g</a:t>
-                </a:r>
-                <a:r>
-                  <a:rPr lang="en-US" sz="2800" b="1" dirty="0" err="1">
-                    <a:latin typeface="Courier" pitchFamily="2" charset="0"/>
-                  </a:rPr>
-                  <a:t>c</a:t>
-                </a:r>
-                <a:r>
-                  <a:rPr lang="en-US" sz="2800" dirty="0" err="1">
-                    <a:latin typeface="Courier" pitchFamily="2" charset="0"/>
-                  </a:rPr>
-                  <a:t>a</a:t>
-                </a:r>
-                <a:endParaRPr lang="en-US" sz="2800" dirty="0">
-                  <a:latin typeface="Courier" pitchFamily="2" charset="0"/>
-                </a:endParaRPr>
-              </a:p>
-            </p:txBody>
-          </p:sp>
-          <p:sp>
-            <p:nvSpPr>
-              <p:cNvPr id="130" name="TextBox 129">
-                <a:extLst>
-                  <a:ext uri="{FF2B5EF4-FFF2-40B4-BE49-F238E27FC236}">
-                    <a16:creationId xmlns:a16="http://schemas.microsoft.com/office/drawing/2014/main" id="{DCDBCF9C-E786-26D9-A51C-A790ED19EAC7}"/>
-                  </a:ext>
-                </a:extLst>
-              </p:cNvPr>
-              <p:cNvSpPr txBox="1"/>
-              <p:nvPr/>
-            </p:nvSpPr>
-            <p:spPr>
-              <a:xfrm>
-                <a:off x="10610045" y="1355796"/>
-                <a:ext cx="829073" cy="523220"/>
-              </a:xfrm>
-              <a:prstGeom prst="rect">
-                <a:avLst/>
-              </a:prstGeom>
-              <a:noFill/>
-            </p:spPr>
-            <p:txBody>
-              <a:bodyPr wrap="none" rtlCol="0">
-                <a:spAutoFit/>
-              </a:bodyPr>
-              <a:lstStyle/>
-              <a:p>
-                <a:r>
-                  <a:rPr lang="en-US" sz="2800" dirty="0" err="1">
-                    <a:latin typeface="Courier" pitchFamily="2" charset="0"/>
-                  </a:rPr>
-                  <a:t>g</a:t>
-                </a:r>
-                <a:r>
-                  <a:rPr lang="en-US" sz="2800" b="1" dirty="0" err="1">
-                    <a:latin typeface="Courier" pitchFamily="2" charset="0"/>
-                  </a:rPr>
-                  <a:t>c</a:t>
-                </a:r>
-                <a:r>
-                  <a:rPr lang="en-US" sz="2800" dirty="0" err="1">
-                    <a:latin typeface="Courier" pitchFamily="2" charset="0"/>
-                  </a:rPr>
-                  <a:t>a</a:t>
-                </a:r>
-                <a:endParaRPr lang="en-US" sz="2800" dirty="0">
-                  <a:latin typeface="Courier" pitchFamily="2" charset="0"/>
-                </a:endParaRPr>
-              </a:p>
-            </p:txBody>
-          </p:sp>
-          <p:sp>
-            <p:nvSpPr>
-              <p:cNvPr id="131" name="TextBox 130">
-                <a:extLst>
-                  <a:ext uri="{FF2B5EF4-FFF2-40B4-BE49-F238E27FC236}">
-                    <a16:creationId xmlns:a16="http://schemas.microsoft.com/office/drawing/2014/main" id="{D7661FC3-41F3-F55A-7F55-B13697A1818B}"/>
-                  </a:ext>
-                </a:extLst>
-              </p:cNvPr>
-              <p:cNvSpPr txBox="1"/>
-              <p:nvPr/>
-            </p:nvSpPr>
-            <p:spPr>
-              <a:xfrm>
-                <a:off x="12393125" y="1986732"/>
-                <a:ext cx="829073" cy="523220"/>
-              </a:xfrm>
-              <a:prstGeom prst="rect">
-                <a:avLst/>
-              </a:prstGeom>
-              <a:noFill/>
-            </p:spPr>
-            <p:txBody>
-              <a:bodyPr wrap="none" rtlCol="0">
-                <a:spAutoFit/>
-              </a:bodyPr>
-              <a:lstStyle/>
-              <a:p>
-                <a:r>
-                  <a:rPr lang="en-US" sz="2800" dirty="0" err="1">
-                    <a:latin typeface="Courier" pitchFamily="2" charset="0"/>
-                  </a:rPr>
-                  <a:t>g</a:t>
-                </a:r>
-                <a:r>
-                  <a:rPr lang="en-US" sz="2800" b="1" dirty="0" err="1">
-                    <a:solidFill>
-                      <a:srgbClr val="FF0000"/>
-                    </a:solidFill>
-                    <a:latin typeface="Courier" pitchFamily="2" charset="0"/>
-                  </a:rPr>
-                  <a:t>g</a:t>
-                </a:r>
-                <a:r>
-                  <a:rPr lang="en-US" sz="2800" dirty="0" err="1">
-                    <a:latin typeface="Courier" pitchFamily="2" charset="0"/>
-                  </a:rPr>
-                  <a:t>a</a:t>
-                </a:r>
-                <a:endParaRPr lang="en-US" sz="2800" b="1" dirty="0">
-                  <a:latin typeface="Courier" pitchFamily="2" charset="0"/>
-                </a:endParaRPr>
-              </a:p>
-            </p:txBody>
-          </p:sp>
-          <p:sp>
-            <p:nvSpPr>
-              <p:cNvPr id="132" name="TextBox 131">
-                <a:extLst>
-                  <a:ext uri="{FF2B5EF4-FFF2-40B4-BE49-F238E27FC236}">
-                    <a16:creationId xmlns:a16="http://schemas.microsoft.com/office/drawing/2014/main" id="{C0D7A242-D024-713D-7DE5-817FC2840390}"/>
-                  </a:ext>
-                </a:extLst>
-              </p:cNvPr>
-              <p:cNvSpPr txBox="1"/>
-              <p:nvPr/>
-            </p:nvSpPr>
-            <p:spPr>
-              <a:xfrm>
-                <a:off x="12393125" y="715716"/>
-                <a:ext cx="829073" cy="523220"/>
-              </a:xfrm>
-              <a:prstGeom prst="rect">
-                <a:avLst/>
-              </a:prstGeom>
-              <a:noFill/>
-            </p:spPr>
-            <p:txBody>
-              <a:bodyPr wrap="none" rtlCol="0">
-                <a:spAutoFit/>
-              </a:bodyPr>
-              <a:lstStyle/>
-              <a:p>
-                <a:r>
-                  <a:rPr lang="en-US" sz="2800" dirty="0" err="1">
-                    <a:latin typeface="Courier" pitchFamily="2" charset="0"/>
-                  </a:rPr>
-                  <a:t>g</a:t>
-                </a:r>
-                <a:r>
-                  <a:rPr lang="en-US" sz="2800" b="1" dirty="0" err="1">
-                    <a:latin typeface="Courier" pitchFamily="2" charset="0"/>
-                  </a:rPr>
-                  <a:t>c</a:t>
-                </a:r>
-                <a:r>
-                  <a:rPr lang="en-US" sz="2800" dirty="0" err="1">
-                    <a:latin typeface="Courier" pitchFamily="2" charset="0"/>
-                  </a:rPr>
-                  <a:t>a</a:t>
-                </a:r>
-                <a:endParaRPr lang="en-US" sz="2800" b="1" dirty="0">
-                  <a:solidFill>
-                    <a:srgbClr val="FF0000"/>
-                  </a:solidFill>
-                  <a:latin typeface="Courier" pitchFamily="2" charset="0"/>
-                </a:endParaRPr>
-              </a:p>
-            </p:txBody>
-          </p:sp>
-          <p:sp>
-            <p:nvSpPr>
-              <p:cNvPr id="133" name="TextBox 132">
-                <a:extLst>
-                  <a:ext uri="{FF2B5EF4-FFF2-40B4-BE49-F238E27FC236}">
-                    <a16:creationId xmlns:a16="http://schemas.microsoft.com/office/drawing/2014/main" id="{6A1C7D59-B9C2-09D8-9849-543E999C2B12}"/>
-                  </a:ext>
-                </a:extLst>
-              </p:cNvPr>
-              <p:cNvSpPr txBox="1"/>
-              <p:nvPr/>
-            </p:nvSpPr>
-            <p:spPr>
-              <a:xfrm>
-                <a:off x="14194493" y="413964"/>
-                <a:ext cx="829073" cy="523220"/>
-              </a:xfrm>
-              <a:prstGeom prst="rect">
-                <a:avLst/>
-              </a:prstGeom>
-              <a:noFill/>
-            </p:spPr>
-            <p:txBody>
-              <a:bodyPr wrap="none" rtlCol="0">
-                <a:spAutoFit/>
-              </a:bodyPr>
-              <a:lstStyle/>
-              <a:p>
-                <a:r>
-                  <a:rPr lang="en-US" sz="2800" dirty="0" err="1">
-                    <a:latin typeface="Courier" pitchFamily="2" charset="0"/>
-                  </a:rPr>
-                  <a:t>g</a:t>
-                </a:r>
-                <a:r>
-                  <a:rPr lang="en-US" sz="2800" b="1" dirty="0" err="1">
-                    <a:latin typeface="Courier" pitchFamily="2" charset="0"/>
-                  </a:rPr>
-                  <a:t>c</a:t>
-                </a:r>
-                <a:r>
-                  <a:rPr lang="en-US" sz="2800" dirty="0" err="1">
-                    <a:latin typeface="Courier" pitchFamily="2" charset="0"/>
-                  </a:rPr>
-                  <a:t>a</a:t>
-                </a:r>
-                <a:endParaRPr lang="en-US" sz="2800" b="1" dirty="0">
-                  <a:solidFill>
-                    <a:srgbClr val="FF0000"/>
-                  </a:solidFill>
-                  <a:latin typeface="Courier" pitchFamily="2" charset="0"/>
-                </a:endParaRPr>
-              </a:p>
-            </p:txBody>
-          </p:sp>
-          <p:sp>
-            <p:nvSpPr>
-              <p:cNvPr id="134" name="TextBox 133">
-                <a:extLst>
-                  <a:ext uri="{FF2B5EF4-FFF2-40B4-BE49-F238E27FC236}">
-                    <a16:creationId xmlns:a16="http://schemas.microsoft.com/office/drawing/2014/main" id="{E4215FC3-1EEA-1EFD-0A3A-1B0E0C26A38E}"/>
-                  </a:ext>
-                </a:extLst>
-              </p:cNvPr>
-              <p:cNvSpPr txBox="1"/>
-              <p:nvPr/>
-            </p:nvSpPr>
-            <p:spPr>
-              <a:xfrm>
-                <a:off x="14194493" y="1034320"/>
-                <a:ext cx="829073" cy="523220"/>
-              </a:xfrm>
-              <a:prstGeom prst="rect">
-                <a:avLst/>
-              </a:prstGeom>
-              <a:noFill/>
-            </p:spPr>
-            <p:txBody>
-              <a:bodyPr wrap="none" rtlCol="0">
-                <a:spAutoFit/>
-              </a:bodyPr>
-              <a:lstStyle/>
-              <a:p>
-                <a:r>
-                  <a:rPr lang="en-US" sz="2800" dirty="0" err="1">
-                    <a:latin typeface="Courier" pitchFamily="2" charset="0"/>
-                  </a:rPr>
-                  <a:t>g</a:t>
-                </a:r>
-                <a:r>
-                  <a:rPr lang="en-US" sz="2800" b="1" dirty="0" err="1">
-                    <a:latin typeface="Courier" pitchFamily="2" charset="0"/>
-                  </a:rPr>
-                  <a:t>c</a:t>
-                </a:r>
-                <a:r>
-                  <a:rPr lang="en-US" sz="2800" dirty="0" err="1">
-                    <a:latin typeface="Courier" pitchFamily="2" charset="0"/>
-                  </a:rPr>
-                  <a:t>a</a:t>
-                </a:r>
-                <a:endParaRPr lang="en-US" sz="2800" b="1" dirty="0">
-                  <a:solidFill>
-                    <a:srgbClr val="FF0000"/>
-                  </a:solidFill>
-                  <a:latin typeface="Courier" pitchFamily="2" charset="0"/>
-                </a:endParaRPr>
-              </a:p>
-            </p:txBody>
-          </p:sp>
-          <p:sp>
-            <p:nvSpPr>
-              <p:cNvPr id="135" name="TextBox 134">
-                <a:extLst>
-                  <a:ext uri="{FF2B5EF4-FFF2-40B4-BE49-F238E27FC236}">
-                    <a16:creationId xmlns:a16="http://schemas.microsoft.com/office/drawing/2014/main" id="{A721B8A0-B067-751C-CEC7-44747F7F8418}"/>
-                  </a:ext>
-                </a:extLst>
-              </p:cNvPr>
-              <p:cNvSpPr txBox="1"/>
-              <p:nvPr/>
-            </p:nvSpPr>
-            <p:spPr>
-              <a:xfrm>
-                <a:off x="14194493" y="1661296"/>
-                <a:ext cx="829073" cy="523220"/>
-              </a:xfrm>
-              <a:prstGeom prst="rect">
-                <a:avLst/>
-              </a:prstGeom>
-              <a:noFill/>
-            </p:spPr>
-            <p:txBody>
-              <a:bodyPr wrap="none" rtlCol="0">
-                <a:spAutoFit/>
-              </a:bodyPr>
-              <a:lstStyle/>
-              <a:p>
-                <a:r>
-                  <a:rPr lang="en-US" sz="2800" dirty="0" err="1">
-                    <a:latin typeface="Courier" pitchFamily="2" charset="0"/>
-                  </a:rPr>
-                  <a:t>g</a:t>
-                </a:r>
-                <a:r>
-                  <a:rPr lang="en-US" sz="2800" b="1" dirty="0" err="1">
-                    <a:solidFill>
-                      <a:srgbClr val="FF0000"/>
-                    </a:solidFill>
-                    <a:latin typeface="Courier" pitchFamily="2" charset="0"/>
-                  </a:rPr>
-                  <a:t>g</a:t>
-                </a:r>
-                <a:r>
-                  <a:rPr lang="en-US" sz="2800" dirty="0" err="1">
-                    <a:latin typeface="Courier" pitchFamily="2" charset="0"/>
-                  </a:rPr>
-                  <a:t>a</a:t>
-                </a:r>
-                <a:endParaRPr lang="en-US" sz="2800" b="1" dirty="0">
-                  <a:latin typeface="Courier" pitchFamily="2" charset="0"/>
-                </a:endParaRPr>
-              </a:p>
-            </p:txBody>
-          </p:sp>
-          <p:sp>
-            <p:nvSpPr>
-              <p:cNvPr id="136" name="TextBox 135">
-                <a:extLst>
-                  <a:ext uri="{FF2B5EF4-FFF2-40B4-BE49-F238E27FC236}">
-                    <a16:creationId xmlns:a16="http://schemas.microsoft.com/office/drawing/2014/main" id="{4B85913B-EB5C-3C02-96DE-40F2D35F8126}"/>
-                  </a:ext>
-                </a:extLst>
-              </p:cNvPr>
-              <p:cNvSpPr txBox="1"/>
-              <p:nvPr/>
-            </p:nvSpPr>
-            <p:spPr>
-              <a:xfrm>
-                <a:off x="14194493" y="2289008"/>
-                <a:ext cx="829073" cy="523220"/>
-              </a:xfrm>
-              <a:prstGeom prst="rect">
-                <a:avLst/>
-              </a:prstGeom>
-              <a:noFill/>
-            </p:spPr>
-            <p:txBody>
-              <a:bodyPr wrap="none" rtlCol="0">
-                <a:spAutoFit/>
-              </a:bodyPr>
-              <a:lstStyle/>
-              <a:p>
-                <a:r>
-                  <a:rPr lang="en-US" sz="2800" dirty="0" err="1">
-                    <a:latin typeface="Courier" pitchFamily="2" charset="0"/>
-                  </a:rPr>
-                  <a:t>g</a:t>
-                </a:r>
-                <a:r>
-                  <a:rPr lang="en-US" sz="2800" b="1" dirty="0" err="1">
-                    <a:solidFill>
-                      <a:srgbClr val="FF0000"/>
-                    </a:solidFill>
-                    <a:latin typeface="Courier" pitchFamily="2" charset="0"/>
-                  </a:rPr>
-                  <a:t>g</a:t>
-                </a:r>
-                <a:r>
-                  <a:rPr lang="en-US" sz="2800" dirty="0" err="1">
-                    <a:latin typeface="Courier" pitchFamily="2" charset="0"/>
-                  </a:rPr>
-                  <a:t>a</a:t>
-                </a:r>
-                <a:endParaRPr lang="en-US" sz="2800" b="1" dirty="0">
-                  <a:solidFill>
-                    <a:srgbClr val="FF0000"/>
-                  </a:solidFill>
-                  <a:latin typeface="Courier" pitchFamily="2" charset="0"/>
-                </a:endParaRPr>
-              </a:p>
-            </p:txBody>
-          </p:sp>
-        </p:grpSp>
-        <p:sp>
-          <p:nvSpPr>
-            <p:cNvPr id="124" name="Lightning Bolt 123">
-              <a:extLst>
-                <a:ext uri="{FF2B5EF4-FFF2-40B4-BE49-F238E27FC236}">
-                  <a16:creationId xmlns:a16="http://schemas.microsoft.com/office/drawing/2014/main" id="{5632C9EF-E7CA-B7A2-01F1-7E336738D5DB}"/>
-                </a:ext>
-              </a:extLst>
-            </p:cNvPr>
-            <p:cNvSpPr/>
-            <p:nvPr/>
-          </p:nvSpPr>
-          <p:spPr>
-            <a:xfrm rot="5400000">
-              <a:off x="11733809" y="1811349"/>
-              <a:ext cx="364530" cy="499864"/>
-            </a:xfrm>
-            <a:prstGeom prst="lightningBolt">
-              <a:avLst/>
-            </a:prstGeom>
-            <a:solidFill>
-              <a:srgbClr val="FF0000"/>
-            </a:solidFill>
-            <a:ln>
-              <a:noFill/>
-            </a:ln>
-          </p:spPr>
-          <p:style>
-            <a:lnRef idx="2">
-              <a:schemeClr val="accent1">
-                <a:shade val="50000"/>
-              </a:schemeClr>
-            </a:lnRef>
-            <a:fillRef idx="1">
-              <a:schemeClr val="accent1"/>
-            </a:fillRef>
-            <a:effectRef idx="0">
-              <a:schemeClr val="accent1"/>
-            </a:effectRef>
-            <a:fontRef idx="minor">
-              <a:schemeClr val="lt1"/>
-            </a:fontRef>
-          </p:style>
-          <p:txBody>
-            <a:bodyPr rtlCol="0" anchor="ctr"/>
-            <a:lstStyle/>
-            <a:p>
-              <a:pPr algn="ctr"/>
-              <a:endParaRPr lang="en-US"/>
-            </a:p>
-          </p:txBody>
-        </p:sp>
-      </p:grpSp>
-      <p:sp>
-        <p:nvSpPr>
-          <p:cNvPr id="137" name="TextBox 136">
-            <a:extLst>
-              <a:ext uri="{FF2B5EF4-FFF2-40B4-BE49-F238E27FC236}">
-                <a16:creationId xmlns:a16="http://schemas.microsoft.com/office/drawing/2014/main" id="{E923A5F0-AA21-E349-5BC5-52906D12D22E}"/>
-              </a:ext>
-            </a:extLst>
-          </p:cNvPr>
-          <p:cNvSpPr txBox="1"/>
-          <p:nvPr/>
-        </p:nvSpPr>
-        <p:spPr>
-          <a:xfrm>
-            <a:off x="0" y="0"/>
-            <a:ext cx="8769344" cy="4185761"/>
-          </a:xfrm>
-          <a:prstGeom prst="rect">
-            <a:avLst/>
-          </a:prstGeom>
-          <a:noFill/>
-        </p:spPr>
-        <p:txBody>
-          <a:bodyPr wrap="square" rtlCol="0">
-            <a:spAutoFit/>
-          </a:bodyPr>
-          <a:lstStyle/>
-          <a:p>
-            <a:pPr>
-              <a:spcAft>
-                <a:spcPts val="600"/>
-              </a:spcAft>
-            </a:pPr>
-            <a:r>
-              <a:rPr lang="en-US" sz="3200" b="1" dirty="0"/>
-              <a:t>Estimate mutation rates at 4-fold degenerate sites.</a:t>
-            </a:r>
-          </a:p>
-          <a:p>
-            <a:pPr>
-              <a:spcAft>
-                <a:spcPts val="600"/>
-              </a:spcAft>
-            </a:pPr>
-            <a:r>
-              <a:rPr lang="en-US" sz="3200" dirty="0"/>
-              <a:t>The third nucleotide in codon </a:t>
-            </a:r>
-            <a:r>
-              <a:rPr lang="en-US" sz="3200" dirty="0">
-                <a:latin typeface="Courier" pitchFamily="2" charset="0"/>
-              </a:rPr>
-              <a:t>acc</a:t>
-            </a:r>
-            <a:r>
-              <a:rPr lang="en-US" sz="3200" dirty="0"/>
-              <a:t> is 4-fold degenerate since </a:t>
-            </a:r>
-            <a:r>
-              <a:rPr lang="en-US" sz="3200" dirty="0">
-                <a:latin typeface="Courier" pitchFamily="2" charset="0"/>
-              </a:rPr>
-              <a:t>ac</a:t>
-            </a:r>
-            <a:r>
-              <a:rPr lang="en-US" sz="3200" b="1" dirty="0">
-                <a:latin typeface="Courier" pitchFamily="2" charset="0"/>
-              </a:rPr>
-              <a:t>a</a:t>
-            </a:r>
-            <a:r>
-              <a:rPr lang="en-US" sz="3200" dirty="0"/>
-              <a:t>, </a:t>
-            </a:r>
-            <a:r>
-              <a:rPr lang="en-US" sz="3200" dirty="0">
-                <a:latin typeface="Courier" pitchFamily="2" charset="0"/>
-              </a:rPr>
-              <a:t>ac</a:t>
-            </a:r>
-            <a:r>
-              <a:rPr lang="en-US" sz="3200" b="1" dirty="0">
-                <a:latin typeface="Courier" pitchFamily="2" charset="0"/>
-              </a:rPr>
-              <a:t>c</a:t>
-            </a:r>
-            <a:r>
-              <a:rPr lang="en-US" sz="3200" dirty="0"/>
-              <a:t>, </a:t>
-            </a:r>
-            <a:r>
-              <a:rPr lang="en-US" sz="3200" dirty="0" err="1">
-                <a:latin typeface="Courier" pitchFamily="2" charset="0"/>
-              </a:rPr>
-              <a:t>ac</a:t>
-            </a:r>
-            <a:r>
-              <a:rPr lang="en-US" sz="3200" b="1" dirty="0" err="1">
-                <a:latin typeface="Courier" pitchFamily="2" charset="0"/>
-              </a:rPr>
-              <a:t>g</a:t>
-            </a:r>
-            <a:r>
-              <a:rPr lang="en-US" sz="3200" dirty="0"/>
-              <a:t>, and </a:t>
-            </a:r>
-            <a:r>
-              <a:rPr lang="en-US" sz="3200" dirty="0">
-                <a:latin typeface="Courier" pitchFamily="2" charset="0"/>
-              </a:rPr>
-              <a:t>ac</a:t>
-            </a:r>
-            <a:r>
-              <a:rPr lang="en-US" sz="3200" b="1" dirty="0">
-                <a:latin typeface="Courier" pitchFamily="2" charset="0"/>
-              </a:rPr>
-              <a:t>t</a:t>
-            </a:r>
-            <a:r>
-              <a:rPr lang="en-US" sz="3200" dirty="0"/>
-              <a:t> all encode threonine. </a:t>
-            </a:r>
-          </a:p>
-          <a:p>
-            <a:pPr>
-              <a:spcAft>
-                <a:spcPts val="600"/>
-              </a:spcAft>
-            </a:pPr>
-            <a:r>
-              <a:rPr lang="en-US" sz="3200" dirty="0"/>
-              <a:t>We count the number of </a:t>
-            </a:r>
-            <a:r>
-              <a:rPr lang="en-US" sz="3200" i="1" dirty="0"/>
-              <a:t>mutations</a:t>
-            </a:r>
-            <a:r>
-              <a:rPr lang="en-US" sz="3200" dirty="0"/>
-              <a:t> on branches of the tree, not the total mutated nucleotides: in the tree at right there are three </a:t>
-            </a:r>
-            <a:r>
-              <a:rPr lang="en-US" sz="3200" dirty="0" err="1">
-                <a:latin typeface="Courier" pitchFamily="2" charset="0"/>
-              </a:rPr>
-              <a:t>c→g</a:t>
-            </a:r>
-            <a:r>
-              <a:rPr lang="en-US" sz="3200" dirty="0"/>
-              <a:t> mutations even though four sequences have the mutation.</a:t>
-            </a:r>
-          </a:p>
-        </p:txBody>
-      </p:sp>
-      <p:sp>
-        <p:nvSpPr>
-          <p:cNvPr id="138" name="TextBox 137">
-            <a:extLst>
-              <a:ext uri="{FF2B5EF4-FFF2-40B4-BE49-F238E27FC236}">
-                <a16:creationId xmlns:a16="http://schemas.microsoft.com/office/drawing/2014/main" id="{2861BE95-C23D-7525-D703-9FA4CBA63B02}"/>
-              </a:ext>
-            </a:extLst>
-          </p:cNvPr>
-          <p:cNvSpPr txBox="1"/>
-          <p:nvPr/>
-        </p:nvSpPr>
-        <p:spPr>
-          <a:xfrm>
-            <a:off x="38012" y="5475698"/>
-            <a:ext cx="8757371" cy="2139047"/>
-          </a:xfrm>
-          <a:prstGeom prst="rect">
-            <a:avLst/>
-          </a:prstGeom>
-          <a:noFill/>
-        </p:spPr>
-        <p:txBody>
-          <a:bodyPr wrap="square" rtlCol="0">
-            <a:spAutoFit/>
-          </a:bodyPr>
-          <a:lstStyle/>
-          <a:p>
-            <a:pPr>
-              <a:spcAft>
-                <a:spcPts val="600"/>
-              </a:spcAft>
-            </a:pPr>
-            <a:r>
-              <a:rPr lang="en-US" sz="3200" b="1" dirty="0"/>
-              <a:t>Determine actual counts of mutations at each site.</a:t>
-            </a:r>
-          </a:p>
-          <a:p>
-            <a:pPr>
-              <a:spcAft>
-                <a:spcPts val="600"/>
-              </a:spcAft>
-            </a:pPr>
-            <a:r>
-              <a:rPr lang="en-US" sz="3200" dirty="0"/>
-              <a:t>In the tree at right, there is one count of the indicated </a:t>
-            </a:r>
-            <a:r>
-              <a:rPr lang="en-US" sz="3200" dirty="0" err="1">
-                <a:latin typeface="Courier" pitchFamily="2" charset="0"/>
-              </a:rPr>
-              <a:t>c→g</a:t>
-            </a:r>
-            <a:r>
-              <a:rPr lang="en-US" sz="3200" dirty="0"/>
-              <a:t> mutation, which induces an alanine to glycine mutation .</a:t>
-            </a:r>
-            <a:endParaRPr lang="en-US" sz="3200" b="1" dirty="0"/>
-          </a:p>
-        </p:txBody>
-      </p:sp>
     </p:spTree>
     <p:extLst>
       <p:ext uri="{BB962C8B-B14F-4D97-AF65-F5344CB8AC3E}">
@@ -4666,7 +5961,7 @@
 <file path=ppt/theme/theme1.xml><?xml version="1.0" encoding="utf-8"?>
 <a:theme xmlns:a="http://schemas.openxmlformats.org/drawingml/2006/main" name="Office Theme">
   <a:themeElements>
-    <a:clrScheme name="Office Theme">
+    <a:clrScheme name="Office Theme 2013 - 2022">
       <a:dk1>
         <a:sysClr val="windowText" lastClr="000000"/>
       </a:dk1>
@@ -4704,7 +5999,7 @@
         <a:srgbClr val="954F72"/>
       </a:folHlink>
     </a:clrScheme>
-    <a:fontScheme name="Office Theme">
+    <a:fontScheme name="Office Theme 2013 - 2022">
       <a:majorFont>
         <a:latin typeface="Calibri Light" panose="020F0302020204030204"/>
         <a:ea typeface=""/>
@@ -4776,7 +6071,7 @@
         <a:font script="Geor" typeface="Sylfaen"/>
       </a:minorFont>
     </a:fontScheme>
-    <a:fmtScheme name="Office Theme">
+    <a:fmtScheme name="Office Theme 2013 - 2022">
       <a:fillStyleLst>
         <a:solidFill>
           <a:schemeClr val="phClr"/>

</xml_diff>

<commit_message>
add section on fixed mutations
</commit_message>
<xml_diff>
--- a/paper/figs/schematic/schematic.pptx
+++ b/paper/figs/schematic/schematic.pptx
@@ -112,16 +112,32 @@
 </p:presentation>
 </file>
 
-<file path=ppt/revisionInfo.xml><?xml version="1.0" encoding="utf-8"?>
-<p1510:revInfo xmlns:a="http://schemas.openxmlformats.org/drawingml/2006/main" xmlns:r="http://schemas.openxmlformats.org/officeDocument/2006/relationships" xmlns:p1510="http://schemas.microsoft.com/office/powerpoint/2015/10/main">
-  <p1510:revLst>
-    <p1510:client id="{CE44BA01-297F-E041-9FF7-9BC574E0188B}" v="8" dt="2023-01-12T16:06:23.556"/>
-  </p1510:revLst>
-</p1510:revInfo>
-</file>
-
 <file path=ppt/changesInfos/changesInfo1.xml><?xml version="1.0" encoding="utf-8"?>
 <pc:chgInfo xmlns:a="http://schemas.openxmlformats.org/drawingml/2006/main" xmlns:r="http://schemas.openxmlformats.org/officeDocument/2006/relationships" xmlns:ac="http://schemas.microsoft.com/office/drawing/2013/main/command" xmlns:pc="http://schemas.microsoft.com/office/powerpoint/2013/main/command">
+  <pc:docChgLst>
+    <pc:chgData name="Bloom PhD, Jesse D" userId="e17e4af4-92ba-4f4f-89d8-f6d4f5501821" providerId="ADAL" clId="{B334B700-FA99-C149-9327-E841BD3858E5}"/>
+    <pc:docChg chg="modSld">
+      <pc:chgData name="Bloom PhD, Jesse D" userId="e17e4af4-92ba-4f4f-89d8-f6d4f5501821" providerId="ADAL" clId="{B334B700-FA99-C149-9327-E841BD3858E5}" dt="2023-01-27T21:06:19.110" v="17" actId="20577"/>
+      <pc:docMkLst>
+        <pc:docMk/>
+      </pc:docMkLst>
+      <pc:sldChg chg="modSp mod">
+        <pc:chgData name="Bloom PhD, Jesse D" userId="e17e4af4-92ba-4f4f-89d8-f6d4f5501821" providerId="ADAL" clId="{B334B700-FA99-C149-9327-E841BD3858E5}" dt="2023-01-27T21:06:19.110" v="17" actId="20577"/>
+        <pc:sldMkLst>
+          <pc:docMk/>
+          <pc:sldMk cId="1618769077" sldId="256"/>
+        </pc:sldMkLst>
+        <pc:spChg chg="mod">
+          <ac:chgData name="Bloom PhD, Jesse D" userId="e17e4af4-92ba-4f4f-89d8-f6d4f5501821" providerId="ADAL" clId="{B334B700-FA99-C149-9327-E841BD3858E5}" dt="2023-01-27T21:06:19.110" v="17" actId="20577"/>
+          <ac:spMkLst>
+            <pc:docMk/>
+            <pc:sldMk cId="1618769077" sldId="256"/>
+            <ac:spMk id="44" creationId="{78B8061B-22FC-C02B-A7E3-6982D9CFC56E}"/>
+          </ac:spMkLst>
+        </pc:spChg>
+      </pc:sldChg>
+    </pc:docChg>
+  </pc:docChgLst>
   <pc:docChgLst>
     <pc:chgData name="Bloom PhD, Jesse D" userId="e17e4af4-92ba-4f4f-89d8-f6d4f5501821" providerId="ADAL" clId="{CE44BA01-297F-E041-9FF7-9BC574E0188B}"/>
     <pc:docChg chg="custSel modSld modMainMaster">
@@ -1444,7 +1460,7 @@
           <a:p>
             <a:fld id="{4328B3F3-4A5C-9B4D-BC73-E009D96FB836}" type="datetimeFigureOut">
               <a:rPr lang="en-US" smtClean="0"/>
-              <a:t>1/12/23</a:t>
+              <a:t>1/27/23</a:t>
             </a:fld>
             <a:endParaRPr lang="en-US" dirty="0"/>
           </a:p>
@@ -1614,7 +1630,7 @@
           <a:p>
             <a:fld id="{4328B3F3-4A5C-9B4D-BC73-E009D96FB836}" type="datetimeFigureOut">
               <a:rPr lang="en-US" smtClean="0"/>
-              <a:t>1/12/23</a:t>
+              <a:t>1/27/23</a:t>
             </a:fld>
             <a:endParaRPr lang="en-US" dirty="0"/>
           </a:p>
@@ -1794,7 +1810,7 @@
           <a:p>
             <a:fld id="{4328B3F3-4A5C-9B4D-BC73-E009D96FB836}" type="datetimeFigureOut">
               <a:rPr lang="en-US" smtClean="0"/>
-              <a:t>1/12/23</a:t>
+              <a:t>1/27/23</a:t>
             </a:fld>
             <a:endParaRPr lang="en-US" dirty="0"/>
           </a:p>
@@ -1964,7 +1980,7 @@
           <a:p>
             <a:fld id="{4328B3F3-4A5C-9B4D-BC73-E009D96FB836}" type="datetimeFigureOut">
               <a:rPr lang="en-US" smtClean="0"/>
-              <a:t>1/12/23</a:t>
+              <a:t>1/27/23</a:t>
             </a:fld>
             <a:endParaRPr lang="en-US" dirty="0"/>
           </a:p>
@@ -2210,7 +2226,7 @@
           <a:p>
             <a:fld id="{4328B3F3-4A5C-9B4D-BC73-E009D96FB836}" type="datetimeFigureOut">
               <a:rPr lang="en-US" smtClean="0"/>
-              <a:t>1/12/23</a:t>
+              <a:t>1/27/23</a:t>
             </a:fld>
             <a:endParaRPr lang="en-US" dirty="0"/>
           </a:p>
@@ -2442,7 +2458,7 @@
           <a:p>
             <a:fld id="{4328B3F3-4A5C-9B4D-BC73-E009D96FB836}" type="datetimeFigureOut">
               <a:rPr lang="en-US" smtClean="0"/>
-              <a:t>1/12/23</a:t>
+              <a:t>1/27/23</a:t>
             </a:fld>
             <a:endParaRPr lang="en-US" dirty="0"/>
           </a:p>
@@ -2809,7 +2825,7 @@
           <a:p>
             <a:fld id="{4328B3F3-4A5C-9B4D-BC73-E009D96FB836}" type="datetimeFigureOut">
               <a:rPr lang="en-US" smtClean="0"/>
-              <a:t>1/12/23</a:t>
+              <a:t>1/27/23</a:t>
             </a:fld>
             <a:endParaRPr lang="en-US" dirty="0"/>
           </a:p>
@@ -2927,7 +2943,7 @@
           <a:p>
             <a:fld id="{4328B3F3-4A5C-9B4D-BC73-E009D96FB836}" type="datetimeFigureOut">
               <a:rPr lang="en-US" smtClean="0"/>
-              <a:t>1/12/23</a:t>
+              <a:t>1/27/23</a:t>
             </a:fld>
             <a:endParaRPr lang="en-US" dirty="0"/>
           </a:p>
@@ -3022,7 +3038,7 @@
           <a:p>
             <a:fld id="{4328B3F3-4A5C-9B4D-BC73-E009D96FB836}" type="datetimeFigureOut">
               <a:rPr lang="en-US" smtClean="0"/>
-              <a:t>1/12/23</a:t>
+              <a:t>1/27/23</a:t>
             </a:fld>
             <a:endParaRPr lang="en-US" dirty="0"/>
           </a:p>
@@ -3299,7 +3315,7 @@
           <a:p>
             <a:fld id="{4328B3F3-4A5C-9B4D-BC73-E009D96FB836}" type="datetimeFigureOut">
               <a:rPr lang="en-US" smtClean="0"/>
-              <a:t>1/12/23</a:t>
+              <a:t>1/27/23</a:t>
             </a:fld>
             <a:endParaRPr lang="en-US" dirty="0"/>
           </a:p>
@@ -3556,7 +3572,7 @@
           <a:p>
             <a:fld id="{4328B3F3-4A5C-9B4D-BC73-E009D96FB836}" type="datetimeFigureOut">
               <a:rPr lang="en-US" smtClean="0"/>
-              <a:t>1/12/23</a:t>
+              <a:t>1/27/23</a:t>
             </a:fld>
             <a:endParaRPr lang="en-US" dirty="0"/>
           </a:p>
@@ -3769,7 +3785,7 @@
           <a:p>
             <a:fld id="{4328B3F3-4A5C-9B4D-BC73-E009D96FB836}" type="datetimeFigureOut">
               <a:rPr lang="en-US" smtClean="0"/>
-              <a:t>1/12/23</a:t>
+              <a:t>1/27/23</a:t>
             </a:fld>
             <a:endParaRPr lang="en-US" dirty="0"/>
           </a:p>
@@ -5864,7 +5880,7 @@
                   <a:latin typeface="Arial" panose="020B0604020202020204" pitchFamily="34" charset="0"/>
                   <a:cs typeface="Arial" panose="020B0604020202020204" pitchFamily="34" charset="0"/>
                 </a:rPr>
-                <a:t> mutations even though four sequences have the mutation.</a:t>
+                <a:t> mutations although more than three sequences have the mutation.</a:t>
               </a:r>
             </a:p>
           </p:txBody>

</xml_diff>

<commit_message>
updates to paper (#16)
* fix Methods description of how mutations excluded

* add mean log size to `terminal` plot

* elaborate on Mpro / yeast DMS diffs

* page numbers in center bottom

* add Neher fitness calculations

* remove `fitness_inference` notes as now in main paper

* add section on fixed mutations

* add DCA and Marks lab citations
</commit_message>
<xml_diff>
--- a/paper/figs/schematic/schematic.pptx
+++ b/paper/figs/schematic/schematic.pptx
@@ -112,16 +112,32 @@
 </p:presentation>
 </file>
 
-<file path=ppt/revisionInfo.xml><?xml version="1.0" encoding="utf-8"?>
-<p1510:revInfo xmlns:a="http://schemas.openxmlformats.org/drawingml/2006/main" xmlns:r="http://schemas.openxmlformats.org/officeDocument/2006/relationships" xmlns:p1510="http://schemas.microsoft.com/office/powerpoint/2015/10/main">
-  <p1510:revLst>
-    <p1510:client id="{CE44BA01-297F-E041-9FF7-9BC574E0188B}" v="8" dt="2023-01-12T16:06:23.556"/>
-  </p1510:revLst>
-</p1510:revInfo>
-</file>
-
 <file path=ppt/changesInfos/changesInfo1.xml><?xml version="1.0" encoding="utf-8"?>
 <pc:chgInfo xmlns:a="http://schemas.openxmlformats.org/drawingml/2006/main" xmlns:r="http://schemas.openxmlformats.org/officeDocument/2006/relationships" xmlns:ac="http://schemas.microsoft.com/office/drawing/2013/main/command" xmlns:pc="http://schemas.microsoft.com/office/powerpoint/2013/main/command">
+  <pc:docChgLst>
+    <pc:chgData name="Bloom PhD, Jesse D" userId="e17e4af4-92ba-4f4f-89d8-f6d4f5501821" providerId="ADAL" clId="{B334B700-FA99-C149-9327-E841BD3858E5}"/>
+    <pc:docChg chg="modSld">
+      <pc:chgData name="Bloom PhD, Jesse D" userId="e17e4af4-92ba-4f4f-89d8-f6d4f5501821" providerId="ADAL" clId="{B334B700-FA99-C149-9327-E841BD3858E5}" dt="2023-01-27T21:06:19.110" v="17" actId="20577"/>
+      <pc:docMkLst>
+        <pc:docMk/>
+      </pc:docMkLst>
+      <pc:sldChg chg="modSp mod">
+        <pc:chgData name="Bloom PhD, Jesse D" userId="e17e4af4-92ba-4f4f-89d8-f6d4f5501821" providerId="ADAL" clId="{B334B700-FA99-C149-9327-E841BD3858E5}" dt="2023-01-27T21:06:19.110" v="17" actId="20577"/>
+        <pc:sldMkLst>
+          <pc:docMk/>
+          <pc:sldMk cId="1618769077" sldId="256"/>
+        </pc:sldMkLst>
+        <pc:spChg chg="mod">
+          <ac:chgData name="Bloom PhD, Jesse D" userId="e17e4af4-92ba-4f4f-89d8-f6d4f5501821" providerId="ADAL" clId="{B334B700-FA99-C149-9327-E841BD3858E5}" dt="2023-01-27T21:06:19.110" v="17" actId="20577"/>
+          <ac:spMkLst>
+            <pc:docMk/>
+            <pc:sldMk cId="1618769077" sldId="256"/>
+            <ac:spMk id="44" creationId="{78B8061B-22FC-C02B-A7E3-6982D9CFC56E}"/>
+          </ac:spMkLst>
+        </pc:spChg>
+      </pc:sldChg>
+    </pc:docChg>
+  </pc:docChgLst>
   <pc:docChgLst>
     <pc:chgData name="Bloom PhD, Jesse D" userId="e17e4af4-92ba-4f4f-89d8-f6d4f5501821" providerId="ADAL" clId="{CE44BA01-297F-E041-9FF7-9BC574E0188B}"/>
     <pc:docChg chg="custSel modSld modMainMaster">
@@ -1444,7 +1460,7 @@
           <a:p>
             <a:fld id="{4328B3F3-4A5C-9B4D-BC73-E009D96FB836}" type="datetimeFigureOut">
               <a:rPr lang="en-US" smtClean="0"/>
-              <a:t>1/12/23</a:t>
+              <a:t>1/27/23</a:t>
             </a:fld>
             <a:endParaRPr lang="en-US" dirty="0"/>
           </a:p>
@@ -1614,7 +1630,7 @@
           <a:p>
             <a:fld id="{4328B3F3-4A5C-9B4D-BC73-E009D96FB836}" type="datetimeFigureOut">
               <a:rPr lang="en-US" smtClean="0"/>
-              <a:t>1/12/23</a:t>
+              <a:t>1/27/23</a:t>
             </a:fld>
             <a:endParaRPr lang="en-US" dirty="0"/>
           </a:p>
@@ -1794,7 +1810,7 @@
           <a:p>
             <a:fld id="{4328B3F3-4A5C-9B4D-BC73-E009D96FB836}" type="datetimeFigureOut">
               <a:rPr lang="en-US" smtClean="0"/>
-              <a:t>1/12/23</a:t>
+              <a:t>1/27/23</a:t>
             </a:fld>
             <a:endParaRPr lang="en-US" dirty="0"/>
           </a:p>
@@ -1964,7 +1980,7 @@
           <a:p>
             <a:fld id="{4328B3F3-4A5C-9B4D-BC73-E009D96FB836}" type="datetimeFigureOut">
               <a:rPr lang="en-US" smtClean="0"/>
-              <a:t>1/12/23</a:t>
+              <a:t>1/27/23</a:t>
             </a:fld>
             <a:endParaRPr lang="en-US" dirty="0"/>
           </a:p>
@@ -2210,7 +2226,7 @@
           <a:p>
             <a:fld id="{4328B3F3-4A5C-9B4D-BC73-E009D96FB836}" type="datetimeFigureOut">
               <a:rPr lang="en-US" smtClean="0"/>
-              <a:t>1/12/23</a:t>
+              <a:t>1/27/23</a:t>
             </a:fld>
             <a:endParaRPr lang="en-US" dirty="0"/>
           </a:p>
@@ -2442,7 +2458,7 @@
           <a:p>
             <a:fld id="{4328B3F3-4A5C-9B4D-BC73-E009D96FB836}" type="datetimeFigureOut">
               <a:rPr lang="en-US" smtClean="0"/>
-              <a:t>1/12/23</a:t>
+              <a:t>1/27/23</a:t>
             </a:fld>
             <a:endParaRPr lang="en-US" dirty="0"/>
           </a:p>
@@ -2809,7 +2825,7 @@
           <a:p>
             <a:fld id="{4328B3F3-4A5C-9B4D-BC73-E009D96FB836}" type="datetimeFigureOut">
               <a:rPr lang="en-US" smtClean="0"/>
-              <a:t>1/12/23</a:t>
+              <a:t>1/27/23</a:t>
             </a:fld>
             <a:endParaRPr lang="en-US" dirty="0"/>
           </a:p>
@@ -2927,7 +2943,7 @@
           <a:p>
             <a:fld id="{4328B3F3-4A5C-9B4D-BC73-E009D96FB836}" type="datetimeFigureOut">
               <a:rPr lang="en-US" smtClean="0"/>
-              <a:t>1/12/23</a:t>
+              <a:t>1/27/23</a:t>
             </a:fld>
             <a:endParaRPr lang="en-US" dirty="0"/>
           </a:p>
@@ -3022,7 +3038,7 @@
           <a:p>
             <a:fld id="{4328B3F3-4A5C-9B4D-BC73-E009D96FB836}" type="datetimeFigureOut">
               <a:rPr lang="en-US" smtClean="0"/>
-              <a:t>1/12/23</a:t>
+              <a:t>1/27/23</a:t>
             </a:fld>
             <a:endParaRPr lang="en-US" dirty="0"/>
           </a:p>
@@ -3299,7 +3315,7 @@
           <a:p>
             <a:fld id="{4328B3F3-4A5C-9B4D-BC73-E009D96FB836}" type="datetimeFigureOut">
               <a:rPr lang="en-US" smtClean="0"/>
-              <a:t>1/12/23</a:t>
+              <a:t>1/27/23</a:t>
             </a:fld>
             <a:endParaRPr lang="en-US" dirty="0"/>
           </a:p>
@@ -3556,7 +3572,7 @@
           <a:p>
             <a:fld id="{4328B3F3-4A5C-9B4D-BC73-E009D96FB836}" type="datetimeFigureOut">
               <a:rPr lang="en-US" smtClean="0"/>
-              <a:t>1/12/23</a:t>
+              <a:t>1/27/23</a:t>
             </a:fld>
             <a:endParaRPr lang="en-US" dirty="0"/>
           </a:p>
@@ -3769,7 +3785,7 @@
           <a:p>
             <a:fld id="{4328B3F3-4A5C-9B4D-BC73-E009D96FB836}" type="datetimeFigureOut">
               <a:rPr lang="en-US" smtClean="0"/>
-              <a:t>1/12/23</a:t>
+              <a:t>1/27/23</a:t>
             </a:fld>
             <a:endParaRPr lang="en-US" dirty="0"/>
           </a:p>
@@ -5864,7 +5880,7 @@
                   <a:latin typeface="Arial" panose="020B0604020202020204" pitchFamily="34" charset="0"/>
                   <a:cs typeface="Arial" panose="020B0604020202020204" pitchFamily="34" charset="0"/>
                 </a:rPr>
-                <a:t> mutations even though four sequences have the mutation.</a:t>
+                <a:t> mutations although more than three sequences have the mutation.</a:t>
               </a:r>
             </a:p>
           </p:txBody>

</xml_diff>